<commit_message>
präsi mit viterbi evaluation
</commit_message>
<xml_diff>
--- a/excercise4/presentation/EA_ex04_Wegge_Buehler_Quensel.pptx
+++ b/excercise4/presentation/EA_ex04_Wegge_Buehler_Quensel.pptx
@@ -5,7 +5,7 @@
     <p:sldMasterId id="2147483660" r:id="rId1"/>
   </p:sldMasterIdLst>
   <p:notesMasterIdLst>
-    <p:notesMasterId r:id="rId9"/>
+    <p:notesMasterId r:id="rId10"/>
   </p:notesMasterIdLst>
   <p:sldIdLst>
     <p:sldId id="266" r:id="rId2"/>
@@ -14,7 +14,8 @@
     <p:sldId id="328" r:id="rId5"/>
     <p:sldId id="329" r:id="rId6"/>
     <p:sldId id="330" r:id="rId7"/>
-    <p:sldId id="324" r:id="rId8"/>
+    <p:sldId id="331" r:id="rId8"/>
+    <p:sldId id="324" r:id="rId9"/>
   </p:sldIdLst>
   <p:sldSz cx="12192000" cy="6858000"/>
   <p:notesSz cx="6858000" cy="9144000"/>
@@ -136,6 +137,7 @@
         <p14:section name="Evaluation" id="{E91F97AE-84D6-461E-8805-A74E81053EAF}">
           <p14:sldIdLst>
             <p14:sldId id="330"/>
+            <p14:sldId id="331"/>
           </p14:sldIdLst>
         </p14:section>
         <p14:section name="Conclusion" id="{D901612B-E6E4-4455-8FFB-2D1AF2FCFAA5}">
@@ -234,7 +236,7 @@
           <a:p>
             <a:fld id="{322CBE9C-AAEB-46BF-9047-18B3831519BE}" type="datetimeFigureOut">
               <a:rPr lang="de-DE" smtClean="0"/>
-              <a:t>06.02.2021</a:t>
+              <a:t>07.02.2021</a:t>
             </a:fld>
             <a:endParaRPr lang="de-DE"/>
           </a:p>
@@ -16789,11 +16791,11 @@
   <p:clrMapOvr>
     <a:masterClrMapping/>
   </p:clrMapOvr>
-  <mc:AlternateContent xmlns:mc="http://schemas.openxmlformats.org/markup-compatibility/2006">
-    <mc:Choice xmlns:p14="http://schemas.microsoft.com/office/powerpoint/2010/main" Requires="p14">
+  <mc:AlternateContent xmlns:mc="http://schemas.openxmlformats.org/markup-compatibility/2006" xmlns:p14="http://schemas.microsoft.com/office/powerpoint/2010/main">
+    <mc:Choice Requires="p14">
       <p:transition p14:dur="0" advTm="2361"/>
     </mc:Choice>
-    <mc:Fallback>
+    <mc:Fallback xmlns="">
       <p:transition advTm="2361"/>
     </mc:Fallback>
   </mc:AlternateContent>
@@ -16967,8 +16969,8 @@
           </a:p>
         </p:txBody>
       </p:sp>
-      <mc:AlternateContent xmlns:mc="http://schemas.openxmlformats.org/markup-compatibility/2006">
-        <mc:Choice xmlns:a14="http://schemas.microsoft.com/office/drawing/2010/main" Requires="a14">
+      <mc:AlternateContent xmlns:mc="http://schemas.openxmlformats.org/markup-compatibility/2006" xmlns:a14="http://schemas.microsoft.com/office/drawing/2010/main">
+        <mc:Choice Requires="a14">
           <p:sp>
             <p:nvSpPr>
               <p:cNvPr id="7" name="Inhaltsplatzhalter 3">
@@ -17026,7 +17028,8 @@
                     <m:f>
                       <m:fPr>
                         <m:ctrlPr>
-                          <a:rPr lang="en-US" sz="2000" smtClean="0">
+                          <a:rPr lang="en-US" sz="2000" i="1" smtClean="0">
+                            <a:latin typeface="Cambria Math" panose="02040503050406030204" pitchFamily="18" charset="0"/>
                             <a:cs typeface="Calibri" panose="020F0502020204030204" pitchFamily="34" charset="0"/>
                           </a:rPr>
                         </m:ctrlPr>
@@ -17037,12 +17040,14 @@
                             <m:sty m:val="p"/>
                           </m:rPr>
                           <a:rPr lang="de-DE" sz="2000" b="0" i="0" smtClean="0">
+                            <a:latin typeface="Cambria Math" panose="02040503050406030204" pitchFamily="18" charset="0"/>
                             <a:cs typeface="Calibri" panose="020F0502020204030204" pitchFamily="34" charset="0"/>
                           </a:rPr>
                           <m:t>frequency</m:t>
                         </m:r>
                         <m:r>
                           <a:rPr lang="de-DE" sz="2000" b="0" i="0" smtClean="0">
+                            <a:latin typeface="Cambria Math" panose="02040503050406030204" pitchFamily="18" charset="0"/>
                             <a:cs typeface="Calibri" panose="020F0502020204030204" pitchFamily="34" charset="0"/>
                           </a:rPr>
                           <m:t> </m:t>
@@ -17052,12 +17057,14 @@
                             <m:sty m:val="p"/>
                           </m:rPr>
                           <a:rPr lang="de-DE" sz="2000" b="0" i="0" smtClean="0">
+                            <a:latin typeface="Cambria Math" panose="02040503050406030204" pitchFamily="18" charset="0"/>
                             <a:cs typeface="Calibri" panose="020F0502020204030204" pitchFamily="34" charset="0"/>
                           </a:rPr>
                           <m:t>of</m:t>
                         </m:r>
                         <m:r>
                           <a:rPr lang="de-DE" sz="2000" b="0" i="0" smtClean="0">
+                            <a:latin typeface="Cambria Math" panose="02040503050406030204" pitchFamily="18" charset="0"/>
                             <a:cs typeface="Calibri" panose="020F0502020204030204" pitchFamily="34" charset="0"/>
                           </a:rPr>
                           <m:t> </m:t>
@@ -17067,12 +17074,14 @@
                             <m:sty m:val="p"/>
                           </m:rPr>
                           <a:rPr lang="de-DE" sz="2000" b="0" i="0" smtClean="0">
+                            <a:latin typeface="Cambria Math" panose="02040503050406030204" pitchFamily="18" charset="0"/>
                             <a:cs typeface="Calibri" panose="020F0502020204030204" pitchFamily="34" charset="0"/>
                           </a:rPr>
                           <m:t>token</m:t>
                         </m:r>
                         <m:r>
                           <a:rPr lang="de-DE" sz="2000" b="0" i="0" smtClean="0">
+                            <a:latin typeface="Cambria Math" panose="02040503050406030204" pitchFamily="18" charset="0"/>
                             <a:cs typeface="Calibri" panose="020F0502020204030204" pitchFamily="34" charset="0"/>
                           </a:rPr>
                           <m:t>,</m:t>
@@ -17082,12 +17091,14 @@
                             <m:sty m:val="p"/>
                           </m:rPr>
                           <a:rPr lang="de-DE" sz="2000" b="0" i="0" smtClean="0">
+                            <a:latin typeface="Cambria Math" panose="02040503050406030204" pitchFamily="18" charset="0"/>
                             <a:cs typeface="Calibri" panose="020F0502020204030204" pitchFamily="34" charset="0"/>
                           </a:rPr>
                           <m:t>tag</m:t>
                         </m:r>
                         <m:r>
                           <a:rPr lang="de-DE" sz="2000" b="0" i="0" smtClean="0">
+                            <a:latin typeface="Cambria Math" panose="02040503050406030204" pitchFamily="18" charset="0"/>
                             <a:cs typeface="Calibri" panose="020F0502020204030204" pitchFamily="34" charset="0"/>
                           </a:rPr>
                           <m:t>−</m:t>
@@ -17097,6 +17108,7 @@
                             <m:sty m:val="p"/>
                           </m:rPr>
                           <a:rPr lang="de-DE" sz="2000" b="0" i="0" smtClean="0">
+                            <a:latin typeface="Cambria Math" panose="02040503050406030204" pitchFamily="18" charset="0"/>
                             <a:cs typeface="Calibri" panose="020F0502020204030204" pitchFamily="34" charset="0"/>
                           </a:rPr>
                           <m:t>pair</m:t>
@@ -17108,12 +17120,14 @@
                             <m:sty m:val="p"/>
                           </m:rPr>
                           <a:rPr lang="de-DE" sz="2000" b="0" i="0" smtClean="0">
+                            <a:latin typeface="Cambria Math" panose="02040503050406030204" pitchFamily="18" charset="0"/>
                             <a:cs typeface="Calibri" panose="020F0502020204030204" pitchFamily="34" charset="0"/>
                           </a:rPr>
                           <m:t>overall</m:t>
                         </m:r>
                         <m:r>
                           <a:rPr lang="de-DE" sz="2000" b="0" i="0" smtClean="0">
+                            <a:latin typeface="Cambria Math" panose="02040503050406030204" pitchFamily="18" charset="0"/>
                             <a:cs typeface="Calibri" panose="020F0502020204030204" pitchFamily="34" charset="0"/>
                           </a:rPr>
                           <m:t> </m:t>
@@ -17123,12 +17137,14 @@
                             <m:sty m:val="p"/>
                           </m:rPr>
                           <a:rPr lang="de-DE" sz="2000" b="0" i="0" smtClean="0">
+                            <a:latin typeface="Cambria Math" panose="02040503050406030204" pitchFamily="18" charset="0"/>
                             <a:cs typeface="Calibri" panose="020F0502020204030204" pitchFamily="34" charset="0"/>
                           </a:rPr>
                           <m:t>token</m:t>
                         </m:r>
                         <m:r>
                           <a:rPr lang="de-DE" sz="2000" b="0" i="0" smtClean="0">
+                            <a:latin typeface="Cambria Math" panose="02040503050406030204" pitchFamily="18" charset="0"/>
                             <a:cs typeface="Calibri" panose="020F0502020204030204" pitchFamily="34" charset="0"/>
                           </a:rPr>
                           <m:t> </m:t>
@@ -17138,6 +17154,7 @@
                             <m:sty m:val="p"/>
                           </m:rPr>
                           <a:rPr lang="de-DE" sz="2000" b="0" i="0" smtClean="0">
+                            <a:latin typeface="Cambria Math" panose="02040503050406030204" pitchFamily="18" charset="0"/>
                             <a:cs typeface="Calibri" panose="020F0502020204030204" pitchFamily="34" charset="0"/>
                           </a:rPr>
                           <m:t>frequency</m:t>
@@ -17260,6 +17277,7 @@
                             <m:sty m:val="p"/>
                           </m:rPr>
                           <a:rPr lang="de-DE" sz="2000" b="0" i="0" smtClean="0">
+                            <a:latin typeface="Cambria Math" panose="02040503050406030204" pitchFamily="18" charset="0"/>
                             <a:cs typeface="Calibri" panose="020F0502020204030204" pitchFamily="34" charset="0"/>
                           </a:rPr>
                           <m:t>bigram</m:t>
@@ -17271,12 +17289,14 @@
                             <m:sty m:val="p"/>
                           </m:rPr>
                           <a:rPr lang="de-DE" sz="2000" b="0" i="0" smtClean="0">
+                            <a:latin typeface="Cambria Math" panose="02040503050406030204" pitchFamily="18" charset="0"/>
                             <a:cs typeface="Calibri" panose="020F0502020204030204" pitchFamily="34" charset="0"/>
                           </a:rPr>
                           <m:t>frequency</m:t>
                         </m:r>
                         <m:r>
                           <a:rPr lang="de-DE" sz="2000" b="0" i="0" smtClean="0">
+                            <a:latin typeface="Cambria Math" panose="02040503050406030204" pitchFamily="18" charset="0"/>
                             <a:cs typeface="Calibri" panose="020F0502020204030204" pitchFamily="34" charset="0"/>
                           </a:rPr>
                           <m:t> </m:t>
@@ -17286,12 +17306,14 @@
                             <m:sty m:val="p"/>
                           </m:rPr>
                           <a:rPr lang="de-DE" sz="2000" b="0" i="0" smtClean="0">
+                            <a:latin typeface="Cambria Math" panose="02040503050406030204" pitchFamily="18" charset="0"/>
                             <a:cs typeface="Calibri" panose="020F0502020204030204" pitchFamily="34" charset="0"/>
                           </a:rPr>
                           <m:t>of</m:t>
                         </m:r>
                         <m:r>
                           <a:rPr lang="de-DE" sz="2000" b="0" i="0" smtClean="0">
+                            <a:latin typeface="Cambria Math" panose="02040503050406030204" pitchFamily="18" charset="0"/>
                             <a:cs typeface="Calibri" panose="020F0502020204030204" pitchFamily="34" charset="0"/>
                           </a:rPr>
                           <m:t> </m:t>
@@ -17301,12 +17323,14 @@
                             <m:sty m:val="p"/>
                           </m:rPr>
                           <a:rPr lang="de-DE" sz="2000" b="0" i="0" smtClean="0">
+                            <a:latin typeface="Cambria Math" panose="02040503050406030204" pitchFamily="18" charset="0"/>
                             <a:cs typeface="Calibri" panose="020F0502020204030204" pitchFamily="34" charset="0"/>
                           </a:rPr>
                           <m:t>tag</m:t>
                         </m:r>
                         <m:r>
                           <a:rPr lang="de-DE" sz="2000" b="0" i="1" baseline="-25000" smtClean="0">
+                            <a:latin typeface="Cambria Math" panose="02040503050406030204" pitchFamily="18" charset="0"/>
                             <a:cs typeface="Calibri" panose="020F0502020204030204" pitchFamily="34" charset="0"/>
                           </a:rPr>
                           <m:t>2</m:t>
@@ -17356,7 +17380,7 @@
             </p:txBody>
           </p:sp>
         </mc:Choice>
-        <mc:Fallback>
+        <mc:Fallback xmlns="">
           <p:sp>
             <p:nvSpPr>
               <p:cNvPr id="7" name="Inhaltsplatzhalter 3">
@@ -17410,11 +17434,11 @@
   <p:clrMapOvr>
     <a:masterClrMapping/>
   </p:clrMapOvr>
-  <mc:AlternateContent xmlns:mc="http://schemas.openxmlformats.org/markup-compatibility/2006">
-    <mc:Choice xmlns:p14="http://schemas.microsoft.com/office/powerpoint/2010/main" Requires="p14">
+  <mc:AlternateContent xmlns:mc="http://schemas.openxmlformats.org/markup-compatibility/2006" xmlns:p14="http://schemas.microsoft.com/office/powerpoint/2010/main">
+    <mc:Choice Requires="p14">
       <p:transition p14:dur="0" advTm="2361"/>
     </mc:Choice>
-    <mc:Fallback>
+    <mc:Fallback xmlns="">
       <p:transition advTm="2361"/>
     </mc:Fallback>
   </mc:AlternateContent>
@@ -17646,11 +17670,11 @@
   <p:clrMapOvr>
     <a:masterClrMapping/>
   </p:clrMapOvr>
-  <mc:AlternateContent xmlns:mc="http://schemas.openxmlformats.org/markup-compatibility/2006">
-    <mc:Choice xmlns:p14="http://schemas.microsoft.com/office/powerpoint/2010/main" Requires="p14">
+  <mc:AlternateContent xmlns:mc="http://schemas.openxmlformats.org/markup-compatibility/2006" xmlns:p14="http://schemas.microsoft.com/office/powerpoint/2010/main">
+    <mc:Choice Requires="p14">
       <p:transition p14:dur="0" advTm="2361"/>
     </mc:Choice>
-    <mc:Fallback>
+    <mc:Fallback xmlns="">
       <p:transition advTm="2361"/>
     </mc:Fallback>
   </mc:AlternateContent>
@@ -17903,11 +17927,11 @@
   <p:clrMapOvr>
     <a:masterClrMapping/>
   </p:clrMapOvr>
-  <mc:AlternateContent xmlns:mc="http://schemas.openxmlformats.org/markup-compatibility/2006">
-    <mc:Choice xmlns:p14="http://schemas.microsoft.com/office/powerpoint/2010/main" Requires="p14">
+  <mc:AlternateContent xmlns:mc="http://schemas.openxmlformats.org/markup-compatibility/2006" xmlns:p14="http://schemas.microsoft.com/office/powerpoint/2010/main">
+    <mc:Choice Requires="p14">
       <p:transition p14:dur="0" advTm="2361"/>
     </mc:Choice>
-    <mc:Fallback>
+    <mc:Fallback xmlns="">
       <p:transition advTm="2361"/>
     </mc:Fallback>
   </mc:AlternateContent>
@@ -17933,6 +17957,1531 @@
       </p:grpSpPr>
       <p:sp>
         <p:nvSpPr>
+          <p:cNvPr id="5" name="Foliennummernplatzhalter 4">
+            <a:extLst>
+              <a:ext uri="{FF2B5EF4-FFF2-40B4-BE49-F238E27FC236}">
+                <a16:creationId xmlns:a16="http://schemas.microsoft.com/office/drawing/2014/main" id="{178677E2-3871-4EB1-9638-C60EABEB7788}"/>
+              </a:ext>
+            </a:extLst>
+          </p:cNvPr>
+          <p:cNvSpPr>
+            <a:spLocks noGrp="1"/>
+          </p:cNvSpPr>
+          <p:nvPr>
+            <p:ph type="sldNum" sz="quarter" idx="12"/>
+          </p:nvPr>
+        </p:nvSpPr>
+        <p:spPr/>
+        <p:txBody>
+          <a:bodyPr/>
+          <a:lstStyle/>
+          <a:p>
+            <a:fld id="{54518C2F-5E54-4CF8-B37A-4631A050CED9}" type="slidenum">
+              <a:rPr lang="de-DE" smtClean="0"/>
+              <a:pPr/>
+              <a:t>7</a:t>
+            </a:fld>
+            <a:endParaRPr lang="de-DE" dirty="0">
+              <a:solidFill>
+                <a:schemeClr val="bg1"/>
+              </a:solidFill>
+            </a:endParaRPr>
+          </a:p>
+        </p:txBody>
+      </p:sp>
+      <p:sp>
+        <p:nvSpPr>
+          <p:cNvPr id="6" name="Fußzeilenplatzhalter 5">
+            <a:extLst>
+              <a:ext uri="{FF2B5EF4-FFF2-40B4-BE49-F238E27FC236}">
+                <a16:creationId xmlns:a16="http://schemas.microsoft.com/office/drawing/2014/main" id="{8C3F8C20-2557-41C5-939A-FD6E581E5742}"/>
+              </a:ext>
+            </a:extLst>
+          </p:cNvPr>
+          <p:cNvSpPr>
+            <a:spLocks noGrp="1"/>
+          </p:cNvSpPr>
+          <p:nvPr>
+            <p:ph type="ftr" sz="quarter" idx="11"/>
+          </p:nvPr>
+        </p:nvSpPr>
+        <p:spPr>
+          <a:xfrm>
+            <a:off x="623362" y="6659954"/>
+            <a:ext cx="7460324" cy="164212"/>
+          </a:xfrm>
+        </p:spPr>
+        <p:txBody>
+          <a:bodyPr/>
+          <a:lstStyle/>
+          <a:p>
+            <a:pPr algn="ctr"/>
+            <a:r>
+              <a:rPr lang="de-DE" dirty="0"/>
+              <a:t>Emotion Analysis | ML-</a:t>
+            </a:r>
+            <a:r>
+              <a:rPr lang="de-DE" dirty="0" err="1"/>
+              <a:t>based</a:t>
+            </a:r>
+            <a:r>
+              <a:rPr lang="de-DE" dirty="0"/>
+              <a:t> Emotion </a:t>
+            </a:r>
+            <a:r>
+              <a:rPr lang="de-DE" dirty="0" err="1"/>
+              <a:t>Role</a:t>
+            </a:r>
+            <a:r>
+              <a:rPr lang="de-DE" dirty="0"/>
+              <a:t> </a:t>
+            </a:r>
+            <a:r>
+              <a:rPr lang="de-DE" dirty="0" err="1"/>
+              <a:t>Labelling</a:t>
+            </a:r>
+            <a:r>
+              <a:rPr lang="de-DE" dirty="0"/>
+              <a:t>		           Felix Bühler | Max Wegge | Carlotta Quensel</a:t>
+            </a:r>
+          </a:p>
+        </p:txBody>
+      </p:sp>
+      <p:sp>
+        <p:nvSpPr>
+          <p:cNvPr id="8" name="Titel 1">
+            <a:extLst>
+              <a:ext uri="{FF2B5EF4-FFF2-40B4-BE49-F238E27FC236}">
+                <a16:creationId xmlns:a16="http://schemas.microsoft.com/office/drawing/2014/main" id="{7A04DA2A-1F61-41DE-BA08-44B7F1730FE9}"/>
+              </a:ext>
+            </a:extLst>
+          </p:cNvPr>
+          <p:cNvSpPr txBox="1">
+            <a:spLocks/>
+          </p:cNvSpPr>
+          <p:nvPr/>
+        </p:nvSpPr>
+        <p:spPr>
+          <a:xfrm>
+            <a:off x="624422" y="236155"/>
+            <a:ext cx="10993967" cy="336000"/>
+          </a:xfrm>
+          <a:prstGeom prst="rect">
+            <a:avLst/>
+          </a:prstGeom>
+        </p:spPr>
+        <p:txBody>
+          <a:bodyPr vert="horz" lIns="0" tIns="0" rIns="0" bIns="0" rtlCol="0" anchor="t">
+            <a:noAutofit/>
+          </a:bodyPr>
+          <a:lstStyle>
+            <a:lvl1pPr algn="l" defTabSz="914368" rtl="0" eaLnBrk="1" latinLnBrk="0" hangingPunct="1">
+              <a:lnSpc>
+                <a:spcPct val="90000"/>
+              </a:lnSpc>
+              <a:spcBef>
+                <a:spcPct val="0"/>
+              </a:spcBef>
+              <a:buNone/>
+              <a:defRPr sz="2800" b="1" kern="1200">
+                <a:solidFill>
+                  <a:schemeClr val="tx1"/>
+                </a:solidFill>
+                <a:latin typeface="+mj-lt"/>
+                <a:ea typeface="+mj-ea"/>
+                <a:cs typeface="+mj-cs"/>
+              </a:defRPr>
+            </a:lvl1pPr>
+          </a:lstStyle>
+          <a:p>
+            <a:r>
+              <a:rPr lang="de-DE" dirty="0" err="1">
+                <a:latin typeface="Calibri" panose="020F0502020204030204" pitchFamily="34" charset="0"/>
+                <a:cs typeface="Calibri" panose="020F0502020204030204" pitchFamily="34" charset="0"/>
+              </a:rPr>
+              <a:t>evaluation</a:t>
+            </a:r>
+            <a:br>
+              <a:rPr lang="de-DE" dirty="0">
+                <a:latin typeface="Calibri" panose="020F0502020204030204" pitchFamily="34" charset="0"/>
+                <a:cs typeface="Calibri" panose="020F0502020204030204" pitchFamily="34" charset="0"/>
+              </a:rPr>
+            </a:br>
+            <a:r>
+              <a:rPr lang="en-US" b="0" dirty="0">
+                <a:latin typeface="Calibri" panose="020F0502020204030204" pitchFamily="34" charset="0"/>
+                <a:cs typeface="Calibri" panose="020F0502020204030204" pitchFamily="34" charset="0"/>
+              </a:rPr>
+              <a:t>Hidden Markov</a:t>
+            </a:r>
+          </a:p>
+        </p:txBody>
+      </p:sp>
+      <p:sp>
+        <p:nvSpPr>
+          <p:cNvPr id="7" name="Inhaltsplatzhalter 3">
+            <a:extLst>
+              <a:ext uri="{FF2B5EF4-FFF2-40B4-BE49-F238E27FC236}">
+                <a16:creationId xmlns:a16="http://schemas.microsoft.com/office/drawing/2014/main" id="{514DE648-80A0-4EF3-AB1B-044DAFBD5493}"/>
+              </a:ext>
+            </a:extLst>
+          </p:cNvPr>
+          <p:cNvSpPr>
+            <a:spLocks noGrp="1"/>
+          </p:cNvSpPr>
+          <p:nvPr>
+            <p:ph sz="half" idx="1"/>
+          </p:nvPr>
+        </p:nvSpPr>
+        <p:spPr>
+          <a:xfrm>
+            <a:off x="622301" y="1508085"/>
+            <a:ext cx="2970644" cy="2321845"/>
+          </a:xfrm>
+        </p:spPr>
+        <p:txBody>
+          <a:bodyPr anchor="t" anchorCtr="0"/>
+          <a:lstStyle/>
+          <a:p>
+            <a:r>
+              <a:rPr lang="en-GB" sz="2000" dirty="0">
+                <a:cs typeface="Calibri" panose="020F0502020204030204" pitchFamily="34" charset="0"/>
+              </a:rPr>
+              <a:t>trained on Reman</a:t>
+            </a:r>
+          </a:p>
+        </p:txBody>
+      </p:sp>
+      <p:sp>
+        <p:nvSpPr>
+          <p:cNvPr id="2" name="Textfeld 1">
+            <a:extLst>
+              <a:ext uri="{FF2B5EF4-FFF2-40B4-BE49-F238E27FC236}">
+                <a16:creationId xmlns:a16="http://schemas.microsoft.com/office/drawing/2014/main" id="{D40D6D55-9CA3-4770-BFF2-40B2964F611B}"/>
+              </a:ext>
+            </a:extLst>
+          </p:cNvPr>
+          <p:cNvSpPr txBox="1"/>
+          <p:nvPr/>
+        </p:nvSpPr>
+        <p:spPr>
+          <a:xfrm>
+            <a:off x="3982605" y="1510643"/>
+            <a:ext cx="3620654" cy="307777"/>
+          </a:xfrm>
+          <a:prstGeom prst="rect">
+            <a:avLst/>
+          </a:prstGeom>
+          <a:noFill/>
+        </p:spPr>
+        <p:txBody>
+          <a:bodyPr wrap="square" lIns="0" tIns="0" rIns="0" bIns="0" rtlCol="0">
+            <a:spAutoFit/>
+          </a:bodyPr>
+          <a:lstStyle/>
+          <a:p>
+            <a:pPr marL="342900" indent="-342900">
+              <a:buClr>
+                <a:schemeClr val="accent1"/>
+              </a:buClr>
+              <a:buFont typeface="Wingdings" panose="05000000000000000000" pitchFamily="2" charset="2"/>
+              <a:buChar char="§"/>
+            </a:pPr>
+            <a:r>
+              <a:rPr lang="en-GB" sz="2000" dirty="0">
+                <a:cs typeface="Calibri" panose="020F0502020204030204" pitchFamily="34" charset="0"/>
+              </a:rPr>
+              <a:t>trained on GNE</a:t>
+            </a:r>
+          </a:p>
+        </p:txBody>
+      </p:sp>
+      <p:sp>
+        <p:nvSpPr>
+          <p:cNvPr id="9" name="Textfeld 8">
+            <a:extLst>
+              <a:ext uri="{FF2B5EF4-FFF2-40B4-BE49-F238E27FC236}">
+                <a16:creationId xmlns:a16="http://schemas.microsoft.com/office/drawing/2014/main" id="{CBA46390-3C0B-4E00-9CCA-E2AA5DF85B59}"/>
+              </a:ext>
+            </a:extLst>
+          </p:cNvPr>
+          <p:cNvSpPr txBox="1"/>
+          <p:nvPr/>
+        </p:nvSpPr>
+        <p:spPr>
+          <a:xfrm>
+            <a:off x="7342909" y="1508085"/>
+            <a:ext cx="3851564" cy="307777"/>
+          </a:xfrm>
+          <a:prstGeom prst="rect">
+            <a:avLst/>
+          </a:prstGeom>
+          <a:noFill/>
+        </p:spPr>
+        <p:txBody>
+          <a:bodyPr wrap="square" lIns="0" tIns="0" rIns="0" bIns="0" rtlCol="0">
+            <a:spAutoFit/>
+          </a:bodyPr>
+          <a:lstStyle/>
+          <a:p>
+            <a:pPr marL="342900" indent="-342900">
+              <a:buClr>
+                <a:schemeClr val="accent1"/>
+              </a:buClr>
+              <a:buFont typeface="Wingdings" panose="05000000000000000000" pitchFamily="2" charset="2"/>
+              <a:buChar char="§"/>
+            </a:pPr>
+            <a:r>
+              <a:rPr lang="en-GB" sz="2000" dirty="0">
+                <a:cs typeface="Calibri" panose="020F0502020204030204" pitchFamily="34" charset="0"/>
+              </a:rPr>
+              <a:t>trained on Electoral Tweets</a:t>
+            </a:r>
+          </a:p>
+        </p:txBody>
+      </p:sp>
+      <p:graphicFrame>
+        <p:nvGraphicFramePr>
+          <p:cNvPr id="3" name="Tabelle 3">
+            <a:extLst>
+              <a:ext uri="{FF2B5EF4-FFF2-40B4-BE49-F238E27FC236}">
+                <a16:creationId xmlns:a16="http://schemas.microsoft.com/office/drawing/2014/main" id="{3AAA962F-7B79-4444-A453-666B6FA2B60E}"/>
+              </a:ext>
+            </a:extLst>
+          </p:cNvPr>
+          <p:cNvGraphicFramePr>
+            <a:graphicFrameLocks noGrp="1"/>
+          </p:cNvGraphicFramePr>
+          <p:nvPr>
+            <p:extLst>
+              <p:ext uri="{D42A27DB-BD31-4B8C-83A1-F6EECF244321}">
+                <p14:modId xmlns:p14="http://schemas.microsoft.com/office/powerpoint/2010/main" val="476024686"/>
+              </p:ext>
+            </p:extLst>
+          </p:nvPr>
+        </p:nvGraphicFramePr>
+        <p:xfrm>
+          <a:off x="4208895" y="1915551"/>
+          <a:ext cx="2778414" cy="1112520"/>
+        </p:xfrm>
+        <a:graphic>
+          <a:graphicData uri="http://schemas.openxmlformats.org/drawingml/2006/table">
+            <a:tbl>
+              <a:tblPr firstRow="1" firstCol="1" bandRow="1">
+                <a:tableStyleId>{5C22544A-7EE6-4342-B048-85BDC9FD1C3A}</a:tableStyleId>
+              </a:tblPr>
+              <a:tblGrid>
+                <a:gridCol w="977322">
+                  <a:extLst>
+                    <a:ext uri="{9D8B030D-6E8A-4147-A177-3AD203B41FA5}">
+                      <a16:colId xmlns:a16="http://schemas.microsoft.com/office/drawing/2014/main" val="2782175686"/>
+                    </a:ext>
+                  </a:extLst>
+                </a:gridCol>
+                <a:gridCol w="822037">
+                  <a:extLst>
+                    <a:ext uri="{9D8B030D-6E8A-4147-A177-3AD203B41FA5}">
+                      <a16:colId xmlns:a16="http://schemas.microsoft.com/office/drawing/2014/main" val="1476355297"/>
+                    </a:ext>
+                  </a:extLst>
+                </a:gridCol>
+                <a:gridCol w="979055">
+                  <a:extLst>
+                    <a:ext uri="{9D8B030D-6E8A-4147-A177-3AD203B41FA5}">
+                      <a16:colId xmlns:a16="http://schemas.microsoft.com/office/drawing/2014/main" val="2412977226"/>
+                    </a:ext>
+                  </a:extLst>
+                </a:gridCol>
+              </a:tblGrid>
+              <a:tr h="370840">
+                <a:tc>
+                  <a:txBody>
+                    <a:bodyPr/>
+                    <a:lstStyle/>
+                    <a:p>
+                      <a:r>
+                        <a:rPr lang="de-DE" b="0" baseline="-25000" dirty="0" err="1"/>
+                        <a:t>pred</a:t>
+                      </a:r>
+                      <a:r>
+                        <a:rPr lang="de-DE" b="0" dirty="0"/>
+                        <a:t>   </a:t>
+                      </a:r>
+                      <a:r>
+                        <a:rPr lang="de-DE" b="0" baseline="30000" dirty="0" err="1"/>
+                        <a:t>gold</a:t>
+                      </a:r>
+                      <a:endParaRPr lang="de-DE" b="0" baseline="30000" dirty="0"/>
+                    </a:p>
+                  </a:txBody>
+                  <a:tcPr>
+                    <a:lnTlToBr w="12700" cap="flat" cmpd="sng" algn="ctr">
+                      <a:solidFill>
+                        <a:schemeClr val="bg1"/>
+                      </a:solidFill>
+                      <a:prstDash val="solid"/>
+                      <a:round/>
+                      <a:headEnd type="none" w="med" len="med"/>
+                      <a:tailEnd type="none" w="med" len="med"/>
+                    </a:lnTlToBr>
+                  </a:tcPr>
+                </a:tc>
+                <a:tc>
+                  <a:txBody>
+                    <a:bodyPr/>
+                    <a:lstStyle/>
+                    <a:p>
+                      <a:r>
+                        <a:rPr lang="de-DE" b="0" dirty="0" err="1"/>
+                        <a:t>target</a:t>
+                      </a:r>
+                      <a:endParaRPr lang="de-DE" b="0" dirty="0"/>
+                    </a:p>
+                  </a:txBody>
+                  <a:tcPr/>
+                </a:tc>
+                <a:tc>
+                  <a:txBody>
+                    <a:bodyPr/>
+                    <a:lstStyle/>
+                    <a:p>
+                      <a:r>
+                        <a:rPr lang="de-DE" b="0" dirty="0"/>
+                        <a:t>outside</a:t>
+                      </a:r>
+                    </a:p>
+                  </a:txBody>
+                  <a:tcPr/>
+                </a:tc>
+                <a:extLst>
+                  <a:ext uri="{0D108BD9-81ED-4DB2-BD59-A6C34878D82A}">
+                    <a16:rowId xmlns:a16="http://schemas.microsoft.com/office/drawing/2014/main" val="233355792"/>
+                  </a:ext>
+                </a:extLst>
+              </a:tr>
+              <a:tr h="370840">
+                <a:tc>
+                  <a:txBody>
+                    <a:bodyPr/>
+                    <a:lstStyle/>
+                    <a:p>
+                      <a:r>
+                        <a:rPr lang="de-DE" b="0" dirty="0" err="1"/>
+                        <a:t>target</a:t>
+                      </a:r>
+                      <a:endParaRPr lang="de-DE" b="0" dirty="0"/>
+                    </a:p>
+                  </a:txBody>
+                  <a:tcPr/>
+                </a:tc>
+                <a:tc>
+                  <a:txBody>
+                    <a:bodyPr/>
+                    <a:lstStyle/>
+                    <a:p>
+                      <a:r>
+                        <a:rPr lang="de-DE" dirty="0"/>
+                        <a:t>2132</a:t>
+                      </a:r>
+                    </a:p>
+                  </a:txBody>
+                  <a:tcPr/>
+                </a:tc>
+                <a:tc>
+                  <a:txBody>
+                    <a:bodyPr/>
+                    <a:lstStyle/>
+                    <a:p>
+                      <a:r>
+                        <a:rPr lang="de-DE" dirty="0"/>
+                        <a:t>5788</a:t>
+                      </a:r>
+                    </a:p>
+                  </a:txBody>
+                  <a:tcPr/>
+                </a:tc>
+                <a:extLst>
+                  <a:ext uri="{0D108BD9-81ED-4DB2-BD59-A6C34878D82A}">
+                    <a16:rowId xmlns:a16="http://schemas.microsoft.com/office/drawing/2014/main" val="1523878673"/>
+                  </a:ext>
+                </a:extLst>
+              </a:tr>
+              <a:tr h="370840">
+                <a:tc>
+                  <a:txBody>
+                    <a:bodyPr/>
+                    <a:lstStyle/>
+                    <a:p>
+                      <a:r>
+                        <a:rPr lang="de-DE" b="0" dirty="0"/>
+                        <a:t>outside</a:t>
+                      </a:r>
+                    </a:p>
+                  </a:txBody>
+                  <a:tcPr/>
+                </a:tc>
+                <a:tc>
+                  <a:txBody>
+                    <a:bodyPr/>
+                    <a:lstStyle/>
+                    <a:p>
+                      <a:r>
+                        <a:rPr lang="de-DE" dirty="0"/>
+                        <a:t>1559</a:t>
+                      </a:r>
+                    </a:p>
+                  </a:txBody>
+                  <a:tcPr/>
+                </a:tc>
+                <a:tc>
+                  <a:txBody>
+                    <a:bodyPr/>
+                    <a:lstStyle/>
+                    <a:p>
+                      <a:r>
+                        <a:rPr lang="de-DE" dirty="0"/>
+                        <a:t>–</a:t>
+                      </a:r>
+                    </a:p>
+                  </a:txBody>
+                  <a:tcPr/>
+                </a:tc>
+                <a:extLst>
+                  <a:ext uri="{0D108BD9-81ED-4DB2-BD59-A6C34878D82A}">
+                    <a16:rowId xmlns:a16="http://schemas.microsoft.com/office/drawing/2014/main" val="2639564344"/>
+                  </a:ext>
+                </a:extLst>
+              </a:tr>
+            </a:tbl>
+          </a:graphicData>
+        </a:graphic>
+      </p:graphicFrame>
+      <p:graphicFrame>
+        <p:nvGraphicFramePr>
+          <p:cNvPr id="10" name="Tabelle 3">
+            <a:extLst>
+              <a:ext uri="{FF2B5EF4-FFF2-40B4-BE49-F238E27FC236}">
+                <a16:creationId xmlns:a16="http://schemas.microsoft.com/office/drawing/2014/main" id="{15943C88-BF30-4E1B-8580-1679D0586CA4}"/>
+              </a:ext>
+            </a:extLst>
+          </p:cNvPr>
+          <p:cNvGraphicFramePr>
+            <a:graphicFrameLocks noGrp="1"/>
+          </p:cNvGraphicFramePr>
+          <p:nvPr>
+            <p:extLst>
+              <p:ext uri="{D42A27DB-BD31-4B8C-83A1-F6EECF244321}">
+                <p14:modId xmlns:p14="http://schemas.microsoft.com/office/powerpoint/2010/main" val="3489520221"/>
+              </p:ext>
+            </p:extLst>
+          </p:nvPr>
+        </p:nvGraphicFramePr>
+        <p:xfrm>
+          <a:off x="7603259" y="1915551"/>
+          <a:ext cx="2778414" cy="1112520"/>
+        </p:xfrm>
+        <a:graphic>
+          <a:graphicData uri="http://schemas.openxmlformats.org/drawingml/2006/table">
+            <a:tbl>
+              <a:tblPr firstRow="1" firstCol="1" bandRow="1">
+                <a:tableStyleId>{5C22544A-7EE6-4342-B048-85BDC9FD1C3A}</a:tableStyleId>
+              </a:tblPr>
+              <a:tblGrid>
+                <a:gridCol w="968086">
+                  <a:extLst>
+                    <a:ext uri="{9D8B030D-6E8A-4147-A177-3AD203B41FA5}">
+                      <a16:colId xmlns:a16="http://schemas.microsoft.com/office/drawing/2014/main" val="2782175686"/>
+                    </a:ext>
+                  </a:extLst>
+                </a:gridCol>
+                <a:gridCol w="831273">
+                  <a:extLst>
+                    <a:ext uri="{9D8B030D-6E8A-4147-A177-3AD203B41FA5}">
+                      <a16:colId xmlns:a16="http://schemas.microsoft.com/office/drawing/2014/main" val="1476355297"/>
+                    </a:ext>
+                  </a:extLst>
+                </a:gridCol>
+                <a:gridCol w="979055">
+                  <a:extLst>
+                    <a:ext uri="{9D8B030D-6E8A-4147-A177-3AD203B41FA5}">
+                      <a16:colId xmlns:a16="http://schemas.microsoft.com/office/drawing/2014/main" val="2412977226"/>
+                    </a:ext>
+                  </a:extLst>
+                </a:gridCol>
+              </a:tblGrid>
+              <a:tr h="370840">
+                <a:tc>
+                  <a:txBody>
+                    <a:bodyPr/>
+                    <a:lstStyle/>
+                    <a:p>
+                      <a:r>
+                        <a:rPr lang="de-DE" b="0" baseline="-25000" dirty="0" err="1"/>
+                        <a:t>pred</a:t>
+                      </a:r>
+                      <a:r>
+                        <a:rPr lang="de-DE" b="0" dirty="0"/>
+                        <a:t>   </a:t>
+                      </a:r>
+                      <a:r>
+                        <a:rPr lang="de-DE" b="0" baseline="30000" dirty="0" err="1"/>
+                        <a:t>gold</a:t>
+                      </a:r>
+                      <a:endParaRPr lang="de-DE" b="0" baseline="30000" dirty="0"/>
+                    </a:p>
+                  </a:txBody>
+                  <a:tcPr>
+                    <a:lnTlToBr w="12700" cap="flat" cmpd="sng" algn="ctr">
+                      <a:solidFill>
+                        <a:schemeClr val="bg1"/>
+                      </a:solidFill>
+                      <a:prstDash val="solid"/>
+                      <a:round/>
+                      <a:headEnd type="none" w="med" len="med"/>
+                      <a:tailEnd type="none" w="med" len="med"/>
+                    </a:lnTlToBr>
+                  </a:tcPr>
+                </a:tc>
+                <a:tc>
+                  <a:txBody>
+                    <a:bodyPr/>
+                    <a:lstStyle/>
+                    <a:p>
+                      <a:r>
+                        <a:rPr lang="de-DE" b="0" dirty="0" err="1"/>
+                        <a:t>target</a:t>
+                      </a:r>
+                      <a:endParaRPr lang="de-DE" b="0" dirty="0"/>
+                    </a:p>
+                  </a:txBody>
+                  <a:tcPr/>
+                </a:tc>
+                <a:tc>
+                  <a:txBody>
+                    <a:bodyPr/>
+                    <a:lstStyle/>
+                    <a:p>
+                      <a:r>
+                        <a:rPr lang="de-DE" b="0" dirty="0"/>
+                        <a:t>outside</a:t>
+                      </a:r>
+                    </a:p>
+                  </a:txBody>
+                  <a:tcPr/>
+                </a:tc>
+                <a:extLst>
+                  <a:ext uri="{0D108BD9-81ED-4DB2-BD59-A6C34878D82A}">
+                    <a16:rowId xmlns:a16="http://schemas.microsoft.com/office/drawing/2014/main" val="233355792"/>
+                  </a:ext>
+                </a:extLst>
+              </a:tr>
+              <a:tr h="370840">
+                <a:tc>
+                  <a:txBody>
+                    <a:bodyPr/>
+                    <a:lstStyle/>
+                    <a:p>
+                      <a:r>
+                        <a:rPr lang="de-DE" b="0" dirty="0" err="1"/>
+                        <a:t>target</a:t>
+                      </a:r>
+                      <a:endParaRPr lang="de-DE" b="0" dirty="0"/>
+                    </a:p>
+                  </a:txBody>
+                  <a:tcPr/>
+                </a:tc>
+                <a:tc>
+                  <a:txBody>
+                    <a:bodyPr/>
+                    <a:lstStyle/>
+                    <a:p>
+                      <a:r>
+                        <a:rPr lang="de-DE" dirty="0"/>
+                        <a:t>4365</a:t>
+                      </a:r>
+                    </a:p>
+                  </a:txBody>
+                  <a:tcPr/>
+                </a:tc>
+                <a:tc>
+                  <a:txBody>
+                    <a:bodyPr/>
+                    <a:lstStyle/>
+                    <a:p>
+                      <a:r>
+                        <a:rPr lang="de-DE" dirty="0"/>
+                        <a:t>11739</a:t>
+                      </a:r>
+                    </a:p>
+                  </a:txBody>
+                  <a:tcPr/>
+                </a:tc>
+                <a:extLst>
+                  <a:ext uri="{0D108BD9-81ED-4DB2-BD59-A6C34878D82A}">
+                    <a16:rowId xmlns:a16="http://schemas.microsoft.com/office/drawing/2014/main" val="1523878673"/>
+                  </a:ext>
+                </a:extLst>
+              </a:tr>
+              <a:tr h="370840">
+                <a:tc>
+                  <a:txBody>
+                    <a:bodyPr/>
+                    <a:lstStyle/>
+                    <a:p>
+                      <a:r>
+                        <a:rPr lang="de-DE" b="0" dirty="0"/>
+                        <a:t>outside</a:t>
+                      </a:r>
+                    </a:p>
+                  </a:txBody>
+                  <a:tcPr/>
+                </a:tc>
+                <a:tc>
+                  <a:txBody>
+                    <a:bodyPr/>
+                    <a:lstStyle/>
+                    <a:p>
+                      <a:r>
+                        <a:rPr lang="de-DE" dirty="0"/>
+                        <a:t>1026</a:t>
+                      </a:r>
+                    </a:p>
+                  </a:txBody>
+                  <a:tcPr/>
+                </a:tc>
+                <a:tc>
+                  <a:txBody>
+                    <a:bodyPr/>
+                    <a:lstStyle/>
+                    <a:p>
+                      <a:r>
+                        <a:rPr lang="de-DE" dirty="0"/>
+                        <a:t>–</a:t>
+                      </a:r>
+                    </a:p>
+                  </a:txBody>
+                  <a:tcPr/>
+                </a:tc>
+                <a:extLst>
+                  <a:ext uri="{0D108BD9-81ED-4DB2-BD59-A6C34878D82A}">
+                    <a16:rowId xmlns:a16="http://schemas.microsoft.com/office/drawing/2014/main" val="2639564344"/>
+                  </a:ext>
+                </a:extLst>
+              </a:tr>
+            </a:tbl>
+          </a:graphicData>
+        </a:graphic>
+      </p:graphicFrame>
+      <p:graphicFrame>
+        <p:nvGraphicFramePr>
+          <p:cNvPr id="11" name="Tabelle 3">
+            <a:extLst>
+              <a:ext uri="{FF2B5EF4-FFF2-40B4-BE49-F238E27FC236}">
+                <a16:creationId xmlns:a16="http://schemas.microsoft.com/office/drawing/2014/main" id="{67C7BA17-211E-43DB-9742-003C49173103}"/>
+              </a:ext>
+            </a:extLst>
+          </p:cNvPr>
+          <p:cNvGraphicFramePr>
+            <a:graphicFrameLocks noGrp="1"/>
+          </p:cNvGraphicFramePr>
+          <p:nvPr>
+            <p:extLst>
+              <p:ext uri="{D42A27DB-BD31-4B8C-83A1-F6EECF244321}">
+                <p14:modId xmlns:p14="http://schemas.microsoft.com/office/powerpoint/2010/main" val="195448886"/>
+              </p:ext>
+            </p:extLst>
+          </p:nvPr>
+        </p:nvGraphicFramePr>
+        <p:xfrm>
+          <a:off x="873414" y="1915551"/>
+          <a:ext cx="2832100" cy="1112520"/>
+        </p:xfrm>
+        <a:graphic>
+          <a:graphicData uri="http://schemas.openxmlformats.org/drawingml/2006/table">
+            <a:tbl>
+              <a:tblPr firstRow="1" firstCol="1" bandRow="1">
+                <a:tableStyleId>{5C22544A-7EE6-4342-B048-85BDC9FD1C3A}</a:tableStyleId>
+              </a:tblPr>
+              <a:tblGrid>
+                <a:gridCol w="975590">
+                  <a:extLst>
+                    <a:ext uri="{9D8B030D-6E8A-4147-A177-3AD203B41FA5}">
+                      <a16:colId xmlns:a16="http://schemas.microsoft.com/office/drawing/2014/main" val="2782175686"/>
+                    </a:ext>
+                  </a:extLst>
+                </a:gridCol>
+                <a:gridCol w="803564">
+                  <a:extLst>
+                    <a:ext uri="{9D8B030D-6E8A-4147-A177-3AD203B41FA5}">
+                      <a16:colId xmlns:a16="http://schemas.microsoft.com/office/drawing/2014/main" val="1476355297"/>
+                    </a:ext>
+                  </a:extLst>
+                </a:gridCol>
+                <a:gridCol w="1052946">
+                  <a:extLst>
+                    <a:ext uri="{9D8B030D-6E8A-4147-A177-3AD203B41FA5}">
+                      <a16:colId xmlns:a16="http://schemas.microsoft.com/office/drawing/2014/main" val="2412977226"/>
+                    </a:ext>
+                  </a:extLst>
+                </a:gridCol>
+              </a:tblGrid>
+              <a:tr h="370840">
+                <a:tc>
+                  <a:txBody>
+                    <a:bodyPr/>
+                    <a:lstStyle/>
+                    <a:p>
+                      <a:r>
+                        <a:rPr lang="de-DE" b="0" baseline="-25000" dirty="0" err="1"/>
+                        <a:t>pred</a:t>
+                      </a:r>
+                      <a:r>
+                        <a:rPr lang="de-DE" b="0" dirty="0"/>
+                        <a:t>   </a:t>
+                      </a:r>
+                      <a:r>
+                        <a:rPr lang="de-DE" b="0" baseline="30000" dirty="0" err="1"/>
+                        <a:t>gold</a:t>
+                      </a:r>
+                      <a:endParaRPr lang="de-DE" b="0" baseline="30000" dirty="0"/>
+                    </a:p>
+                  </a:txBody>
+                  <a:tcPr>
+                    <a:lnTlToBr w="12700" cap="flat" cmpd="sng" algn="ctr">
+                      <a:solidFill>
+                        <a:schemeClr val="bg1"/>
+                      </a:solidFill>
+                      <a:prstDash val="solid"/>
+                      <a:round/>
+                      <a:headEnd type="none" w="med" len="med"/>
+                      <a:tailEnd type="none" w="med" len="med"/>
+                    </a:lnTlToBr>
+                  </a:tcPr>
+                </a:tc>
+                <a:tc>
+                  <a:txBody>
+                    <a:bodyPr/>
+                    <a:lstStyle/>
+                    <a:p>
+                      <a:r>
+                        <a:rPr lang="de-DE" b="0" dirty="0" err="1"/>
+                        <a:t>target</a:t>
+                      </a:r>
+                      <a:endParaRPr lang="de-DE" b="0" dirty="0"/>
+                    </a:p>
+                  </a:txBody>
+                  <a:tcPr/>
+                </a:tc>
+                <a:tc>
+                  <a:txBody>
+                    <a:bodyPr/>
+                    <a:lstStyle/>
+                    <a:p>
+                      <a:r>
+                        <a:rPr lang="de-DE" b="0" dirty="0"/>
+                        <a:t>outside</a:t>
+                      </a:r>
+                    </a:p>
+                  </a:txBody>
+                  <a:tcPr/>
+                </a:tc>
+                <a:extLst>
+                  <a:ext uri="{0D108BD9-81ED-4DB2-BD59-A6C34878D82A}">
+                    <a16:rowId xmlns:a16="http://schemas.microsoft.com/office/drawing/2014/main" val="233355792"/>
+                  </a:ext>
+                </a:extLst>
+              </a:tr>
+              <a:tr h="370840">
+                <a:tc>
+                  <a:txBody>
+                    <a:bodyPr/>
+                    <a:lstStyle/>
+                    <a:p>
+                      <a:r>
+                        <a:rPr lang="de-DE" b="0" dirty="0" err="1"/>
+                        <a:t>target</a:t>
+                      </a:r>
+                      <a:endParaRPr lang="de-DE" b="0" dirty="0"/>
+                    </a:p>
+                  </a:txBody>
+                  <a:tcPr/>
+                </a:tc>
+                <a:tc>
+                  <a:txBody>
+                    <a:bodyPr/>
+                    <a:lstStyle/>
+                    <a:p>
+                      <a:r>
+                        <a:rPr lang="de-DE" dirty="0"/>
+                        <a:t>6335</a:t>
+                      </a:r>
+                    </a:p>
+                  </a:txBody>
+                  <a:tcPr/>
+                </a:tc>
+                <a:tc>
+                  <a:txBody>
+                    <a:bodyPr/>
+                    <a:lstStyle/>
+                    <a:p>
+                      <a:r>
+                        <a:rPr lang="de-DE" dirty="0"/>
+                        <a:t>11087</a:t>
+                      </a:r>
+                    </a:p>
+                  </a:txBody>
+                  <a:tcPr/>
+                </a:tc>
+                <a:extLst>
+                  <a:ext uri="{0D108BD9-81ED-4DB2-BD59-A6C34878D82A}">
+                    <a16:rowId xmlns:a16="http://schemas.microsoft.com/office/drawing/2014/main" val="1523878673"/>
+                  </a:ext>
+                </a:extLst>
+              </a:tr>
+              <a:tr h="370840">
+                <a:tc>
+                  <a:txBody>
+                    <a:bodyPr/>
+                    <a:lstStyle/>
+                    <a:p>
+                      <a:r>
+                        <a:rPr lang="de-DE" b="0" dirty="0"/>
+                        <a:t>outside</a:t>
+                      </a:r>
+                    </a:p>
+                  </a:txBody>
+                  <a:tcPr/>
+                </a:tc>
+                <a:tc>
+                  <a:txBody>
+                    <a:bodyPr/>
+                    <a:lstStyle/>
+                    <a:p>
+                      <a:r>
+                        <a:rPr lang="de-DE" dirty="0"/>
+                        <a:t>1099</a:t>
+                      </a:r>
+                    </a:p>
+                  </a:txBody>
+                  <a:tcPr/>
+                </a:tc>
+                <a:tc>
+                  <a:txBody>
+                    <a:bodyPr/>
+                    <a:lstStyle/>
+                    <a:p>
+                      <a:r>
+                        <a:rPr lang="de-DE" dirty="0"/>
+                        <a:t>–</a:t>
+                      </a:r>
+                    </a:p>
+                  </a:txBody>
+                  <a:tcPr/>
+                </a:tc>
+                <a:extLst>
+                  <a:ext uri="{0D108BD9-81ED-4DB2-BD59-A6C34878D82A}">
+                    <a16:rowId xmlns:a16="http://schemas.microsoft.com/office/drawing/2014/main" val="2639564344"/>
+                  </a:ext>
+                </a:extLst>
+              </a:tr>
+            </a:tbl>
+          </a:graphicData>
+        </a:graphic>
+      </p:graphicFrame>
+      <p:sp>
+        <p:nvSpPr>
+          <p:cNvPr id="4" name="Textfeld 3">
+            <a:extLst>
+              <a:ext uri="{FF2B5EF4-FFF2-40B4-BE49-F238E27FC236}">
+                <a16:creationId xmlns:a16="http://schemas.microsoft.com/office/drawing/2014/main" id="{722EE7F2-EEFB-4CC5-9C10-7BBA9B3FFD7C}"/>
+              </a:ext>
+            </a:extLst>
+          </p:cNvPr>
+          <p:cNvSpPr txBox="1"/>
+          <p:nvPr/>
+        </p:nvSpPr>
+        <p:spPr>
+          <a:xfrm>
+            <a:off x="873414" y="3061287"/>
+            <a:ext cx="2832100" cy="738664"/>
+          </a:xfrm>
+          <a:prstGeom prst="rect">
+            <a:avLst/>
+          </a:prstGeom>
+          <a:noFill/>
+        </p:spPr>
+        <p:txBody>
+          <a:bodyPr wrap="square" lIns="0" tIns="0" rIns="0" bIns="0" rtlCol="0">
+            <a:spAutoFit/>
+          </a:bodyPr>
+          <a:lstStyle/>
+          <a:p>
+            <a:pPr marL="285750" indent="-285750">
+              <a:buClr>
+                <a:schemeClr val="accent1"/>
+              </a:buClr>
+              <a:buFont typeface="Wingdings" panose="05000000000000000000" pitchFamily="2" charset="2"/>
+              <a:buChar char="§"/>
+            </a:pPr>
+            <a:r>
+              <a:rPr lang="en-GB" sz="1600" dirty="0">
+                <a:cs typeface="Calibri" panose="020F0502020204030204" pitchFamily="34" charset="0"/>
+              </a:rPr>
+              <a:t>precision – 0.364</a:t>
+            </a:r>
+          </a:p>
+          <a:p>
+            <a:pPr marL="285750" indent="-285750">
+              <a:buClr>
+                <a:schemeClr val="accent1"/>
+              </a:buClr>
+              <a:buFont typeface="Wingdings" panose="05000000000000000000" pitchFamily="2" charset="2"/>
+              <a:buChar char="§"/>
+            </a:pPr>
+            <a:r>
+              <a:rPr lang="en-GB" sz="1600" dirty="0">
+                <a:cs typeface="Calibri" panose="020F0502020204030204" pitchFamily="34" charset="0"/>
+              </a:rPr>
+              <a:t>recall – 0.852</a:t>
+            </a:r>
+          </a:p>
+          <a:p>
+            <a:pPr marL="285750" indent="-285750">
+              <a:buClr>
+                <a:schemeClr val="accent1"/>
+              </a:buClr>
+              <a:buFont typeface="Wingdings" panose="05000000000000000000" pitchFamily="2" charset="2"/>
+              <a:buChar char="§"/>
+            </a:pPr>
+            <a:r>
+              <a:rPr lang="en-GB" sz="1600" dirty="0">
+                <a:cs typeface="Calibri" panose="020F0502020204030204" pitchFamily="34" charset="0"/>
+              </a:rPr>
+              <a:t>f – 0.510</a:t>
+            </a:r>
+          </a:p>
+        </p:txBody>
+      </p:sp>
+      <p:sp>
+        <p:nvSpPr>
+          <p:cNvPr id="12" name="Textfeld 11">
+            <a:extLst>
+              <a:ext uri="{FF2B5EF4-FFF2-40B4-BE49-F238E27FC236}">
+                <a16:creationId xmlns:a16="http://schemas.microsoft.com/office/drawing/2014/main" id="{64F9D40A-AE2A-47AA-A8B5-1DE1B8C22DC3}"/>
+              </a:ext>
+            </a:extLst>
+          </p:cNvPr>
+          <p:cNvSpPr txBox="1"/>
+          <p:nvPr/>
+        </p:nvSpPr>
+        <p:spPr>
+          <a:xfrm>
+            <a:off x="4208895" y="3028071"/>
+            <a:ext cx="2778414" cy="738664"/>
+          </a:xfrm>
+          <a:prstGeom prst="rect">
+            <a:avLst/>
+          </a:prstGeom>
+          <a:noFill/>
+        </p:spPr>
+        <p:txBody>
+          <a:bodyPr wrap="square" lIns="0" tIns="0" rIns="0" bIns="0" rtlCol="0">
+            <a:spAutoFit/>
+          </a:bodyPr>
+          <a:lstStyle/>
+          <a:p>
+            <a:pPr marL="285750" indent="-285750">
+              <a:buClr>
+                <a:schemeClr val="accent1"/>
+              </a:buClr>
+              <a:buFont typeface="Wingdings" panose="05000000000000000000" pitchFamily="2" charset="2"/>
+              <a:buChar char="§"/>
+            </a:pPr>
+            <a:r>
+              <a:rPr lang="en-GB" sz="1600" dirty="0">
+                <a:cs typeface="Calibri" panose="020F0502020204030204" pitchFamily="34" charset="0"/>
+              </a:rPr>
+              <a:t>precision – 0.269</a:t>
+            </a:r>
+          </a:p>
+          <a:p>
+            <a:pPr marL="285750" indent="-285750">
+              <a:buClr>
+                <a:schemeClr val="accent1"/>
+              </a:buClr>
+              <a:buFont typeface="Wingdings" panose="05000000000000000000" pitchFamily="2" charset="2"/>
+              <a:buChar char="§"/>
+            </a:pPr>
+            <a:r>
+              <a:rPr lang="en-GB" sz="1600" dirty="0">
+                <a:cs typeface="Calibri" panose="020F0502020204030204" pitchFamily="34" charset="0"/>
+              </a:rPr>
+              <a:t>recall – 0.578</a:t>
+            </a:r>
+          </a:p>
+          <a:p>
+            <a:pPr marL="285750" indent="-285750">
+              <a:buClr>
+                <a:schemeClr val="accent1"/>
+              </a:buClr>
+              <a:buFont typeface="Wingdings" panose="05000000000000000000" pitchFamily="2" charset="2"/>
+              <a:buChar char="§"/>
+            </a:pPr>
+            <a:r>
+              <a:rPr lang="en-GB" sz="1600" dirty="0">
+                <a:cs typeface="Calibri" panose="020F0502020204030204" pitchFamily="34" charset="0"/>
+              </a:rPr>
+              <a:t>f – 0.367</a:t>
+            </a:r>
+          </a:p>
+        </p:txBody>
+      </p:sp>
+      <p:sp>
+        <p:nvSpPr>
+          <p:cNvPr id="13" name="Textfeld 12">
+            <a:extLst>
+              <a:ext uri="{FF2B5EF4-FFF2-40B4-BE49-F238E27FC236}">
+                <a16:creationId xmlns:a16="http://schemas.microsoft.com/office/drawing/2014/main" id="{AE0B7145-FEDF-4201-B8CB-2B2816DF5B6D}"/>
+              </a:ext>
+            </a:extLst>
+          </p:cNvPr>
+          <p:cNvSpPr txBox="1"/>
+          <p:nvPr/>
+        </p:nvSpPr>
+        <p:spPr>
+          <a:xfrm>
+            <a:off x="7603259" y="3059668"/>
+            <a:ext cx="2778414" cy="738664"/>
+          </a:xfrm>
+          <a:prstGeom prst="rect">
+            <a:avLst/>
+          </a:prstGeom>
+          <a:noFill/>
+        </p:spPr>
+        <p:txBody>
+          <a:bodyPr wrap="square" lIns="0" tIns="0" rIns="0" bIns="0" rtlCol="0">
+            <a:spAutoFit/>
+          </a:bodyPr>
+          <a:lstStyle/>
+          <a:p>
+            <a:pPr marL="285750" indent="-285750">
+              <a:buClr>
+                <a:schemeClr val="accent1"/>
+              </a:buClr>
+              <a:buFont typeface="Wingdings" panose="05000000000000000000" pitchFamily="2" charset="2"/>
+              <a:buChar char="§"/>
+            </a:pPr>
+            <a:r>
+              <a:rPr lang="en-GB" sz="1600" dirty="0">
+                <a:cs typeface="Calibri" panose="020F0502020204030204" pitchFamily="34" charset="0"/>
+              </a:rPr>
+              <a:t>precision – 0.271</a:t>
+            </a:r>
+          </a:p>
+          <a:p>
+            <a:pPr marL="285750" indent="-285750">
+              <a:buClr>
+                <a:schemeClr val="accent1"/>
+              </a:buClr>
+              <a:buFont typeface="Wingdings" panose="05000000000000000000" pitchFamily="2" charset="2"/>
+              <a:buChar char="§"/>
+            </a:pPr>
+            <a:r>
+              <a:rPr lang="en-GB" sz="1600" dirty="0">
+                <a:cs typeface="Calibri" panose="020F0502020204030204" pitchFamily="34" charset="0"/>
+              </a:rPr>
+              <a:t>recall – 0.810</a:t>
+            </a:r>
+          </a:p>
+          <a:p>
+            <a:pPr marL="285750" indent="-285750">
+              <a:buClr>
+                <a:schemeClr val="accent1"/>
+              </a:buClr>
+              <a:buFont typeface="Wingdings" panose="05000000000000000000" pitchFamily="2" charset="2"/>
+              <a:buChar char="§"/>
+            </a:pPr>
+            <a:r>
+              <a:rPr lang="en-GB" sz="1600" dirty="0">
+                <a:cs typeface="Calibri" panose="020F0502020204030204" pitchFamily="34" charset="0"/>
+              </a:rPr>
+              <a:t>f – 0.406</a:t>
+            </a:r>
+          </a:p>
+        </p:txBody>
+      </p:sp>
+      <p:sp>
+        <p:nvSpPr>
+          <p:cNvPr id="14" name="Inhaltsplatzhalter 3">
+            <a:extLst>
+              <a:ext uri="{FF2B5EF4-FFF2-40B4-BE49-F238E27FC236}">
+                <a16:creationId xmlns:a16="http://schemas.microsoft.com/office/drawing/2014/main" id="{A8737DA7-8EC6-4E6E-8725-7A041D38E81B}"/>
+              </a:ext>
+            </a:extLst>
+          </p:cNvPr>
+          <p:cNvSpPr txBox="1">
+            <a:spLocks/>
+          </p:cNvSpPr>
+          <p:nvPr/>
+        </p:nvSpPr>
+        <p:spPr>
+          <a:xfrm>
+            <a:off x="622301" y="4188992"/>
+            <a:ext cx="9759372" cy="2184099"/>
+          </a:xfrm>
+          <a:prstGeom prst="rect">
+            <a:avLst/>
+          </a:prstGeom>
+        </p:spPr>
+        <p:txBody>
+          <a:bodyPr vert="horz" lIns="0" tIns="0" rIns="0" bIns="0" rtlCol="0" anchor="t" anchorCtr="0">
+            <a:noAutofit/>
+          </a:bodyPr>
+          <a:lstStyle>
+            <a:lvl1pPr marL="228592" indent="-228592" algn="l" defTabSz="914368" rtl="0" eaLnBrk="1" latinLnBrk="0" hangingPunct="1">
+              <a:lnSpc>
+                <a:spcPct val="120000"/>
+              </a:lnSpc>
+              <a:spcBef>
+                <a:spcPts val="1000"/>
+              </a:spcBef>
+              <a:buClr>
+                <a:schemeClr val="accent1"/>
+              </a:buClr>
+              <a:buSzPct val="110000"/>
+              <a:buFont typeface="Wingdings" panose="05000000000000000000" pitchFamily="2" charset="2"/>
+              <a:buChar char="§"/>
+              <a:defRPr sz="2200" kern="1200">
+                <a:solidFill>
+                  <a:schemeClr val="tx1"/>
+                </a:solidFill>
+                <a:latin typeface="+mn-lt"/>
+                <a:ea typeface="+mn-ea"/>
+                <a:cs typeface="+mn-cs"/>
+              </a:defRPr>
+            </a:lvl1pPr>
+            <a:lvl2pPr marL="480468" indent="-245525" algn="l" defTabSz="914368" rtl="0" eaLnBrk="1" latinLnBrk="0" hangingPunct="1">
+              <a:lnSpc>
+                <a:spcPct val="120000"/>
+              </a:lnSpc>
+              <a:spcBef>
+                <a:spcPts val="501"/>
+              </a:spcBef>
+              <a:buClr>
+                <a:schemeClr val="accent2"/>
+              </a:buClr>
+              <a:buSzPct val="105000"/>
+              <a:buFont typeface="Wingdings" panose="05000000000000000000" pitchFamily="2" charset="2"/>
+              <a:buChar char="§"/>
+              <a:defRPr sz="2200" kern="1200">
+                <a:solidFill>
+                  <a:schemeClr val="tx1"/>
+                </a:solidFill>
+                <a:latin typeface="+mn-lt"/>
+                <a:ea typeface="+mn-ea"/>
+                <a:cs typeface="+mn-cs"/>
+              </a:defRPr>
+            </a:lvl2pPr>
+            <a:lvl3pPr marL="715409" indent="-234943" algn="l" defTabSz="914368" rtl="0" eaLnBrk="1" latinLnBrk="0" hangingPunct="1">
+              <a:lnSpc>
+                <a:spcPct val="120000"/>
+              </a:lnSpc>
+              <a:spcBef>
+                <a:spcPts val="501"/>
+              </a:spcBef>
+              <a:buClr>
+                <a:schemeClr val="accent1"/>
+              </a:buClr>
+              <a:buFont typeface="Arial" panose="020B0604020202020204" pitchFamily="34" charset="0"/>
+              <a:buChar char="•"/>
+              <a:defRPr sz="2200" kern="1200">
+                <a:solidFill>
+                  <a:schemeClr val="tx1"/>
+                </a:solidFill>
+                <a:latin typeface="+mn-lt"/>
+                <a:ea typeface="+mn-ea"/>
+                <a:cs typeface="+mn-cs"/>
+              </a:defRPr>
+            </a:lvl3pPr>
+            <a:lvl4pPr marL="960933" indent="-245525" algn="l" defTabSz="914368" rtl="0" eaLnBrk="1" latinLnBrk="0" hangingPunct="1">
+              <a:lnSpc>
+                <a:spcPct val="120000"/>
+              </a:lnSpc>
+              <a:spcBef>
+                <a:spcPts val="501"/>
+              </a:spcBef>
+              <a:buClr>
+                <a:schemeClr val="accent2"/>
+              </a:buClr>
+              <a:buFont typeface="Arial" panose="020B0604020202020204" pitchFamily="34" charset="0"/>
+              <a:buChar char="•"/>
+              <a:defRPr sz="2200" kern="1200">
+                <a:solidFill>
+                  <a:schemeClr val="tx1"/>
+                </a:solidFill>
+                <a:latin typeface="+mn-lt"/>
+                <a:ea typeface="+mn-ea"/>
+                <a:cs typeface="+mn-cs"/>
+              </a:defRPr>
+            </a:lvl4pPr>
+            <a:lvl5pPr marL="1195875" indent="-234943" algn="l" defTabSz="914368" rtl="0" eaLnBrk="1" latinLnBrk="0" hangingPunct="1">
+              <a:lnSpc>
+                <a:spcPct val="120000"/>
+              </a:lnSpc>
+              <a:spcBef>
+                <a:spcPts val="501"/>
+              </a:spcBef>
+              <a:buClr>
+                <a:schemeClr val="accent1"/>
+              </a:buClr>
+              <a:buFont typeface="Arial" panose="020B0604020202020204" pitchFamily="34" charset="0"/>
+              <a:buChar char="•"/>
+              <a:defRPr sz="2200" kern="1200">
+                <a:solidFill>
+                  <a:schemeClr val="tx1"/>
+                </a:solidFill>
+                <a:latin typeface="+mn-lt"/>
+                <a:ea typeface="+mn-ea"/>
+                <a:cs typeface="+mn-cs"/>
+              </a:defRPr>
+            </a:lvl5pPr>
+            <a:lvl6pPr marL="2514512" indent="-228592" algn="l" defTabSz="914368" rtl="0" eaLnBrk="1" latinLnBrk="0" hangingPunct="1">
+              <a:lnSpc>
+                <a:spcPct val="90000"/>
+              </a:lnSpc>
+              <a:spcBef>
+                <a:spcPts val="501"/>
+              </a:spcBef>
+              <a:buFont typeface="Arial" panose="020B0604020202020204" pitchFamily="34" charset="0"/>
+              <a:buChar char="•"/>
+              <a:defRPr sz="1800" kern="1200">
+                <a:solidFill>
+                  <a:schemeClr val="tx1"/>
+                </a:solidFill>
+                <a:latin typeface="+mn-lt"/>
+                <a:ea typeface="+mn-ea"/>
+                <a:cs typeface="+mn-cs"/>
+              </a:defRPr>
+            </a:lvl6pPr>
+            <a:lvl7pPr marL="2971696" indent="-228592" algn="l" defTabSz="914368" rtl="0" eaLnBrk="1" latinLnBrk="0" hangingPunct="1">
+              <a:lnSpc>
+                <a:spcPct val="90000"/>
+              </a:lnSpc>
+              <a:spcBef>
+                <a:spcPts val="501"/>
+              </a:spcBef>
+              <a:buFont typeface="Arial" panose="020B0604020202020204" pitchFamily="34" charset="0"/>
+              <a:buChar char="•"/>
+              <a:defRPr sz="1800" kern="1200">
+                <a:solidFill>
+                  <a:schemeClr val="tx1"/>
+                </a:solidFill>
+                <a:latin typeface="+mn-lt"/>
+                <a:ea typeface="+mn-ea"/>
+                <a:cs typeface="+mn-cs"/>
+              </a:defRPr>
+            </a:lvl7pPr>
+            <a:lvl8pPr marL="3428880" indent="-228592" algn="l" defTabSz="914368" rtl="0" eaLnBrk="1" latinLnBrk="0" hangingPunct="1">
+              <a:lnSpc>
+                <a:spcPct val="90000"/>
+              </a:lnSpc>
+              <a:spcBef>
+                <a:spcPts val="501"/>
+              </a:spcBef>
+              <a:buFont typeface="Arial" panose="020B0604020202020204" pitchFamily="34" charset="0"/>
+              <a:buChar char="•"/>
+              <a:defRPr sz="1800" kern="1200">
+                <a:solidFill>
+                  <a:schemeClr val="tx1"/>
+                </a:solidFill>
+                <a:latin typeface="+mn-lt"/>
+                <a:ea typeface="+mn-ea"/>
+                <a:cs typeface="+mn-cs"/>
+              </a:defRPr>
+            </a:lvl8pPr>
+            <a:lvl9pPr marL="3886064" indent="-228592" algn="l" defTabSz="914368" rtl="0" eaLnBrk="1" latinLnBrk="0" hangingPunct="1">
+              <a:lnSpc>
+                <a:spcPct val="90000"/>
+              </a:lnSpc>
+              <a:spcBef>
+                <a:spcPts val="501"/>
+              </a:spcBef>
+              <a:buFont typeface="Arial" panose="020B0604020202020204" pitchFamily="34" charset="0"/>
+              <a:buChar char="•"/>
+              <a:defRPr sz="1800" kern="1200">
+                <a:solidFill>
+                  <a:schemeClr val="tx1"/>
+                </a:solidFill>
+                <a:latin typeface="+mn-lt"/>
+                <a:ea typeface="+mn-ea"/>
+                <a:cs typeface="+mn-cs"/>
+              </a:defRPr>
+            </a:lvl9pPr>
+          </a:lstStyle>
+          <a:p>
+            <a:pPr>
+              <a:lnSpc>
+                <a:spcPct val="100000"/>
+              </a:lnSpc>
+            </a:pPr>
+            <a:r>
+              <a:rPr lang="en-GB" sz="2000" dirty="0">
+                <a:cs typeface="Calibri" panose="020F0502020204030204" pitchFamily="34" charset="0"/>
+              </a:rPr>
+              <a:t>every model is trained as stated above and evaluated on the other two corpora</a:t>
+            </a:r>
+          </a:p>
+          <a:p>
+            <a:pPr>
+              <a:lnSpc>
+                <a:spcPct val="100000"/>
+              </a:lnSpc>
+            </a:pPr>
+            <a:r>
+              <a:rPr lang="en-GB" sz="2000" dirty="0">
+                <a:cs typeface="Calibri" panose="020F0502020204030204" pitchFamily="34" charset="0"/>
+              </a:rPr>
+              <a:t>the model trained on Reman has the best overall scores</a:t>
+            </a:r>
+          </a:p>
+          <a:p>
+            <a:pPr lvl="1">
+              <a:lnSpc>
+                <a:spcPct val="100000"/>
+              </a:lnSpc>
+              <a:buSzPct val="80000"/>
+              <a:buFont typeface="Webdings" panose="05030102010509060703" pitchFamily="18" charset="2"/>
+              <a:buChar char="s"/>
+            </a:pPr>
+            <a:r>
+              <a:rPr lang="en-GB" sz="2000" dirty="0">
+                <a:cs typeface="Calibri" panose="020F0502020204030204" pitchFamily="34" charset="0"/>
+              </a:rPr>
+              <a:t>literature </a:t>
+            </a:r>
+            <a:r>
+              <a:rPr lang="en-GB" sz="2000" dirty="0">
+                <a:cs typeface="Calibri" panose="020F0502020204030204" pitchFamily="34" charset="0"/>
+                <a:sym typeface="Wingdings" panose="05000000000000000000" pitchFamily="2" charset="2"/>
+              </a:rPr>
+              <a:t> </a:t>
+            </a:r>
+            <a:r>
+              <a:rPr lang="en-GB" sz="2000" dirty="0">
+                <a:cs typeface="Calibri" panose="020F0502020204030204" pitchFamily="34" charset="0"/>
+              </a:rPr>
+              <a:t>syntactically correct </a:t>
+            </a:r>
+            <a:r>
+              <a:rPr lang="en-GB" sz="2000" dirty="0">
+                <a:cs typeface="Calibri" panose="020F0502020204030204" pitchFamily="34" charset="0"/>
+                <a:sym typeface="Wingdings" panose="05000000000000000000" pitchFamily="2" charset="2"/>
+              </a:rPr>
+              <a:t> </a:t>
+            </a:r>
+            <a:r>
+              <a:rPr lang="en-GB" sz="2000" dirty="0">
+                <a:cs typeface="Calibri" panose="020F0502020204030204" pitchFamily="34" charset="0"/>
+              </a:rPr>
+              <a:t>best transition possibilities</a:t>
+            </a:r>
+            <a:endParaRPr lang="en-GB" sz="2000" dirty="0">
+              <a:solidFill>
+                <a:schemeClr val="accent1"/>
+              </a:solidFill>
+              <a:cs typeface="Calibri" panose="020F0502020204030204" pitchFamily="34" charset="0"/>
+            </a:endParaRPr>
+          </a:p>
+          <a:p>
+            <a:pPr>
+              <a:lnSpc>
+                <a:spcPct val="100000"/>
+              </a:lnSpc>
+            </a:pPr>
+            <a:r>
+              <a:rPr lang="en-GB" sz="2000" dirty="0">
+                <a:cs typeface="Calibri" panose="020F0502020204030204" pitchFamily="34" charset="0"/>
+              </a:rPr>
+              <a:t>all models predict way too many </a:t>
+            </a:r>
+            <a:r>
+              <a:rPr lang="en-GB" sz="2000">
+                <a:cs typeface="Calibri" panose="020F0502020204030204" pitchFamily="34" charset="0"/>
+              </a:rPr>
+              <a:t>sequences (low </a:t>
+            </a:r>
+            <a:r>
+              <a:rPr lang="en-GB" sz="2000" dirty="0">
+                <a:cs typeface="Calibri" panose="020F0502020204030204" pitchFamily="34" charset="0"/>
+              </a:rPr>
+              <a:t>precision)</a:t>
+            </a:r>
+          </a:p>
+          <a:p>
+            <a:pPr lvl="1">
+              <a:lnSpc>
+                <a:spcPct val="100000"/>
+              </a:lnSpc>
+            </a:pPr>
+            <a:r>
+              <a:rPr lang="en-GB" sz="2000" dirty="0">
+                <a:cs typeface="Calibri" panose="020F0502020204030204" pitchFamily="34" charset="0"/>
+              </a:rPr>
+              <a:t>long sequences covering multiple gold sequences distort the results</a:t>
+            </a:r>
+          </a:p>
+          <a:p>
+            <a:pPr lvl="1">
+              <a:lnSpc>
+                <a:spcPct val="100000"/>
+              </a:lnSpc>
+            </a:pPr>
+            <a:endParaRPr lang="en-GB" sz="2000" dirty="0">
+              <a:cs typeface="Calibri" panose="020F0502020204030204" pitchFamily="34" charset="0"/>
+            </a:endParaRPr>
+          </a:p>
+        </p:txBody>
+      </p:sp>
+    </p:spTree>
+    <p:extLst>
+      <p:ext uri="{BB962C8B-B14F-4D97-AF65-F5344CB8AC3E}">
+        <p14:creationId xmlns:p14="http://schemas.microsoft.com/office/powerpoint/2010/main" val="1433570789"/>
+      </p:ext>
+    </p:extLst>
+  </p:cSld>
+  <p:clrMapOvr>
+    <a:masterClrMapping/>
+  </p:clrMapOvr>
+  <mc:AlternateContent xmlns:mc="http://schemas.openxmlformats.org/markup-compatibility/2006">
+    <mc:Choice xmlns:p14="http://schemas.microsoft.com/office/powerpoint/2010/main" Requires="p14">
+      <p:transition p14:dur="0" advTm="2361"/>
+    </mc:Choice>
+    <mc:Fallback>
+      <p:transition advTm="2361"/>
+    </mc:Fallback>
+  </mc:AlternateContent>
+</p:sld>
+</file>
+
+<file path=ppt/slides/slide8.xml><?xml version="1.0" encoding="utf-8"?>
+<p:sld xmlns:a="http://schemas.openxmlformats.org/drawingml/2006/main" xmlns:r="http://schemas.openxmlformats.org/officeDocument/2006/relationships" xmlns:p="http://schemas.openxmlformats.org/presentationml/2006/main">
+  <p:cSld>
+    <p:spTree>
+      <p:nvGrpSpPr>
+        <p:cNvPr id="1" name=""/>
+        <p:cNvGrpSpPr/>
+        <p:nvPr/>
+      </p:nvGrpSpPr>
+      <p:grpSpPr>
+        <a:xfrm>
+          <a:off x="0" y="0"/>
+          <a:ext cx="0" cy="0"/>
+          <a:chOff x="0" y="0"/>
+          <a:chExt cx="0" cy="0"/>
+        </a:xfrm>
+      </p:grpSpPr>
+      <p:sp>
+        <p:nvSpPr>
           <p:cNvPr id="11" name="Inhaltsplatzhalter 3">
             <a:extLst>
               <a:ext uri="{FF2B5EF4-FFF2-40B4-BE49-F238E27FC236}">
@@ -18580,7 +20129,7 @@
           <a:p>
             <a:fld id="{54518C2F-5E54-4CF8-B37A-4631A050CED9}" type="slidenum">
               <a:rPr lang="de-DE" smtClean="0"/>
-              <a:t>7</a:t>
+              <a:t>8</a:t>
             </a:fld>
             <a:endParaRPr lang="de-DE" dirty="0"/>
           </a:p>

</xml_diff>

<commit_message>
added evaluation & transformer architecture
</commit_message>
<xml_diff>
--- a/excercise4/presentation/EA_ex04_Wegge_Buehler_Quensel.pptx
+++ b/excercise4/presentation/EA_ex04_Wegge_Buehler_Quensel.pptx
@@ -12,8 +12,8 @@
     <p:sldId id="303" r:id="rId3"/>
     <p:sldId id="327" r:id="rId4"/>
     <p:sldId id="328" r:id="rId5"/>
-    <p:sldId id="329" r:id="rId6"/>
-    <p:sldId id="330" r:id="rId7"/>
+    <p:sldId id="333" r:id="rId6"/>
+    <p:sldId id="332" r:id="rId7"/>
     <p:sldId id="331" r:id="rId8"/>
     <p:sldId id="324" r:id="rId9"/>
   </p:sldIdLst>
@@ -131,12 +131,12 @@
         <p14:section name="Method" id="{07119454-1C33-415B-A93E-428734FE7412}">
           <p14:sldIdLst>
             <p14:sldId id="328"/>
-            <p14:sldId id="329"/>
+            <p14:sldId id="333"/>
           </p14:sldIdLst>
         </p14:section>
         <p14:section name="Evaluation" id="{E91F97AE-84D6-461E-8805-A74E81053EAF}">
           <p14:sldIdLst>
-            <p14:sldId id="330"/>
+            <p14:sldId id="332"/>
             <p14:sldId id="331"/>
           </p14:sldIdLst>
         </p14:section>
@@ -17464,6 +17464,89 @@
       </p:grpSpPr>
       <p:sp>
         <p:nvSpPr>
+          <p:cNvPr id="10" name="Rechteck: abgerundete Ecken 9">
+            <a:extLst>
+              <a:ext uri="{FF2B5EF4-FFF2-40B4-BE49-F238E27FC236}">
+                <a16:creationId xmlns:a16="http://schemas.microsoft.com/office/drawing/2014/main" id="{9203F7D2-7E3A-4533-9613-B9024049BAC3}"/>
+              </a:ext>
+            </a:extLst>
+          </p:cNvPr>
+          <p:cNvSpPr/>
+          <p:nvPr/>
+        </p:nvSpPr>
+        <p:spPr>
+          <a:xfrm>
+            <a:off x="7424401" y="3268134"/>
+            <a:ext cx="3164304" cy="1515534"/>
+          </a:xfrm>
+          <a:prstGeom prst="roundRect">
+            <a:avLst/>
+          </a:prstGeom>
+          <a:solidFill>
+            <a:schemeClr val="bg1"/>
+          </a:solidFill>
+          <a:ln w="19050">
+            <a:solidFill>
+              <a:schemeClr val="tx2"/>
+            </a:solidFill>
+          </a:ln>
+        </p:spPr>
+        <p:style>
+          <a:lnRef idx="2">
+            <a:schemeClr val="accent1">
+              <a:shade val="50000"/>
+            </a:schemeClr>
+          </a:lnRef>
+          <a:fillRef idx="1">
+            <a:schemeClr val="accent1"/>
+          </a:fillRef>
+          <a:effectRef idx="0">
+            <a:schemeClr val="accent1"/>
+          </a:effectRef>
+          <a:fontRef idx="minor">
+            <a:schemeClr val="lt1"/>
+          </a:fontRef>
+        </p:style>
+        <p:txBody>
+          <a:bodyPr rtlCol="0" anchor="ctr"/>
+          <a:lstStyle/>
+          <a:p>
+            <a:pPr marL="0" marR="0" lvl="0" indent="0" algn="ctr" defTabSz="713232" rtl="0" eaLnBrk="1" fontAlgn="auto" latinLnBrk="0" hangingPunct="1">
+              <a:lnSpc>
+                <a:spcPct val="100000"/>
+              </a:lnSpc>
+              <a:spcBef>
+                <a:spcPts val="0"/>
+              </a:spcBef>
+              <a:spcAft>
+                <a:spcPts val="0"/>
+              </a:spcAft>
+              <a:buClrTx/>
+              <a:buSzTx/>
+              <a:buFontTx/>
+              <a:buNone/>
+              <a:tabLst/>
+              <a:defRPr/>
+            </a:pPr>
+            <a:endParaRPr kumimoji="0" lang="de-DE" sz="1400" b="0" i="0" u="none" strike="noStrike" kern="1200" cap="none" spc="0" normalizeH="0" baseline="0" noProof="0" dirty="0">
+              <a:ln>
+                <a:noFill/>
+              </a:ln>
+              <a:solidFill>
+                <a:srgbClr val="000000"/>
+              </a:solidFill>
+              <a:effectLst/>
+              <a:uLnTx/>
+              <a:uFillTx/>
+              <a:latin typeface="Consolas" panose="020B0609020204030204" pitchFamily="49" charset="0"/>
+              <a:ea typeface="Roboto Light" panose="02000000000000000000" pitchFamily="2" charset="0"/>
+              <a:cs typeface="+mn-cs"/>
+            </a:endParaRPr>
+          </a:p>
+        </p:txBody>
+      </p:sp>
+      <p:sp>
+        <p:nvSpPr>
           <p:cNvPr id="5" name="Foliennummernplatzhalter 4">
             <a:extLst>
               <a:ext uri="{FF2B5EF4-FFF2-40B4-BE49-F238E27FC236}">
@@ -17483,15 +17566,70 @@
           <a:bodyPr/>
           <a:lstStyle/>
           <a:p>
+            <a:pPr marL="0" marR="0" lvl="0" indent="0" algn="r" defTabSz="713232" rtl="0" eaLnBrk="1" fontAlgn="auto" latinLnBrk="0" hangingPunct="1">
+              <a:lnSpc>
+                <a:spcPct val="100000"/>
+              </a:lnSpc>
+              <a:spcBef>
+                <a:spcPts val="0"/>
+              </a:spcBef>
+              <a:spcAft>
+                <a:spcPts val="0"/>
+              </a:spcAft>
+              <a:buClrTx/>
+              <a:buSzTx/>
+              <a:buFontTx/>
+              <a:buNone/>
+              <a:tabLst/>
+              <a:defRPr/>
+            </a:pPr>
             <a:fld id="{54518C2F-5E54-4CF8-B37A-4631A050CED9}" type="slidenum">
-              <a:rPr lang="de-DE" smtClean="0"/>
-              <a:pPr/>
+              <a:rPr kumimoji="0" lang="de-DE" sz="1067" b="0" i="0" u="none" strike="noStrike" kern="1200" cap="none" spc="0" normalizeH="0" baseline="0" noProof="0" smtClean="0">
+                <a:ln>
+                  <a:noFill/>
+                </a:ln>
+                <a:solidFill>
+                  <a:srgbClr val="000000"/>
+                </a:solidFill>
+                <a:effectLst/>
+                <a:uLnTx/>
+                <a:uFillTx/>
+                <a:latin typeface="Arial"/>
+                <a:ea typeface="+mn-ea"/>
+                <a:cs typeface="+mn-cs"/>
+              </a:rPr>
+              <a:pPr marL="0" marR="0" lvl="0" indent="0" algn="r" defTabSz="713232" rtl="0" eaLnBrk="1" fontAlgn="auto" latinLnBrk="0" hangingPunct="1">
+                <a:lnSpc>
+                  <a:spcPct val="100000"/>
+                </a:lnSpc>
+                <a:spcBef>
+                  <a:spcPts val="0"/>
+                </a:spcBef>
+                <a:spcAft>
+                  <a:spcPts val="0"/>
+                </a:spcAft>
+                <a:buClrTx/>
+                <a:buSzTx/>
+                <a:buFontTx/>
+                <a:buNone/>
+                <a:tabLst/>
+                <a:defRPr/>
+              </a:pPr>
               <a:t>5</a:t>
             </a:fld>
-            <a:endParaRPr lang="de-DE" dirty="0">
+            <a:endParaRPr kumimoji="0" lang="de-DE" sz="1067" b="0" i="0" u="none" strike="noStrike" kern="1200" cap="none" spc="0" normalizeH="0" baseline="0" noProof="0" dirty="0">
+              <a:ln>
+                <a:noFill/>
+              </a:ln>
               <a:solidFill>
-                <a:schemeClr val="bg1"/>
+                <a:prstClr val="white"/>
               </a:solidFill>
+              <a:effectLst/>
+              <a:uLnTx/>
+              <a:uFillTx/>
+              <a:latin typeface="Arial"/>
+              <a:ea typeface="+mn-ea"/>
+              <a:cs typeface="+mn-cs"/>
             </a:endParaRPr>
           </a:p>
         </p:txBody>
@@ -17522,12 +17660,190 @@
           <a:bodyPr/>
           <a:lstStyle/>
           <a:p>
-            <a:pPr algn="ctr"/>
-            <a:r>
-              <a:rPr lang="de-DE"/>
-              <a:t>Emotion Analysis | ML-based Emotion Role Labelling		           Felix Bühler | Max Wegge | Carlotta Quensel</a:t>
-            </a:r>
-            <a:endParaRPr lang="de-DE" dirty="0"/>
+            <a:pPr marL="0" marR="0" lvl="0" indent="0" algn="ctr" defTabSz="713232" rtl="0" eaLnBrk="1" fontAlgn="auto" latinLnBrk="0" hangingPunct="1">
+              <a:lnSpc>
+                <a:spcPct val="100000"/>
+              </a:lnSpc>
+              <a:spcBef>
+                <a:spcPts val="0"/>
+              </a:spcBef>
+              <a:spcAft>
+                <a:spcPts val="0"/>
+              </a:spcAft>
+              <a:buClrTx/>
+              <a:buSzTx/>
+              <a:buFontTx/>
+              <a:buNone/>
+              <a:tabLst/>
+              <a:defRPr/>
+            </a:pPr>
+            <a:r>
+              <a:rPr kumimoji="0" lang="de-DE" sz="1067" b="0" i="0" u="none" strike="noStrike" kern="1200" cap="none" spc="0" normalizeH="0" baseline="0" noProof="0">
+                <a:ln>
+                  <a:noFill/>
+                </a:ln>
+                <a:solidFill>
+                  <a:prstClr val="white"/>
+                </a:solidFill>
+                <a:effectLst/>
+                <a:uLnTx/>
+                <a:uFillTx/>
+                <a:latin typeface="Arial"/>
+                <a:ea typeface="+mn-ea"/>
+                <a:cs typeface="+mn-cs"/>
+              </a:rPr>
+              <a:t>Emotion </a:t>
+            </a:r>
+            <a:r>
+              <a:rPr kumimoji="0" lang="de-DE" sz="1067" b="0" i="0" u="none" strike="noStrike" kern="1200" cap="none" spc="0" normalizeH="0" baseline="0" noProof="0" dirty="0">
+                <a:ln>
+                  <a:noFill/>
+                </a:ln>
+                <a:solidFill>
+                  <a:prstClr val="white"/>
+                </a:solidFill>
+                <a:effectLst/>
+                <a:uLnTx/>
+                <a:uFillTx/>
+                <a:latin typeface="Arial"/>
+                <a:ea typeface="+mn-ea"/>
+                <a:cs typeface="+mn-cs"/>
+              </a:rPr>
+              <a:t>Analysis | </a:t>
+            </a:r>
+            <a:r>
+              <a:rPr kumimoji="0" lang="de-DE" sz="1067" b="0" i="0" u="none" strike="noStrike" kern="1200" cap="none" spc="0" normalizeH="0" baseline="0" noProof="0">
+                <a:ln>
+                  <a:noFill/>
+                </a:ln>
+                <a:solidFill>
+                  <a:prstClr val="white"/>
+                </a:solidFill>
+                <a:effectLst/>
+                <a:uLnTx/>
+                <a:uFillTx/>
+                <a:latin typeface="Arial"/>
+                <a:ea typeface="+mn-ea"/>
+                <a:cs typeface="+mn-cs"/>
+              </a:rPr>
+              <a:t>ML-</a:t>
+            </a:r>
+            <a:r>
+              <a:rPr kumimoji="0" lang="de-DE" sz="1067" b="0" i="0" u="none" strike="noStrike" kern="1200" cap="none" spc="0" normalizeH="0" baseline="0" noProof="0" err="1">
+                <a:ln>
+                  <a:noFill/>
+                </a:ln>
+                <a:solidFill>
+                  <a:prstClr val="white"/>
+                </a:solidFill>
+                <a:effectLst/>
+                <a:uLnTx/>
+                <a:uFillTx/>
+                <a:latin typeface="Arial"/>
+                <a:ea typeface="+mn-ea"/>
+                <a:cs typeface="+mn-cs"/>
+              </a:rPr>
+              <a:t>based</a:t>
+            </a:r>
+            <a:r>
+              <a:rPr kumimoji="0" lang="de-DE" sz="1067" b="0" i="0" u="none" strike="noStrike" kern="1200" cap="none" spc="0" normalizeH="0" baseline="0" noProof="0">
+                <a:ln>
+                  <a:noFill/>
+                </a:ln>
+                <a:solidFill>
+                  <a:prstClr val="white"/>
+                </a:solidFill>
+                <a:effectLst/>
+                <a:uLnTx/>
+                <a:uFillTx/>
+                <a:latin typeface="Arial"/>
+                <a:ea typeface="+mn-ea"/>
+                <a:cs typeface="+mn-cs"/>
+              </a:rPr>
+              <a:t> Emotion Role </a:t>
+            </a:r>
+            <a:r>
+              <a:rPr kumimoji="0" lang="de-DE" sz="1067" b="0" i="0" u="none" strike="noStrike" kern="1200" cap="none" spc="0" normalizeH="0" baseline="0" noProof="0" dirty="0" err="1">
+                <a:ln>
+                  <a:noFill/>
+                </a:ln>
+                <a:solidFill>
+                  <a:prstClr val="white"/>
+                </a:solidFill>
+                <a:effectLst/>
+                <a:uLnTx/>
+                <a:uFillTx/>
+                <a:latin typeface="Arial"/>
+                <a:ea typeface="+mn-ea"/>
+                <a:cs typeface="+mn-cs"/>
+              </a:rPr>
+              <a:t>Labelling</a:t>
+            </a:r>
+            <a:r>
+              <a:rPr kumimoji="0" lang="de-DE" sz="1067" b="0" i="0" u="none" strike="noStrike" kern="1200" cap="none" spc="0" normalizeH="0" baseline="0" noProof="0" dirty="0">
+                <a:ln>
+                  <a:noFill/>
+                </a:ln>
+                <a:solidFill>
+                  <a:prstClr val="white"/>
+                </a:solidFill>
+                <a:effectLst/>
+                <a:uLnTx/>
+                <a:uFillTx/>
+                <a:latin typeface="Arial"/>
+                <a:ea typeface="+mn-ea"/>
+                <a:cs typeface="+mn-cs"/>
+              </a:rPr>
+              <a:t>		           Felix Bühler | Max Wegge </a:t>
+            </a:r>
+            <a:r>
+              <a:rPr kumimoji="0" lang="de-DE" sz="1067" b="0" i="0" u="none" strike="noStrike" kern="1200" cap="none" spc="0" normalizeH="0" baseline="0" noProof="0">
+                <a:ln>
+                  <a:noFill/>
+                </a:ln>
+                <a:solidFill>
+                  <a:prstClr val="white"/>
+                </a:solidFill>
+                <a:effectLst/>
+                <a:uLnTx/>
+                <a:uFillTx/>
+                <a:latin typeface="Arial"/>
+                <a:ea typeface="+mn-ea"/>
+                <a:cs typeface="+mn-cs"/>
+              </a:rPr>
+              <a:t>| Carlotta </a:t>
+            </a:r>
+            <a:r>
+              <a:rPr kumimoji="0" lang="de-DE" sz="1067" b="0" i="0" u="none" strike="noStrike" kern="1200" cap="none" spc="0" normalizeH="0" baseline="0" noProof="0" dirty="0" err="1">
+                <a:ln>
+                  <a:noFill/>
+                </a:ln>
+                <a:solidFill>
+                  <a:prstClr val="white"/>
+                </a:solidFill>
+                <a:effectLst/>
+                <a:uLnTx/>
+                <a:uFillTx/>
+                <a:latin typeface="Arial"/>
+                <a:ea typeface="+mn-ea"/>
+                <a:cs typeface="+mn-cs"/>
+              </a:rPr>
+              <a:t>Quensel</a:t>
+            </a:r>
+            <a:endParaRPr kumimoji="0" lang="de-DE" sz="1067" b="0" i="0" u="none" strike="noStrike" kern="1200" cap="none" spc="0" normalizeH="0" baseline="0" noProof="0" dirty="0">
+              <a:ln>
+                <a:noFill/>
+              </a:ln>
+              <a:solidFill>
+                <a:prstClr val="white"/>
+              </a:solidFill>
+              <a:effectLst/>
+              <a:uLnTx/>
+              <a:uFillTx/>
+              <a:latin typeface="Arial"/>
+              <a:ea typeface="+mn-ea"/>
+              <a:cs typeface="+mn-cs"/>
+            </a:endParaRPr>
           </a:p>
         </p:txBody>
       </p:sp>
@@ -17578,28 +17894,85 @@
             </a:lvl1pPr>
           </a:lstStyle>
           <a:p>
-            <a:r>
-              <a:rPr lang="de-DE" dirty="0" err="1">
+            <a:pPr marL="0" marR="0" lvl="0" indent="0" algn="l" defTabSz="914368" rtl="0" eaLnBrk="1" fontAlgn="auto" latinLnBrk="0" hangingPunct="1">
+              <a:lnSpc>
+                <a:spcPct val="90000"/>
+              </a:lnSpc>
+              <a:spcBef>
+                <a:spcPct val="0"/>
+              </a:spcBef>
+              <a:spcAft>
+                <a:spcPts val="0"/>
+              </a:spcAft>
+              <a:buClrTx/>
+              <a:buSzTx/>
+              <a:buFontTx/>
+              <a:buNone/>
+              <a:tabLst/>
+              <a:defRPr/>
+            </a:pPr>
+            <a:r>
+              <a:rPr kumimoji="0" lang="de-DE" sz="2800" b="1" i="0" u="none" strike="noStrike" kern="1200" cap="none" spc="0" normalizeH="0" baseline="0" noProof="0">
+                <a:ln>
+                  <a:noFill/>
+                </a:ln>
+                <a:solidFill>
+                  <a:srgbClr val="3E444C"/>
+                </a:solidFill>
+                <a:effectLst/>
+                <a:uLnTx/>
+                <a:uFillTx/>
                 <a:latin typeface="Calibri" panose="020F0502020204030204" pitchFamily="34" charset="0"/>
+                <a:ea typeface="+mj-ea"/>
                 <a:cs typeface="Calibri" panose="020F0502020204030204" pitchFamily="34" charset="0"/>
               </a:rPr>
               <a:t>method</a:t>
             </a:r>
             <a:br>
-              <a:rPr lang="de-DE" dirty="0">
+              <a:rPr kumimoji="0" lang="de-DE" sz="2800" b="1" i="0" u="none" strike="noStrike" kern="1200" cap="none" spc="0" normalizeH="0" baseline="0" noProof="0">
+                <a:ln>
+                  <a:noFill/>
+                </a:ln>
+                <a:solidFill>
+                  <a:srgbClr val="3E444C"/>
+                </a:solidFill>
+                <a:effectLst/>
+                <a:uLnTx/>
+                <a:uFillTx/>
                 <a:latin typeface="Calibri" panose="020F0502020204030204" pitchFamily="34" charset="0"/>
+                <a:ea typeface="+mj-ea"/>
                 <a:cs typeface="Calibri" panose="020F0502020204030204" pitchFamily="34" charset="0"/>
               </a:rPr>
             </a:br>
             <a:r>
-              <a:rPr lang="en-US" b="0" dirty="0" err="1">
+              <a:rPr kumimoji="0" lang="en-US" sz="2800" b="0" i="0" u="none" strike="noStrike" kern="1200" cap="none" spc="0" normalizeH="0" baseline="0" noProof="0">
+                <a:ln>
+                  <a:noFill/>
+                </a:ln>
+                <a:solidFill>
+                  <a:srgbClr val="3E444C"/>
+                </a:solidFill>
+                <a:effectLst/>
+                <a:uLnTx/>
+                <a:uFillTx/>
                 <a:latin typeface="Calibri" panose="020F0502020204030204" pitchFamily="34" charset="0"/>
+                <a:ea typeface="+mj-ea"/>
                 <a:cs typeface="Calibri" panose="020F0502020204030204" pitchFamily="34" charset="0"/>
               </a:rPr>
               <a:t>RoBERTa</a:t>
             </a:r>
-            <a:endParaRPr lang="en-US" b="0" dirty="0">
+            <a:endParaRPr kumimoji="0" lang="en-US" sz="2800" b="0" i="0" u="none" strike="noStrike" kern="1200" cap="none" spc="0" normalizeH="0" baseline="0" noProof="0" dirty="0">
+              <a:ln>
+                <a:noFill/>
+              </a:ln>
+              <a:solidFill>
+                <a:srgbClr val="3E444C"/>
+              </a:solidFill>
+              <a:effectLst/>
+              <a:uLnTx/>
+              <a:uFillTx/>
               <a:latin typeface="Calibri" panose="020F0502020204030204" pitchFamily="34" charset="0"/>
+              <a:ea typeface="+mj-ea"/>
               <a:cs typeface="Calibri" panose="020F0502020204030204" pitchFamily="34" charset="0"/>
             </a:endParaRPr>
           </a:p>
@@ -17607,10 +17980,1099 @@
       </p:sp>
       <p:sp>
         <p:nvSpPr>
-          <p:cNvPr id="7" name="Inhaltsplatzhalter 3">
+          <p:cNvPr id="2" name="Rechteck: abgerundete Ecken 1">
             <a:extLst>
               <a:ext uri="{FF2B5EF4-FFF2-40B4-BE49-F238E27FC236}">
-                <a16:creationId xmlns:a16="http://schemas.microsoft.com/office/drawing/2014/main" id="{514DE648-80A0-4EF3-AB1B-044DAFBD5493}"/>
+                <a16:creationId xmlns:a16="http://schemas.microsoft.com/office/drawing/2014/main" id="{DD9E5DA7-FABC-40EE-9F71-A6B7EE0DAD86}"/>
+              </a:ext>
+            </a:extLst>
+          </p:cNvPr>
+          <p:cNvSpPr/>
+          <p:nvPr/>
+        </p:nvSpPr>
+        <p:spPr>
+          <a:xfrm>
+            <a:off x="7424402" y="1882597"/>
+            <a:ext cx="3164302" cy="437546"/>
+          </a:xfrm>
+          <a:prstGeom prst="roundRect">
+            <a:avLst/>
+          </a:prstGeom>
+          <a:noFill/>
+          <a:ln w="19050">
+            <a:solidFill>
+              <a:schemeClr val="tx2"/>
+            </a:solidFill>
+          </a:ln>
+        </p:spPr>
+        <p:style>
+          <a:lnRef idx="2">
+            <a:schemeClr val="accent1">
+              <a:shade val="50000"/>
+            </a:schemeClr>
+          </a:lnRef>
+          <a:fillRef idx="1">
+            <a:schemeClr val="accent1"/>
+          </a:fillRef>
+          <a:effectRef idx="0">
+            <a:schemeClr val="accent1"/>
+          </a:effectRef>
+          <a:fontRef idx="minor">
+            <a:schemeClr val="lt1"/>
+          </a:fontRef>
+        </p:style>
+        <p:txBody>
+          <a:bodyPr rtlCol="0" anchor="ctr"/>
+          <a:lstStyle/>
+          <a:p>
+            <a:pPr marL="0" marR="0" lvl="0" indent="0" algn="ctr" defTabSz="713232" rtl="0" eaLnBrk="1" fontAlgn="auto" latinLnBrk="0" hangingPunct="1">
+              <a:lnSpc>
+                <a:spcPct val="100000"/>
+              </a:lnSpc>
+              <a:spcBef>
+                <a:spcPts val="0"/>
+              </a:spcBef>
+              <a:spcAft>
+                <a:spcPts val="0"/>
+              </a:spcAft>
+              <a:buClrTx/>
+              <a:buSzTx/>
+              <a:buFontTx/>
+              <a:buNone/>
+              <a:tabLst/>
+              <a:defRPr/>
+            </a:pPr>
+            <a:r>
+              <a:rPr kumimoji="0" lang="de-DE" sz="1200" b="0" i="0" u="none" strike="noStrike" kern="1200" cap="none" spc="0" normalizeH="0" baseline="0" noProof="0" dirty="0" err="1">
+                <a:ln>
+                  <a:noFill/>
+                </a:ln>
+                <a:solidFill>
+                  <a:srgbClr val="000000"/>
+                </a:solidFill>
+                <a:effectLst/>
+                <a:uLnTx/>
+                <a:uFillTx/>
+                <a:latin typeface="Consolas" panose="020B0609020204030204" pitchFamily="49" charset="0"/>
+                <a:ea typeface="Roboto Light" panose="02000000000000000000" pitchFamily="2" charset="0"/>
+                <a:cs typeface="+mn-cs"/>
+              </a:rPr>
+              <a:t>RoBERTa</a:t>
+            </a:r>
+            <a:r>
+              <a:rPr kumimoji="0" lang="de-DE" sz="1200" b="0" i="0" u="none" strike="noStrike" kern="1200" cap="none" spc="0" normalizeH="0" baseline="0" noProof="0" dirty="0">
+                <a:ln>
+                  <a:noFill/>
+                </a:ln>
+                <a:solidFill>
+                  <a:srgbClr val="000000"/>
+                </a:solidFill>
+                <a:effectLst/>
+                <a:uLnTx/>
+                <a:uFillTx/>
+                <a:latin typeface="Consolas" panose="020B0609020204030204" pitchFamily="49" charset="0"/>
+                <a:ea typeface="Roboto Light" panose="02000000000000000000" pitchFamily="2" charset="0"/>
+                <a:cs typeface="+mn-cs"/>
+              </a:rPr>
+              <a:t> </a:t>
+            </a:r>
+            <a:r>
+              <a:rPr kumimoji="0" lang="de-DE" sz="1200" b="0" i="0" u="none" strike="noStrike" kern="1200" cap="none" spc="0" normalizeH="0" baseline="0" noProof="0" dirty="0" err="1">
+                <a:ln>
+                  <a:noFill/>
+                </a:ln>
+                <a:solidFill>
+                  <a:srgbClr val="000000"/>
+                </a:solidFill>
+                <a:effectLst/>
+                <a:uLnTx/>
+                <a:uFillTx/>
+                <a:latin typeface="Consolas" panose="020B0609020204030204" pitchFamily="49" charset="0"/>
+                <a:ea typeface="Roboto Light" panose="02000000000000000000" pitchFamily="2" charset="0"/>
+                <a:cs typeface="+mn-cs"/>
+              </a:rPr>
+              <a:t>Tokenizer</a:t>
+            </a:r>
+            <a:br>
+              <a:rPr kumimoji="0" lang="de-DE" sz="1200" b="0" i="0" u="none" strike="noStrike" kern="1200" cap="none" spc="0" normalizeH="0" baseline="0" noProof="0" dirty="0">
+                <a:ln>
+                  <a:noFill/>
+                </a:ln>
+                <a:solidFill>
+                  <a:srgbClr val="000000"/>
+                </a:solidFill>
+                <a:effectLst/>
+                <a:uLnTx/>
+                <a:uFillTx/>
+                <a:latin typeface="Consolas" panose="020B0609020204030204" pitchFamily="49" charset="0"/>
+                <a:ea typeface="Roboto Light" panose="02000000000000000000" pitchFamily="2" charset="0"/>
+                <a:cs typeface="+mn-cs"/>
+              </a:rPr>
+            </a:br>
+            <a:r>
+              <a:rPr kumimoji="0" lang="de-DE" sz="1200" b="0" i="0" u="none" strike="noStrike" kern="1200" cap="none" spc="0" normalizeH="0" baseline="0" noProof="0" dirty="0">
+                <a:ln>
+                  <a:noFill/>
+                </a:ln>
+                <a:solidFill>
+                  <a:srgbClr val="000000"/>
+                </a:solidFill>
+                <a:effectLst/>
+                <a:uLnTx/>
+                <a:uFillTx/>
+                <a:latin typeface="Consolas" panose="020B0609020204030204" pitchFamily="49" charset="0"/>
+                <a:ea typeface="Roboto Light" panose="02000000000000000000" pitchFamily="2" charset="0"/>
+                <a:cs typeface="+mn-cs"/>
+              </a:rPr>
+              <a:t>(</a:t>
+            </a:r>
+            <a:r>
+              <a:rPr kumimoji="0" lang="pl-PL" sz="1200" b="0" i="0" u="none" strike="noStrike" kern="1200" cap="none" spc="0" normalizeH="0" baseline="0" noProof="0" dirty="0">
+                <a:ln>
+                  <a:noFill/>
+                </a:ln>
+                <a:solidFill>
+                  <a:srgbClr val="000000"/>
+                </a:solidFill>
+                <a:effectLst/>
+                <a:uLnTx/>
+                <a:uFillTx/>
+                <a:latin typeface="Consolas" panose="020B0609020204030204" pitchFamily="49" charset="0"/>
+                <a:ea typeface="+mn-ea"/>
+                <a:cs typeface="+mn-cs"/>
+              </a:rPr>
+              <a:t>"</a:t>
+            </a:r>
+            <a:r>
+              <a:rPr kumimoji="0" lang="de-DE" sz="1200" b="0" i="0" u="none" strike="noStrike" kern="1200" cap="none" spc="0" normalizeH="0" baseline="0" noProof="0" dirty="0">
+                <a:ln>
+                  <a:noFill/>
+                </a:ln>
+                <a:solidFill>
+                  <a:srgbClr val="000000"/>
+                </a:solidFill>
+                <a:effectLst/>
+                <a:uLnTx/>
+                <a:uFillTx/>
+                <a:latin typeface="Consolas" panose="020B0609020204030204" pitchFamily="49" charset="0"/>
+                <a:ea typeface="Roboto Light" panose="02000000000000000000" pitchFamily="2" charset="0"/>
+                <a:cs typeface="+mn-cs"/>
+              </a:rPr>
+              <a:t>O</a:t>
+            </a:r>
+            <a:r>
+              <a:rPr kumimoji="0" lang="pl-PL" sz="1200" b="0" i="0" u="none" strike="noStrike" kern="1200" cap="none" spc="0" normalizeH="0" baseline="0" noProof="0" dirty="0">
+                <a:ln>
+                  <a:noFill/>
+                </a:ln>
+                <a:solidFill>
+                  <a:srgbClr val="000000"/>
+                </a:solidFill>
+                <a:effectLst/>
+                <a:uLnTx/>
+                <a:uFillTx/>
+                <a:latin typeface="Consolas" panose="020B0609020204030204" pitchFamily="49" charset="0"/>
+                <a:ea typeface="+mn-ea"/>
+                <a:cs typeface="+mn-cs"/>
+              </a:rPr>
+              <a:t>"</a:t>
+            </a:r>
+            <a:r>
+              <a:rPr kumimoji="0" lang="de-DE" sz="1200" b="0" i="0" u="none" strike="noStrike" kern="1200" cap="none" spc="0" normalizeH="0" baseline="0" noProof="0" dirty="0">
+                <a:ln>
+                  <a:noFill/>
+                </a:ln>
+                <a:solidFill>
+                  <a:srgbClr val="000000"/>
+                </a:solidFill>
+                <a:effectLst/>
+                <a:uLnTx/>
+                <a:uFillTx/>
+                <a:latin typeface="Consolas" panose="020B0609020204030204" pitchFamily="49" charset="0"/>
+                <a:ea typeface="Roboto Light" panose="02000000000000000000" pitchFamily="2" charset="0"/>
+                <a:cs typeface="+mn-cs"/>
+              </a:rPr>
+              <a:t>-</a:t>
+            </a:r>
+            <a:r>
+              <a:rPr kumimoji="0" lang="de-DE" sz="1200" b="0" i="0" u="none" strike="noStrike" kern="1200" cap="none" spc="0" normalizeH="0" baseline="0" noProof="0" dirty="0" err="1">
+                <a:ln>
+                  <a:noFill/>
+                </a:ln>
+                <a:solidFill>
+                  <a:srgbClr val="000000"/>
+                </a:solidFill>
+                <a:effectLst/>
+                <a:uLnTx/>
+                <a:uFillTx/>
+                <a:latin typeface="Consolas" panose="020B0609020204030204" pitchFamily="49" charset="0"/>
+                <a:ea typeface="Roboto Light" panose="02000000000000000000" pitchFamily="2" charset="0"/>
+                <a:cs typeface="+mn-cs"/>
+              </a:rPr>
+              <a:t>padding</a:t>
+            </a:r>
+            <a:r>
+              <a:rPr kumimoji="0" lang="de-DE" sz="1200" b="0" i="0" u="none" strike="noStrike" kern="1200" cap="none" spc="0" normalizeH="0" baseline="0" noProof="0" dirty="0">
+                <a:ln>
+                  <a:noFill/>
+                </a:ln>
+                <a:solidFill>
+                  <a:srgbClr val="000000"/>
+                </a:solidFill>
+                <a:effectLst/>
+                <a:uLnTx/>
+                <a:uFillTx/>
+                <a:latin typeface="Consolas" panose="020B0609020204030204" pitchFamily="49" charset="0"/>
+                <a:ea typeface="Roboto Light" panose="02000000000000000000" pitchFamily="2" charset="0"/>
+                <a:cs typeface="+mn-cs"/>
+              </a:rPr>
+              <a:t> </a:t>
+            </a:r>
+            <a:r>
+              <a:rPr kumimoji="0" lang="de-DE" sz="1200" b="0" i="0" u="none" strike="noStrike" kern="1200" cap="none" spc="0" normalizeH="0" baseline="0" noProof="0" dirty="0" err="1">
+                <a:ln>
+                  <a:noFill/>
+                </a:ln>
+                <a:solidFill>
+                  <a:srgbClr val="000000"/>
+                </a:solidFill>
+                <a:effectLst/>
+                <a:uLnTx/>
+                <a:uFillTx/>
+                <a:latin typeface="Consolas" panose="020B0609020204030204" pitchFamily="49" charset="0"/>
+                <a:ea typeface="Roboto Light" panose="02000000000000000000" pitchFamily="2" charset="0"/>
+                <a:cs typeface="+mn-cs"/>
+              </a:rPr>
+              <a:t>to</a:t>
+            </a:r>
+            <a:r>
+              <a:rPr kumimoji="0" lang="de-DE" sz="1200" b="0" i="0" u="none" strike="noStrike" kern="1200" cap="none" spc="0" normalizeH="0" baseline="0" noProof="0" dirty="0">
+                <a:ln>
+                  <a:noFill/>
+                </a:ln>
+                <a:solidFill>
+                  <a:srgbClr val="000000"/>
+                </a:solidFill>
+                <a:effectLst/>
+                <a:uLnTx/>
+                <a:uFillTx/>
+                <a:latin typeface="Consolas" panose="020B0609020204030204" pitchFamily="49" charset="0"/>
+                <a:ea typeface="Roboto Light" panose="02000000000000000000" pitchFamily="2" charset="0"/>
+                <a:cs typeface="+mn-cs"/>
+              </a:rPr>
+              <a:t> </a:t>
+            </a:r>
+            <a:r>
+              <a:rPr kumimoji="0" lang="de-DE" sz="1200" b="0" i="0" u="none" strike="noStrike" kern="1200" cap="none" spc="0" normalizeH="0" baseline="0" noProof="0" dirty="0" err="1">
+                <a:ln>
+                  <a:noFill/>
+                </a:ln>
+                <a:solidFill>
+                  <a:srgbClr val="000000"/>
+                </a:solidFill>
+                <a:effectLst/>
+                <a:uLnTx/>
+                <a:uFillTx/>
+                <a:latin typeface="Consolas" panose="020B0609020204030204" pitchFamily="49" charset="0"/>
+                <a:ea typeface="Roboto Light" panose="02000000000000000000" pitchFamily="2" charset="0"/>
+                <a:cs typeface="+mn-cs"/>
+              </a:rPr>
+              <a:t>input</a:t>
+            </a:r>
+            <a:r>
+              <a:rPr kumimoji="0" lang="de-DE" sz="1200" b="0" i="0" u="none" strike="noStrike" kern="1200" cap="none" spc="0" normalizeH="0" baseline="0" noProof="0" dirty="0">
+                <a:ln>
+                  <a:noFill/>
+                </a:ln>
+                <a:solidFill>
+                  <a:srgbClr val="000000"/>
+                </a:solidFill>
+                <a:effectLst/>
+                <a:uLnTx/>
+                <a:uFillTx/>
+                <a:latin typeface="Consolas" panose="020B0609020204030204" pitchFamily="49" charset="0"/>
+                <a:ea typeface="Roboto Light" panose="02000000000000000000" pitchFamily="2" charset="0"/>
+                <a:cs typeface="+mn-cs"/>
+              </a:rPr>
+              <a:t> </a:t>
+            </a:r>
+            <a:r>
+              <a:rPr kumimoji="0" lang="de-DE" sz="1200" b="0" i="0" u="none" strike="noStrike" kern="1200" cap="none" spc="0" normalizeH="0" baseline="0" noProof="0" dirty="0" err="1">
+                <a:ln>
+                  <a:noFill/>
+                </a:ln>
+                <a:solidFill>
+                  <a:srgbClr val="000000"/>
+                </a:solidFill>
+                <a:effectLst/>
+                <a:uLnTx/>
+                <a:uFillTx/>
+                <a:latin typeface="Consolas" panose="020B0609020204030204" pitchFamily="49" charset="0"/>
+                <a:ea typeface="Roboto Light" panose="02000000000000000000" pitchFamily="2" charset="0"/>
+                <a:cs typeface="+mn-cs"/>
+              </a:rPr>
+              <a:t>length</a:t>
+            </a:r>
+            <a:r>
+              <a:rPr kumimoji="0" lang="de-DE" sz="1200" b="0" i="0" u="none" strike="noStrike" kern="1200" cap="none" spc="0" normalizeH="0" baseline="0" noProof="0" dirty="0">
+                <a:ln>
+                  <a:noFill/>
+                </a:ln>
+                <a:solidFill>
+                  <a:srgbClr val="000000"/>
+                </a:solidFill>
+                <a:effectLst/>
+                <a:uLnTx/>
+                <a:uFillTx/>
+                <a:latin typeface="Consolas" panose="020B0609020204030204" pitchFamily="49" charset="0"/>
+                <a:ea typeface="Roboto Light" panose="02000000000000000000" pitchFamily="2" charset="0"/>
+                <a:cs typeface="+mn-cs"/>
+              </a:rPr>
+              <a:t> 100)</a:t>
+            </a:r>
+          </a:p>
+        </p:txBody>
+      </p:sp>
+      <p:sp>
+        <p:nvSpPr>
+          <p:cNvPr id="9" name="Rechteck: abgerundete Ecken 8">
+            <a:extLst>
+              <a:ext uri="{FF2B5EF4-FFF2-40B4-BE49-F238E27FC236}">
+                <a16:creationId xmlns:a16="http://schemas.microsoft.com/office/drawing/2014/main" id="{4439341C-7E22-4C71-9FB5-44BEDB88A8E9}"/>
+              </a:ext>
+            </a:extLst>
+          </p:cNvPr>
+          <p:cNvSpPr/>
+          <p:nvPr/>
+        </p:nvSpPr>
+        <p:spPr>
+          <a:xfrm>
+            <a:off x="7424401" y="2387478"/>
+            <a:ext cx="3164303" cy="677527"/>
+          </a:xfrm>
+          <a:prstGeom prst="roundRect">
+            <a:avLst/>
+          </a:prstGeom>
+          <a:noFill/>
+          <a:ln w="19050">
+            <a:solidFill>
+              <a:schemeClr val="tx2"/>
+            </a:solidFill>
+          </a:ln>
+        </p:spPr>
+        <p:style>
+          <a:lnRef idx="2">
+            <a:schemeClr val="accent1">
+              <a:shade val="50000"/>
+            </a:schemeClr>
+          </a:lnRef>
+          <a:fillRef idx="1">
+            <a:schemeClr val="accent1"/>
+          </a:fillRef>
+          <a:effectRef idx="0">
+            <a:schemeClr val="accent1"/>
+          </a:effectRef>
+          <a:fontRef idx="minor">
+            <a:schemeClr val="lt1"/>
+          </a:fontRef>
+        </p:style>
+        <p:txBody>
+          <a:bodyPr rtlCol="0" anchor="ctr"/>
+          <a:lstStyle/>
+          <a:p>
+            <a:pPr marL="0" marR="0" lvl="0" indent="0" algn="ctr" defTabSz="713232" rtl="0" eaLnBrk="1" fontAlgn="auto" latinLnBrk="0" hangingPunct="1">
+              <a:lnSpc>
+                <a:spcPct val="100000"/>
+              </a:lnSpc>
+              <a:spcBef>
+                <a:spcPts val="0"/>
+              </a:spcBef>
+              <a:spcAft>
+                <a:spcPts val="0"/>
+              </a:spcAft>
+              <a:buClrTx/>
+              <a:buSzTx/>
+              <a:buFontTx/>
+              <a:buNone/>
+              <a:tabLst/>
+              <a:defRPr/>
+            </a:pPr>
+            <a:r>
+              <a:rPr kumimoji="0" lang="de-DE" sz="1200" b="0" i="0" u="none" strike="noStrike" kern="1200" cap="none" spc="0" normalizeH="0" baseline="0" noProof="0" dirty="0" err="1">
+                <a:ln>
+                  <a:noFill/>
+                </a:ln>
+                <a:solidFill>
+                  <a:srgbClr val="000000"/>
+                </a:solidFill>
+                <a:effectLst/>
+                <a:uLnTx/>
+                <a:uFillTx/>
+                <a:latin typeface="Consolas" panose="020B0609020204030204" pitchFamily="49" charset="0"/>
+                <a:ea typeface="Roboto Light" panose="02000000000000000000" pitchFamily="2" charset="0"/>
+                <a:cs typeface="+mn-cs"/>
+              </a:rPr>
+              <a:t>RoBERTa</a:t>
+            </a:r>
+            <a:r>
+              <a:rPr kumimoji="0" lang="de-DE" sz="1200" b="0" i="0" u="none" strike="noStrike" kern="1200" cap="none" spc="0" normalizeH="0" baseline="0" noProof="0" dirty="0">
+                <a:ln>
+                  <a:noFill/>
+                </a:ln>
+                <a:solidFill>
+                  <a:srgbClr val="000000"/>
+                </a:solidFill>
+                <a:effectLst/>
+                <a:uLnTx/>
+                <a:uFillTx/>
+                <a:latin typeface="Consolas" panose="020B0609020204030204" pitchFamily="49" charset="0"/>
+                <a:ea typeface="Roboto Light" panose="02000000000000000000" pitchFamily="2" charset="0"/>
+                <a:cs typeface="+mn-cs"/>
+              </a:rPr>
+              <a:t>(768)</a:t>
+            </a:r>
+          </a:p>
+        </p:txBody>
+      </p:sp>
+      <p:sp>
+        <p:nvSpPr>
+          <p:cNvPr id="11" name="Rechteck: abgerundete Ecken 10">
+            <a:extLst>
+              <a:ext uri="{FF2B5EF4-FFF2-40B4-BE49-F238E27FC236}">
+                <a16:creationId xmlns:a16="http://schemas.microsoft.com/office/drawing/2014/main" id="{545DC34B-5D88-4026-BC33-29DE737F30D1}"/>
+              </a:ext>
+            </a:extLst>
+          </p:cNvPr>
+          <p:cNvSpPr/>
+          <p:nvPr/>
+        </p:nvSpPr>
+        <p:spPr>
+          <a:xfrm>
+            <a:off x="7424399" y="4984743"/>
+            <a:ext cx="3164305" cy="263143"/>
+          </a:xfrm>
+          <a:prstGeom prst="roundRect">
+            <a:avLst/>
+          </a:prstGeom>
+          <a:noFill/>
+          <a:ln w="19050">
+            <a:solidFill>
+              <a:schemeClr val="tx2"/>
+            </a:solidFill>
+          </a:ln>
+        </p:spPr>
+        <p:style>
+          <a:lnRef idx="2">
+            <a:schemeClr val="accent1">
+              <a:shade val="50000"/>
+            </a:schemeClr>
+          </a:lnRef>
+          <a:fillRef idx="1">
+            <a:schemeClr val="accent1"/>
+          </a:fillRef>
+          <a:effectRef idx="0">
+            <a:schemeClr val="accent1"/>
+          </a:effectRef>
+          <a:fontRef idx="minor">
+            <a:schemeClr val="lt1"/>
+          </a:fontRef>
+        </p:style>
+        <p:txBody>
+          <a:bodyPr rtlCol="0" anchor="ctr"/>
+          <a:lstStyle/>
+          <a:p>
+            <a:pPr marL="0" marR="0" lvl="0" indent="0" algn="ctr" defTabSz="713232" rtl="0" eaLnBrk="1" fontAlgn="auto" latinLnBrk="0" hangingPunct="1">
+              <a:lnSpc>
+                <a:spcPct val="100000"/>
+              </a:lnSpc>
+              <a:spcBef>
+                <a:spcPts val="0"/>
+              </a:spcBef>
+              <a:spcAft>
+                <a:spcPts val="0"/>
+              </a:spcAft>
+              <a:buClrTx/>
+              <a:buSzTx/>
+              <a:buFontTx/>
+              <a:buNone/>
+              <a:tabLst/>
+              <a:defRPr/>
+            </a:pPr>
+            <a:r>
+              <a:rPr kumimoji="0" lang="de-DE" sz="1200" b="0" i="0" u="none" strike="noStrike" kern="1200" cap="none" spc="0" normalizeH="0" baseline="0" noProof="0" dirty="0">
+                <a:ln>
+                  <a:noFill/>
+                </a:ln>
+                <a:solidFill>
+                  <a:srgbClr val="000000"/>
+                </a:solidFill>
+                <a:effectLst/>
+                <a:uLnTx/>
+                <a:uFillTx/>
+                <a:latin typeface="Consolas" panose="020B0609020204030204" pitchFamily="49" charset="0"/>
+                <a:ea typeface="Roboto Light" panose="02000000000000000000" pitchFamily="2" charset="0"/>
+                <a:cs typeface="+mn-cs"/>
+              </a:rPr>
+              <a:t>100 (max. </a:t>
+            </a:r>
+            <a:r>
+              <a:rPr kumimoji="0" lang="de-DE" sz="1200" b="0" i="0" u="none" strike="noStrike" kern="1200" cap="none" spc="0" normalizeH="0" baseline="0" noProof="0" dirty="0" err="1">
+                <a:ln>
+                  <a:noFill/>
+                </a:ln>
+                <a:solidFill>
+                  <a:srgbClr val="000000"/>
+                </a:solidFill>
+                <a:effectLst/>
+                <a:uLnTx/>
+                <a:uFillTx/>
+                <a:latin typeface="Consolas" panose="020B0609020204030204" pitchFamily="49" charset="0"/>
+                <a:ea typeface="Roboto Light" panose="02000000000000000000" pitchFamily="2" charset="0"/>
+                <a:cs typeface="+mn-cs"/>
+              </a:rPr>
+              <a:t>sentence</a:t>
+            </a:r>
+            <a:r>
+              <a:rPr kumimoji="0" lang="de-DE" sz="1200" b="0" i="0" u="none" strike="noStrike" kern="1200" cap="none" spc="0" normalizeH="0" baseline="0" noProof="0" dirty="0">
+                <a:ln>
+                  <a:noFill/>
+                </a:ln>
+                <a:solidFill>
+                  <a:srgbClr val="000000"/>
+                </a:solidFill>
+                <a:effectLst/>
+                <a:uLnTx/>
+                <a:uFillTx/>
+                <a:latin typeface="Consolas" panose="020B0609020204030204" pitchFamily="49" charset="0"/>
+                <a:ea typeface="Roboto Light" panose="02000000000000000000" pitchFamily="2" charset="0"/>
+                <a:cs typeface="+mn-cs"/>
+              </a:rPr>
+              <a:t> </a:t>
+            </a:r>
+            <a:r>
+              <a:rPr kumimoji="0" lang="de-DE" sz="1200" b="0" i="0" u="none" strike="noStrike" kern="1200" cap="none" spc="0" normalizeH="0" baseline="0" noProof="0" dirty="0" err="1">
+                <a:ln>
+                  <a:noFill/>
+                </a:ln>
+                <a:solidFill>
+                  <a:srgbClr val="000000"/>
+                </a:solidFill>
+                <a:effectLst/>
+                <a:uLnTx/>
+                <a:uFillTx/>
+                <a:latin typeface="Consolas" panose="020B0609020204030204" pitchFamily="49" charset="0"/>
+                <a:ea typeface="Roboto Light" panose="02000000000000000000" pitchFamily="2" charset="0"/>
+                <a:cs typeface="+mn-cs"/>
+              </a:rPr>
+              <a:t>length</a:t>
+            </a:r>
+            <a:r>
+              <a:rPr kumimoji="0" lang="de-DE" sz="1200" b="0" i="0" u="none" strike="noStrike" kern="1200" cap="none" spc="0" normalizeH="0" baseline="0" noProof="0" dirty="0">
+                <a:ln>
+                  <a:noFill/>
+                </a:ln>
+                <a:solidFill>
+                  <a:srgbClr val="000000"/>
+                </a:solidFill>
+                <a:effectLst/>
+                <a:uLnTx/>
+                <a:uFillTx/>
+                <a:latin typeface="Consolas" panose="020B0609020204030204" pitchFamily="49" charset="0"/>
+                <a:ea typeface="Roboto Light" panose="02000000000000000000" pitchFamily="2" charset="0"/>
+                <a:cs typeface="+mn-cs"/>
+              </a:rPr>
+              <a:t>), 3</a:t>
+            </a:r>
+          </a:p>
+        </p:txBody>
+      </p:sp>
+      <p:sp>
+        <p:nvSpPr>
+          <p:cNvPr id="12" name="Rechteck: abgerundete Ecken 11">
+            <a:extLst>
+              <a:ext uri="{FF2B5EF4-FFF2-40B4-BE49-F238E27FC236}">
+                <a16:creationId xmlns:a16="http://schemas.microsoft.com/office/drawing/2014/main" id="{34104F71-497A-4055-8040-61413A21982B}"/>
+              </a:ext>
+            </a:extLst>
+          </p:cNvPr>
+          <p:cNvSpPr/>
+          <p:nvPr/>
+        </p:nvSpPr>
+        <p:spPr>
+          <a:xfrm>
+            <a:off x="8563969" y="3334277"/>
+            <a:ext cx="898108" cy="269339"/>
+          </a:xfrm>
+          <a:prstGeom prst="roundRect">
+            <a:avLst/>
+          </a:prstGeom>
+          <a:noFill/>
+          <a:ln w="19050">
+            <a:solidFill>
+              <a:schemeClr val="tx2"/>
+            </a:solidFill>
+          </a:ln>
+        </p:spPr>
+        <p:style>
+          <a:lnRef idx="2">
+            <a:schemeClr val="accent1">
+              <a:shade val="50000"/>
+            </a:schemeClr>
+          </a:lnRef>
+          <a:fillRef idx="1">
+            <a:schemeClr val="accent1"/>
+          </a:fillRef>
+          <a:effectRef idx="0">
+            <a:schemeClr val="accent1"/>
+          </a:effectRef>
+          <a:fontRef idx="minor">
+            <a:schemeClr val="lt1"/>
+          </a:fontRef>
+        </p:style>
+        <p:txBody>
+          <a:bodyPr rtlCol="0" anchor="ctr"/>
+          <a:lstStyle/>
+          <a:p>
+            <a:pPr marL="0" marR="0" lvl="0" indent="0" algn="ctr" defTabSz="713232" rtl="0" eaLnBrk="1" fontAlgn="auto" latinLnBrk="0" hangingPunct="1">
+              <a:lnSpc>
+                <a:spcPct val="100000"/>
+              </a:lnSpc>
+              <a:spcBef>
+                <a:spcPts val="0"/>
+              </a:spcBef>
+              <a:spcAft>
+                <a:spcPts val="0"/>
+              </a:spcAft>
+              <a:buClrTx/>
+              <a:buSzTx/>
+              <a:buFontTx/>
+              <a:buNone/>
+              <a:tabLst/>
+              <a:defRPr/>
+            </a:pPr>
+            <a:r>
+              <a:rPr kumimoji="0" lang="de-DE" sz="1200" b="0" i="0" u="none" strike="noStrike" kern="1200" cap="none" spc="0" normalizeH="0" baseline="0" noProof="0" dirty="0">
+                <a:ln>
+                  <a:noFill/>
+                </a:ln>
+                <a:solidFill>
+                  <a:srgbClr val="000000"/>
+                </a:solidFill>
+                <a:effectLst/>
+                <a:uLnTx/>
+                <a:uFillTx/>
+                <a:latin typeface="Consolas" panose="020B0609020204030204" pitchFamily="49" charset="0"/>
+                <a:ea typeface="Roboto Light" panose="02000000000000000000" pitchFamily="2" charset="0"/>
+                <a:cs typeface="+mn-cs"/>
+              </a:rPr>
+              <a:t>LSTM(64)</a:t>
+            </a:r>
+          </a:p>
+        </p:txBody>
+      </p:sp>
+      <p:cxnSp>
+        <p:nvCxnSpPr>
+          <p:cNvPr id="4" name="Gerade Verbindung mit Pfeil 3">
+            <a:extLst>
+              <a:ext uri="{FF2B5EF4-FFF2-40B4-BE49-F238E27FC236}">
+                <a16:creationId xmlns:a16="http://schemas.microsoft.com/office/drawing/2014/main" id="{1E5A7718-43C6-4268-9CC9-2EEE9D58FCF0}"/>
+              </a:ext>
+            </a:extLst>
+          </p:cNvPr>
+          <p:cNvCxnSpPr>
+            <a:cxnSpLocks/>
+            <a:stCxn id="9" idx="2"/>
+            <a:endCxn id="10" idx="0"/>
+          </p:cNvCxnSpPr>
+          <p:nvPr/>
+        </p:nvCxnSpPr>
+        <p:spPr>
+          <a:xfrm>
+            <a:off x="9006553" y="3065005"/>
+            <a:ext cx="0" cy="203129"/>
+          </a:xfrm>
+          <a:prstGeom prst="straightConnector1">
+            <a:avLst/>
+          </a:prstGeom>
+          <a:ln w="12700">
+            <a:solidFill>
+              <a:schemeClr val="tx1"/>
+            </a:solidFill>
+            <a:tailEnd type="triangle"/>
+          </a:ln>
+        </p:spPr>
+        <p:style>
+          <a:lnRef idx="1">
+            <a:schemeClr val="accent1"/>
+          </a:lnRef>
+          <a:fillRef idx="0">
+            <a:schemeClr val="accent1"/>
+          </a:fillRef>
+          <a:effectRef idx="0">
+            <a:schemeClr val="accent1"/>
+          </a:effectRef>
+          <a:fontRef idx="minor">
+            <a:schemeClr val="tx1"/>
+          </a:fontRef>
+        </p:style>
+      </p:cxnSp>
+      <p:cxnSp>
+        <p:nvCxnSpPr>
+          <p:cNvPr id="22" name="Verbinder: gekrümmt 21">
+            <a:extLst>
+              <a:ext uri="{FF2B5EF4-FFF2-40B4-BE49-F238E27FC236}">
+                <a16:creationId xmlns:a16="http://schemas.microsoft.com/office/drawing/2014/main" id="{898C6857-13B9-4CA7-AA2C-80E6BEBB299B}"/>
+              </a:ext>
+            </a:extLst>
+          </p:cNvPr>
+          <p:cNvCxnSpPr>
+            <a:cxnSpLocks/>
+            <a:stCxn id="12" idx="3"/>
+          </p:cNvCxnSpPr>
+          <p:nvPr/>
+        </p:nvCxnSpPr>
+        <p:spPr>
+          <a:xfrm flipH="1">
+            <a:off x="8930631" y="3468947"/>
+            <a:ext cx="531446" cy="926650"/>
+          </a:xfrm>
+          <a:prstGeom prst="curvedConnector4">
+            <a:avLst>
+              <a:gd name="adj1" fmla="val -43015"/>
+              <a:gd name="adj2" fmla="val 57266"/>
+            </a:avLst>
+          </a:prstGeom>
+          <a:ln w="12700">
+            <a:solidFill>
+              <a:schemeClr val="tx1"/>
+            </a:solidFill>
+            <a:tailEnd type="triangle"/>
+          </a:ln>
+        </p:spPr>
+        <p:style>
+          <a:lnRef idx="1">
+            <a:schemeClr val="accent1"/>
+          </a:lnRef>
+          <a:fillRef idx="0">
+            <a:schemeClr val="accent1"/>
+          </a:fillRef>
+          <a:effectRef idx="0">
+            <a:schemeClr val="accent1"/>
+          </a:effectRef>
+          <a:fontRef idx="minor">
+            <a:schemeClr val="tx1"/>
+          </a:fontRef>
+        </p:style>
+      </p:cxnSp>
+      <p:cxnSp>
+        <p:nvCxnSpPr>
+          <p:cNvPr id="54" name="Gerade Verbindung mit Pfeil 53">
+            <a:extLst>
+              <a:ext uri="{FF2B5EF4-FFF2-40B4-BE49-F238E27FC236}">
+                <a16:creationId xmlns:a16="http://schemas.microsoft.com/office/drawing/2014/main" id="{C20499DF-CC68-41DA-BD4E-F1A8793C1DEF}"/>
+              </a:ext>
+            </a:extLst>
+          </p:cNvPr>
+          <p:cNvCxnSpPr>
+            <a:cxnSpLocks/>
+            <a:stCxn id="71" idx="2"/>
+          </p:cNvCxnSpPr>
+          <p:nvPr/>
+        </p:nvCxnSpPr>
+        <p:spPr>
+          <a:xfrm>
+            <a:off x="8423344" y="4134276"/>
+            <a:ext cx="265978" cy="261321"/>
+          </a:xfrm>
+          <a:prstGeom prst="straightConnector1">
+            <a:avLst/>
+          </a:prstGeom>
+          <a:ln w="12700">
+            <a:solidFill>
+              <a:schemeClr val="tx1"/>
+            </a:solidFill>
+            <a:tailEnd type="triangle"/>
+          </a:ln>
+        </p:spPr>
+        <p:style>
+          <a:lnRef idx="1">
+            <a:schemeClr val="accent1"/>
+          </a:lnRef>
+          <a:fillRef idx="0">
+            <a:schemeClr val="accent1"/>
+          </a:fillRef>
+          <a:effectRef idx="0">
+            <a:schemeClr val="accent1"/>
+          </a:effectRef>
+          <a:fontRef idx="minor">
+            <a:schemeClr val="tx1"/>
+          </a:fontRef>
+        </p:style>
+      </p:cxnSp>
+      <p:sp>
+        <p:nvSpPr>
+          <p:cNvPr id="71" name="Rechteck: abgerundete Ecken 70">
+            <a:extLst>
+              <a:ext uri="{FF2B5EF4-FFF2-40B4-BE49-F238E27FC236}">
+                <a16:creationId xmlns:a16="http://schemas.microsoft.com/office/drawing/2014/main" id="{2BC1AEB0-572F-4D7F-9FF5-BA33A38E69EB}"/>
+              </a:ext>
+            </a:extLst>
+          </p:cNvPr>
+          <p:cNvSpPr/>
+          <p:nvPr/>
+        </p:nvSpPr>
+        <p:spPr>
+          <a:xfrm>
+            <a:off x="7974290" y="3864937"/>
+            <a:ext cx="898108" cy="269339"/>
+          </a:xfrm>
+          <a:prstGeom prst="roundRect">
+            <a:avLst/>
+          </a:prstGeom>
+          <a:noFill/>
+          <a:ln w="19050">
+            <a:solidFill>
+              <a:schemeClr val="tx2"/>
+            </a:solidFill>
+          </a:ln>
+        </p:spPr>
+        <p:style>
+          <a:lnRef idx="2">
+            <a:schemeClr val="accent1">
+              <a:shade val="50000"/>
+            </a:schemeClr>
+          </a:lnRef>
+          <a:fillRef idx="1">
+            <a:schemeClr val="accent1"/>
+          </a:fillRef>
+          <a:effectRef idx="0">
+            <a:schemeClr val="accent1"/>
+          </a:effectRef>
+          <a:fontRef idx="minor">
+            <a:schemeClr val="lt1"/>
+          </a:fontRef>
+        </p:style>
+        <p:txBody>
+          <a:bodyPr rtlCol="0" anchor="ctr"/>
+          <a:lstStyle/>
+          <a:p>
+            <a:pPr marL="0" marR="0" lvl="0" indent="0" algn="ctr" defTabSz="713232" rtl="0" eaLnBrk="1" fontAlgn="auto" latinLnBrk="0" hangingPunct="1">
+              <a:lnSpc>
+                <a:spcPct val="100000"/>
+              </a:lnSpc>
+              <a:spcBef>
+                <a:spcPts val="0"/>
+              </a:spcBef>
+              <a:spcAft>
+                <a:spcPts val="0"/>
+              </a:spcAft>
+              <a:buClrTx/>
+              <a:buSzTx/>
+              <a:buFontTx/>
+              <a:buNone/>
+              <a:tabLst/>
+              <a:defRPr/>
+            </a:pPr>
+            <a:r>
+              <a:rPr kumimoji="0" lang="de-DE" sz="1200" b="0" i="0" u="none" strike="noStrike" kern="1200" cap="none" spc="0" normalizeH="0" baseline="0" noProof="0" dirty="0">
+                <a:ln>
+                  <a:noFill/>
+                </a:ln>
+                <a:solidFill>
+                  <a:srgbClr val="000000"/>
+                </a:solidFill>
+                <a:effectLst/>
+                <a:uLnTx/>
+                <a:uFillTx/>
+                <a:latin typeface="Consolas" panose="020B0609020204030204" pitchFamily="49" charset="0"/>
+                <a:ea typeface="Roboto Light" panose="02000000000000000000" pitchFamily="2" charset="0"/>
+                <a:cs typeface="+mn-cs"/>
+              </a:rPr>
+              <a:t>LSTM(64)</a:t>
+            </a:r>
+          </a:p>
+        </p:txBody>
+      </p:sp>
+      <p:cxnSp>
+        <p:nvCxnSpPr>
+          <p:cNvPr id="73" name="Gerade Verbindung mit Pfeil 72">
+            <a:extLst>
+              <a:ext uri="{FF2B5EF4-FFF2-40B4-BE49-F238E27FC236}">
+                <a16:creationId xmlns:a16="http://schemas.microsoft.com/office/drawing/2014/main" id="{A0886C1A-786D-419F-90D4-9AA2A06BD742}"/>
+              </a:ext>
+            </a:extLst>
+          </p:cNvPr>
+          <p:cNvCxnSpPr>
+            <a:cxnSpLocks/>
+          </p:cNvCxnSpPr>
+          <p:nvPr/>
+        </p:nvCxnSpPr>
+        <p:spPr>
+          <a:xfrm flipH="1">
+            <a:off x="8512441" y="3611700"/>
+            <a:ext cx="234801" cy="209764"/>
+          </a:xfrm>
+          <a:prstGeom prst="straightConnector1">
+            <a:avLst/>
+          </a:prstGeom>
+          <a:ln w="12700">
+            <a:solidFill>
+              <a:schemeClr val="tx1"/>
+            </a:solidFill>
+            <a:tailEnd type="triangle"/>
+          </a:ln>
+        </p:spPr>
+        <p:style>
+          <a:lnRef idx="1">
+            <a:schemeClr val="accent1"/>
+          </a:lnRef>
+          <a:fillRef idx="0">
+            <a:schemeClr val="accent1"/>
+          </a:fillRef>
+          <a:effectRef idx="0">
+            <a:schemeClr val="accent1"/>
+          </a:effectRef>
+          <a:fontRef idx="minor">
+            <a:schemeClr val="tx1"/>
+          </a:fontRef>
+        </p:style>
+      </p:cxnSp>
+      <p:sp>
+        <p:nvSpPr>
+          <p:cNvPr id="75" name="Rechteck: abgerundete Ecken 74">
+            <a:extLst>
+              <a:ext uri="{FF2B5EF4-FFF2-40B4-BE49-F238E27FC236}">
+                <a16:creationId xmlns:a16="http://schemas.microsoft.com/office/drawing/2014/main" id="{3A87A780-9AA6-4DB2-8C61-57FC01F964F9}"/>
+              </a:ext>
+            </a:extLst>
+          </p:cNvPr>
+          <p:cNvSpPr/>
+          <p:nvPr/>
+        </p:nvSpPr>
+        <p:spPr>
+          <a:xfrm>
+            <a:off x="8471808" y="4439499"/>
+            <a:ext cx="898108" cy="269339"/>
+          </a:xfrm>
+          <a:prstGeom prst="roundRect">
+            <a:avLst/>
+          </a:prstGeom>
+          <a:noFill/>
+          <a:ln w="19050">
+            <a:solidFill>
+              <a:schemeClr val="tx2"/>
+            </a:solidFill>
+          </a:ln>
+        </p:spPr>
+        <p:style>
+          <a:lnRef idx="2">
+            <a:schemeClr val="accent1">
+              <a:shade val="50000"/>
+            </a:schemeClr>
+          </a:lnRef>
+          <a:fillRef idx="1">
+            <a:schemeClr val="accent1"/>
+          </a:fillRef>
+          <a:effectRef idx="0">
+            <a:schemeClr val="accent1"/>
+          </a:effectRef>
+          <a:fontRef idx="minor">
+            <a:schemeClr val="lt1"/>
+          </a:fontRef>
+        </p:style>
+        <p:txBody>
+          <a:bodyPr rtlCol="0" anchor="ctr"/>
+          <a:lstStyle/>
+          <a:p>
+            <a:pPr marL="0" marR="0" lvl="0" indent="0" algn="ctr" defTabSz="713232" rtl="0" eaLnBrk="1" fontAlgn="auto" latinLnBrk="0" hangingPunct="1">
+              <a:lnSpc>
+                <a:spcPct val="100000"/>
+              </a:lnSpc>
+              <a:spcBef>
+                <a:spcPts val="0"/>
+              </a:spcBef>
+              <a:spcAft>
+                <a:spcPts val="0"/>
+              </a:spcAft>
+              <a:buClrTx/>
+              <a:buSzTx/>
+              <a:buFontTx/>
+              <a:buNone/>
+              <a:tabLst/>
+              <a:defRPr/>
+            </a:pPr>
+            <a:r>
+              <a:rPr kumimoji="0" lang="de-DE" sz="1200" b="0" i="0" u="none" strike="noStrike" kern="1200" cap="none" spc="0" normalizeH="0" baseline="0" noProof="0" dirty="0">
+                <a:ln>
+                  <a:noFill/>
+                </a:ln>
+                <a:solidFill>
+                  <a:srgbClr val="000000"/>
+                </a:solidFill>
+                <a:effectLst/>
+                <a:uLnTx/>
+                <a:uFillTx/>
+                <a:latin typeface="Consolas" panose="020B0609020204030204" pitchFamily="49" charset="0"/>
+                <a:ea typeface="Roboto Light" panose="02000000000000000000" pitchFamily="2" charset="0"/>
+                <a:cs typeface="+mn-cs"/>
+              </a:rPr>
+              <a:t>DENSE(3)</a:t>
+            </a:r>
+          </a:p>
+        </p:txBody>
+      </p:sp>
+      <p:cxnSp>
+        <p:nvCxnSpPr>
+          <p:cNvPr id="88" name="Gerade Verbindung mit Pfeil 87">
+            <a:extLst>
+              <a:ext uri="{FF2B5EF4-FFF2-40B4-BE49-F238E27FC236}">
+                <a16:creationId xmlns:a16="http://schemas.microsoft.com/office/drawing/2014/main" id="{DBE3DE9B-7A69-4B42-AA14-95DE49F77717}"/>
+              </a:ext>
+            </a:extLst>
+          </p:cNvPr>
+          <p:cNvCxnSpPr>
+            <a:cxnSpLocks/>
+            <a:stCxn id="10" idx="2"/>
+            <a:endCxn id="11" idx="0"/>
+          </p:cNvCxnSpPr>
+          <p:nvPr/>
+        </p:nvCxnSpPr>
+        <p:spPr>
+          <a:xfrm flipH="1">
+            <a:off x="9006552" y="4783668"/>
+            <a:ext cx="1" cy="201075"/>
+          </a:xfrm>
+          <a:prstGeom prst="straightConnector1">
+            <a:avLst/>
+          </a:prstGeom>
+          <a:ln w="12700">
+            <a:solidFill>
+              <a:schemeClr val="tx1"/>
+            </a:solidFill>
+            <a:tailEnd type="triangle"/>
+          </a:ln>
+        </p:spPr>
+        <p:style>
+          <a:lnRef idx="1">
+            <a:schemeClr val="accent1"/>
+          </a:lnRef>
+          <a:fillRef idx="0">
+            <a:schemeClr val="accent1"/>
+          </a:fillRef>
+          <a:effectRef idx="0">
+            <a:schemeClr val="accent1"/>
+          </a:effectRef>
+          <a:fontRef idx="minor">
+            <a:schemeClr val="tx1"/>
+          </a:fontRef>
+        </p:style>
+      </p:cxnSp>
+      <p:sp>
+        <p:nvSpPr>
+          <p:cNvPr id="91" name="Inhaltsplatzhalter 3">
+            <a:extLst>
+              <a:ext uri="{FF2B5EF4-FFF2-40B4-BE49-F238E27FC236}">
+                <a16:creationId xmlns:a16="http://schemas.microsoft.com/office/drawing/2014/main" id="{C0B581E4-8C9A-4AA3-ABF6-9B2C24814396}"/>
               </a:ext>
             </a:extLst>
           </p:cNvPr>
@@ -17623,8 +19085,8 @@
         </p:nvSpPr>
         <p:spPr>
           <a:xfrm>
-            <a:off x="622300" y="1508085"/>
-            <a:ext cx="10456443" cy="4948134"/>
+            <a:off x="622301" y="1508085"/>
+            <a:ext cx="4855632" cy="4948134"/>
           </a:xfrm>
         </p:spPr>
         <p:txBody>
@@ -17663,7 +19125,7 @@
     </p:spTree>
     <p:extLst>
       <p:ext uri="{BB962C8B-B14F-4D97-AF65-F5344CB8AC3E}">
-        <p14:creationId xmlns:p14="http://schemas.microsoft.com/office/powerpoint/2010/main" val="276081715"/>
+        <p14:creationId xmlns:p14="http://schemas.microsoft.com/office/powerpoint/2010/main" val="2889171481"/>
       </p:ext>
     </p:extLst>
   </p:cSld>
@@ -17719,15 +19181,70 @@
           <a:bodyPr/>
           <a:lstStyle/>
           <a:p>
+            <a:pPr marL="0" marR="0" lvl="0" indent="0" algn="r" defTabSz="713232" rtl="0" eaLnBrk="1" fontAlgn="auto" latinLnBrk="0" hangingPunct="1">
+              <a:lnSpc>
+                <a:spcPct val="100000"/>
+              </a:lnSpc>
+              <a:spcBef>
+                <a:spcPts val="0"/>
+              </a:spcBef>
+              <a:spcAft>
+                <a:spcPts val="0"/>
+              </a:spcAft>
+              <a:buClrTx/>
+              <a:buSzTx/>
+              <a:buFontTx/>
+              <a:buNone/>
+              <a:tabLst/>
+              <a:defRPr/>
+            </a:pPr>
             <a:fld id="{54518C2F-5E54-4CF8-B37A-4631A050CED9}" type="slidenum">
-              <a:rPr lang="de-DE" smtClean="0"/>
-              <a:pPr/>
+              <a:rPr kumimoji="0" lang="de-DE" sz="1067" b="0" i="0" u="none" strike="noStrike" kern="1200" cap="none" spc="0" normalizeH="0" baseline="0" noProof="0" smtClean="0">
+                <a:ln>
+                  <a:noFill/>
+                </a:ln>
+                <a:solidFill>
+                  <a:srgbClr val="000000"/>
+                </a:solidFill>
+                <a:effectLst/>
+                <a:uLnTx/>
+                <a:uFillTx/>
+                <a:latin typeface="Arial"/>
+                <a:ea typeface="+mn-ea"/>
+                <a:cs typeface="+mn-cs"/>
+              </a:rPr>
+              <a:pPr marL="0" marR="0" lvl="0" indent="0" algn="r" defTabSz="713232" rtl="0" eaLnBrk="1" fontAlgn="auto" latinLnBrk="0" hangingPunct="1">
+                <a:lnSpc>
+                  <a:spcPct val="100000"/>
+                </a:lnSpc>
+                <a:spcBef>
+                  <a:spcPts val="0"/>
+                </a:spcBef>
+                <a:spcAft>
+                  <a:spcPts val="0"/>
+                </a:spcAft>
+                <a:buClrTx/>
+                <a:buSzTx/>
+                <a:buFontTx/>
+                <a:buNone/>
+                <a:tabLst/>
+                <a:defRPr/>
+              </a:pPr>
               <a:t>6</a:t>
             </a:fld>
-            <a:endParaRPr lang="de-DE" dirty="0">
+            <a:endParaRPr kumimoji="0" lang="de-DE" sz="1067" b="0" i="0" u="none" strike="noStrike" kern="1200" cap="none" spc="0" normalizeH="0" baseline="0" noProof="0" dirty="0">
+              <a:ln>
+                <a:noFill/>
+              </a:ln>
               <a:solidFill>
-                <a:schemeClr val="bg1"/>
+                <a:prstClr val="white"/>
               </a:solidFill>
+              <a:effectLst/>
+              <a:uLnTx/>
+              <a:uFillTx/>
+              <a:latin typeface="Arial"/>
+              <a:ea typeface="+mn-ea"/>
+              <a:cs typeface="+mn-cs"/>
             </a:endParaRPr>
           </a:p>
         </p:txBody>
@@ -17758,34 +19275,175 @@
           <a:bodyPr/>
           <a:lstStyle/>
           <a:p>
-            <a:pPr algn="ctr"/>
-            <a:r>
-              <a:rPr lang="de-DE" dirty="0"/>
-              <a:t>Emotion Analysis | ML-</a:t>
-            </a:r>
-            <a:r>
-              <a:rPr lang="de-DE" dirty="0" err="1"/>
+            <a:pPr marL="0" marR="0" lvl="0" indent="0" algn="ctr" defTabSz="713232" rtl="0" eaLnBrk="1" fontAlgn="auto" latinLnBrk="0" hangingPunct="1">
+              <a:lnSpc>
+                <a:spcPct val="100000"/>
+              </a:lnSpc>
+              <a:spcBef>
+                <a:spcPts val="0"/>
+              </a:spcBef>
+              <a:spcAft>
+                <a:spcPts val="0"/>
+              </a:spcAft>
+              <a:buClrTx/>
+              <a:buSzTx/>
+              <a:buFontTx/>
+              <a:buNone/>
+              <a:tabLst/>
+              <a:defRPr/>
+            </a:pPr>
+            <a:r>
+              <a:rPr kumimoji="0" lang="de-DE" sz="1067" b="0" i="0" u="none" strike="noStrike" kern="1200" cap="none" spc="0" normalizeH="0" baseline="0" noProof="0">
+                <a:ln>
+                  <a:noFill/>
+                </a:ln>
+                <a:solidFill>
+                  <a:prstClr val="white"/>
+                </a:solidFill>
+                <a:effectLst/>
+                <a:uLnTx/>
+                <a:uFillTx/>
+                <a:latin typeface="Arial"/>
+                <a:ea typeface="+mn-ea"/>
+                <a:cs typeface="+mn-cs"/>
+              </a:rPr>
+              <a:t>Emotion </a:t>
+            </a:r>
+            <a:r>
+              <a:rPr kumimoji="0" lang="de-DE" sz="1067" b="0" i="0" u="none" strike="noStrike" kern="1200" cap="none" spc="0" normalizeH="0" baseline="0" noProof="0" dirty="0">
+                <a:ln>
+                  <a:noFill/>
+                </a:ln>
+                <a:solidFill>
+                  <a:prstClr val="white"/>
+                </a:solidFill>
+                <a:effectLst/>
+                <a:uLnTx/>
+                <a:uFillTx/>
+                <a:latin typeface="Arial"/>
+                <a:ea typeface="+mn-ea"/>
+                <a:cs typeface="+mn-cs"/>
+              </a:rPr>
+              <a:t>Analysis | </a:t>
+            </a:r>
+            <a:r>
+              <a:rPr kumimoji="0" lang="de-DE" sz="1067" b="0" i="0" u="none" strike="noStrike" kern="1200" cap="none" spc="0" normalizeH="0" baseline="0" noProof="0">
+                <a:ln>
+                  <a:noFill/>
+                </a:ln>
+                <a:solidFill>
+                  <a:prstClr val="white"/>
+                </a:solidFill>
+                <a:effectLst/>
+                <a:uLnTx/>
+                <a:uFillTx/>
+                <a:latin typeface="Arial"/>
+                <a:ea typeface="+mn-ea"/>
+                <a:cs typeface="+mn-cs"/>
+              </a:rPr>
+              <a:t>ML-</a:t>
+            </a:r>
+            <a:r>
+              <a:rPr kumimoji="0" lang="de-DE" sz="1067" b="0" i="0" u="none" strike="noStrike" kern="1200" cap="none" spc="0" normalizeH="0" baseline="0" noProof="0" err="1">
+                <a:ln>
+                  <a:noFill/>
+                </a:ln>
+                <a:solidFill>
+                  <a:prstClr val="white"/>
+                </a:solidFill>
+                <a:effectLst/>
+                <a:uLnTx/>
+                <a:uFillTx/>
+                <a:latin typeface="Arial"/>
+                <a:ea typeface="+mn-ea"/>
+                <a:cs typeface="+mn-cs"/>
+              </a:rPr>
               <a:t>based</a:t>
             </a:r>
             <a:r>
-              <a:rPr lang="de-DE" dirty="0"/>
-              <a:t> Emotion </a:t>
-            </a:r>
-            <a:r>
-              <a:rPr lang="de-DE" dirty="0" err="1"/>
-              <a:t>Role</a:t>
-            </a:r>
-            <a:r>
-              <a:rPr lang="de-DE" dirty="0"/>
-              <a:t> </a:t>
-            </a:r>
-            <a:r>
-              <a:rPr lang="de-DE" dirty="0" err="1"/>
+              <a:rPr kumimoji="0" lang="de-DE" sz="1067" b="0" i="0" u="none" strike="noStrike" kern="1200" cap="none" spc="0" normalizeH="0" baseline="0" noProof="0">
+                <a:ln>
+                  <a:noFill/>
+                </a:ln>
+                <a:solidFill>
+                  <a:prstClr val="white"/>
+                </a:solidFill>
+                <a:effectLst/>
+                <a:uLnTx/>
+                <a:uFillTx/>
+                <a:latin typeface="Arial"/>
+                <a:ea typeface="+mn-ea"/>
+                <a:cs typeface="+mn-cs"/>
+              </a:rPr>
+              <a:t> Emotion Role </a:t>
+            </a:r>
+            <a:r>
+              <a:rPr kumimoji="0" lang="de-DE" sz="1067" b="0" i="0" u="none" strike="noStrike" kern="1200" cap="none" spc="0" normalizeH="0" baseline="0" noProof="0" dirty="0" err="1">
+                <a:ln>
+                  <a:noFill/>
+                </a:ln>
+                <a:solidFill>
+                  <a:prstClr val="white"/>
+                </a:solidFill>
+                <a:effectLst/>
+                <a:uLnTx/>
+                <a:uFillTx/>
+                <a:latin typeface="Arial"/>
+                <a:ea typeface="+mn-ea"/>
+                <a:cs typeface="+mn-cs"/>
+              </a:rPr>
               <a:t>Labelling</a:t>
             </a:r>
             <a:r>
-              <a:rPr lang="de-DE" dirty="0"/>
-              <a:t>		           Felix Bühler | Max Wegge | Carlotta Quensel</a:t>
+              <a:rPr kumimoji="0" lang="de-DE" sz="1067" b="0" i="0" u="none" strike="noStrike" kern="1200" cap="none" spc="0" normalizeH="0" baseline="0" noProof="0" dirty="0">
+                <a:ln>
+                  <a:noFill/>
+                </a:ln>
+                <a:solidFill>
+                  <a:prstClr val="white"/>
+                </a:solidFill>
+                <a:effectLst/>
+                <a:uLnTx/>
+                <a:uFillTx/>
+                <a:latin typeface="Arial"/>
+                <a:ea typeface="+mn-ea"/>
+                <a:cs typeface="+mn-cs"/>
+              </a:rPr>
+              <a:t>		           Felix Bühler | Max Wegge </a:t>
+            </a:r>
+            <a:r>
+              <a:rPr kumimoji="0" lang="de-DE" sz="1067" b="0" i="0" u="none" strike="noStrike" kern="1200" cap="none" spc="0" normalizeH="0" baseline="0" noProof="0">
+                <a:ln>
+                  <a:noFill/>
+                </a:ln>
+                <a:solidFill>
+                  <a:prstClr val="white"/>
+                </a:solidFill>
+                <a:effectLst/>
+                <a:uLnTx/>
+                <a:uFillTx/>
+                <a:latin typeface="Arial"/>
+                <a:ea typeface="+mn-ea"/>
+                <a:cs typeface="+mn-cs"/>
+              </a:rPr>
+              <a:t>| Carlotta </a:t>
+            </a:r>
+            <a:r>
+              <a:rPr kumimoji="0" lang="de-DE" sz="1067" b="0" i="0" u="none" strike="noStrike" kern="1200" cap="none" spc="0" normalizeH="0" baseline="0" noProof="0" dirty="0">
+                <a:ln>
+                  <a:noFill/>
+                </a:ln>
+                <a:solidFill>
+                  <a:prstClr val="white"/>
+                </a:solidFill>
+                <a:effectLst/>
+                <a:uLnTx/>
+                <a:uFillTx/>
+                <a:latin typeface="Arial"/>
+                <a:ea typeface="+mn-ea"/>
+                <a:cs typeface="+mn-cs"/>
+              </a:rPr>
+              <a:t>Quensel</a:t>
             </a:r>
           </a:p>
         </p:txBody>
@@ -17806,8 +19464,8 @@
         </p:nvSpPr>
         <p:spPr>
           <a:xfrm>
-            <a:off x="624422" y="236155"/>
-            <a:ext cx="10993967" cy="336000"/>
+            <a:off x="624422" y="236154"/>
+            <a:ext cx="10993967" cy="830871"/>
           </a:xfrm>
           <a:prstGeom prst="rect">
             <a:avLst/>
@@ -17837,22 +19495,69 @@
             </a:lvl1pPr>
           </a:lstStyle>
           <a:p>
-            <a:r>
-              <a:rPr lang="de-DE" dirty="0" err="1">
-                <a:latin typeface="Calibri" panose="020F0502020204030204" pitchFamily="34" charset="0"/>
+            <a:pPr marL="0" marR="0" lvl="0" indent="0" algn="l" defTabSz="914368" rtl="0" eaLnBrk="1" fontAlgn="auto" latinLnBrk="0" hangingPunct="1">
+              <a:lnSpc>
+                <a:spcPct val="90000"/>
+              </a:lnSpc>
+              <a:spcBef>
+                <a:spcPct val="0"/>
+              </a:spcBef>
+              <a:spcAft>
+                <a:spcPts val="0"/>
+              </a:spcAft>
+              <a:buClrTx/>
+              <a:buSzTx/>
+              <a:buFontTx/>
+              <a:buNone/>
+              <a:tabLst/>
+              <a:defRPr/>
+            </a:pPr>
+            <a:r>
+              <a:rPr kumimoji="0" lang="de-DE" sz="2800" b="0" i="0" u="none" strike="noStrike" kern="1200" cap="none" spc="0" normalizeH="0" baseline="0" noProof="0" dirty="0">
+                <a:ln>
+                  <a:noFill/>
+                </a:ln>
+                <a:solidFill>
+                  <a:srgbClr val="3E444C"/>
+                </a:solidFill>
+                <a:effectLst/>
+                <a:uLnTx/>
+                <a:uFillTx/>
+                <a:latin typeface="Roboto" panose="02000000000000000000" pitchFamily="2" charset="0"/>
+                <a:ea typeface="Roboto" panose="02000000000000000000" pitchFamily="2" charset="0"/>
                 <a:cs typeface="Calibri" panose="020F0502020204030204" pitchFamily="34" charset="0"/>
               </a:rPr>
-              <a:t>evaluation</a:t>
+              <a:t>Evaluation</a:t>
             </a:r>
             <a:br>
-              <a:rPr lang="de-DE" dirty="0">
-                <a:latin typeface="Calibri" panose="020F0502020204030204" pitchFamily="34" charset="0"/>
+              <a:rPr kumimoji="0" lang="de-DE" sz="2800" b="0" i="0" u="none" strike="noStrike" kern="1200" cap="none" spc="0" normalizeH="0" baseline="0" noProof="0" dirty="0">
+                <a:ln>
+                  <a:noFill/>
+                </a:ln>
+                <a:solidFill>
+                  <a:srgbClr val="3E444C"/>
+                </a:solidFill>
+                <a:effectLst/>
+                <a:uLnTx/>
+                <a:uFillTx/>
+                <a:latin typeface="Roboto" panose="02000000000000000000" pitchFamily="2" charset="0"/>
+                <a:ea typeface="Roboto" panose="02000000000000000000" pitchFamily="2" charset="0"/>
                 <a:cs typeface="Calibri" panose="020F0502020204030204" pitchFamily="34" charset="0"/>
               </a:rPr>
             </a:br>
             <a:r>
-              <a:rPr lang="en-US" b="0" dirty="0">
-                <a:latin typeface="Calibri" panose="020F0502020204030204" pitchFamily="34" charset="0"/>
+              <a:rPr kumimoji="0" lang="en-US" sz="2800" b="0" i="0" u="none" strike="noStrike" kern="1200" cap="none" spc="0" normalizeH="0" baseline="0" noProof="0" dirty="0">
+                <a:ln>
+                  <a:noFill/>
+                </a:ln>
+                <a:solidFill>
+                  <a:srgbClr val="3E444C"/>
+                </a:solidFill>
+                <a:effectLst/>
+                <a:uLnTx/>
+                <a:uFillTx/>
+                <a:latin typeface="Roboto" panose="02000000000000000000" pitchFamily="2" charset="0"/>
+                <a:ea typeface="Roboto" panose="02000000000000000000" pitchFamily="2" charset="0"/>
                 <a:cs typeface="Calibri" panose="020F0502020204030204" pitchFamily="34" charset="0"/>
               </a:rPr>
               <a:t>interpretation</a:t>
@@ -17862,10 +19567,2641 @@
       </p:sp>
       <p:sp>
         <p:nvSpPr>
-          <p:cNvPr id="7" name="Inhaltsplatzhalter 3">
+          <p:cNvPr id="2" name="Textfeld 1">
             <a:extLst>
               <a:ext uri="{FF2B5EF4-FFF2-40B4-BE49-F238E27FC236}">
-                <a16:creationId xmlns:a16="http://schemas.microsoft.com/office/drawing/2014/main" id="{514DE648-80A0-4EF3-AB1B-044DAFBD5493}"/>
+                <a16:creationId xmlns:a16="http://schemas.microsoft.com/office/drawing/2014/main" id="{2F2A865B-A727-4BE8-9D6C-FDEFEF63015D}"/>
+              </a:ext>
+            </a:extLst>
+          </p:cNvPr>
+          <p:cNvSpPr txBox="1"/>
+          <p:nvPr/>
+        </p:nvSpPr>
+        <p:spPr>
+          <a:xfrm>
+            <a:off x="5169065" y="1996867"/>
+            <a:ext cx="1005894" cy="238783"/>
+          </a:xfrm>
+          <a:prstGeom prst="rect">
+            <a:avLst/>
+          </a:prstGeom>
+          <a:noFill/>
+        </p:spPr>
+        <p:txBody>
+          <a:bodyPr wrap="square" lIns="0" tIns="0" rIns="0" bIns="0" rtlCol="0">
+            <a:spAutoFit/>
+          </a:bodyPr>
+          <a:lstStyle/>
+          <a:p>
+            <a:pPr marL="0" marR="0" lvl="0" indent="0" algn="r" defTabSz="713232" rtl="0" eaLnBrk="1" fontAlgn="auto" latinLnBrk="0" hangingPunct="1">
+              <a:lnSpc>
+                <a:spcPct val="120000"/>
+              </a:lnSpc>
+              <a:spcBef>
+                <a:spcPts val="750"/>
+              </a:spcBef>
+              <a:spcAft>
+                <a:spcPts val="0"/>
+              </a:spcAft>
+              <a:buClr>
+                <a:srgbClr val="00BEFF"/>
+              </a:buClr>
+              <a:buSzTx/>
+              <a:buFontTx/>
+              <a:buNone/>
+              <a:tabLst/>
+              <a:defRPr/>
+            </a:pPr>
+            <a:r>
+              <a:rPr kumimoji="0" lang="en-US" sz="1400" b="0" i="0" u="none" strike="noStrike" kern="1200" cap="none" spc="0" normalizeH="0" baseline="0" noProof="0" dirty="0">
+                <a:ln>
+                  <a:noFill/>
+                </a:ln>
+                <a:solidFill>
+                  <a:srgbClr val="000000"/>
+                </a:solidFill>
+                <a:effectLst/>
+                <a:uLnTx/>
+                <a:uFillTx/>
+                <a:latin typeface="Roboto Light" panose="02000000000000000000" pitchFamily="2" charset="0"/>
+                <a:ea typeface="Roboto Light" panose="02000000000000000000" pitchFamily="2" charset="0"/>
+                <a:cs typeface="+mn-cs"/>
+              </a:rPr>
+              <a:t>ID ‘</a:t>
+            </a:r>
+            <a:r>
+              <a:rPr kumimoji="0" lang="de-DE" sz="1400" b="0" i="0" u="none" strike="noStrike" kern="1200" cap="none" spc="0" normalizeH="0" baseline="0" noProof="0" dirty="0">
+                <a:ln>
+                  <a:noFill/>
+                </a:ln>
+                <a:solidFill>
+                  <a:srgbClr val="3E444C"/>
+                </a:solidFill>
+                <a:effectLst/>
+                <a:uLnTx/>
+                <a:uFillTx/>
+                <a:latin typeface="Roboto Light" panose="02000000000000000000" pitchFamily="2" charset="0"/>
+                <a:ea typeface="Roboto Light" panose="02000000000000000000" pitchFamily="2" charset="0"/>
+                <a:cs typeface="+mn-cs"/>
+              </a:rPr>
+              <a:t>gne-84‘</a:t>
+            </a:r>
+            <a:endParaRPr kumimoji="0" lang="de-DE" sz="1400" b="0" i="0" u="none" strike="noStrike" kern="1200" cap="none" spc="0" normalizeH="0" baseline="0" noProof="0" dirty="0">
+              <a:ln>
+                <a:noFill/>
+              </a:ln>
+              <a:solidFill>
+                <a:srgbClr val="000000"/>
+              </a:solidFill>
+              <a:effectLst/>
+              <a:uLnTx/>
+              <a:uFillTx/>
+              <a:latin typeface="Roboto Light" panose="02000000000000000000" pitchFamily="2" charset="0"/>
+              <a:ea typeface="Roboto Light" panose="02000000000000000000" pitchFamily="2" charset="0"/>
+              <a:cs typeface="+mn-cs"/>
+            </a:endParaRPr>
+          </a:p>
+        </p:txBody>
+      </p:sp>
+      <p:sp>
+        <p:nvSpPr>
+          <p:cNvPr id="11" name="Textfeld 10">
+            <a:extLst>
+              <a:ext uri="{FF2B5EF4-FFF2-40B4-BE49-F238E27FC236}">
+                <a16:creationId xmlns:a16="http://schemas.microsoft.com/office/drawing/2014/main" id="{C5CA17EB-6644-4C5D-BC10-BB9DF90A900F}"/>
+              </a:ext>
+            </a:extLst>
+          </p:cNvPr>
+          <p:cNvSpPr txBox="1"/>
+          <p:nvPr/>
+        </p:nvSpPr>
+        <p:spPr>
+          <a:xfrm>
+            <a:off x="6621518" y="1998773"/>
+            <a:ext cx="5952488" cy="204671"/>
+          </a:xfrm>
+          <a:prstGeom prst="rect">
+            <a:avLst/>
+          </a:prstGeom>
+          <a:noFill/>
+        </p:spPr>
+        <p:txBody>
+          <a:bodyPr wrap="square" lIns="0" tIns="0" rIns="0" bIns="0" rtlCol="0">
+            <a:spAutoFit/>
+          </a:bodyPr>
+          <a:lstStyle/>
+          <a:p>
+            <a:pPr marL="0" marR="0" lvl="0" indent="0" algn="l" defTabSz="713232" rtl="0" eaLnBrk="1" fontAlgn="auto" latinLnBrk="0" hangingPunct="1">
+              <a:lnSpc>
+                <a:spcPct val="120000"/>
+              </a:lnSpc>
+              <a:spcBef>
+                <a:spcPts val="750"/>
+              </a:spcBef>
+              <a:spcAft>
+                <a:spcPts val="0"/>
+              </a:spcAft>
+              <a:buClr>
+                <a:srgbClr val="00BEFF"/>
+              </a:buClr>
+              <a:buSzTx/>
+              <a:buFontTx/>
+              <a:buNone/>
+              <a:tabLst/>
+              <a:defRPr/>
+            </a:pPr>
+            <a:r>
+              <a:rPr kumimoji="0" lang="en-US" sz="1200" b="0" i="0" u="none" strike="noStrike" kern="1200" cap="none" spc="0" normalizeH="0" baseline="0" noProof="0" dirty="0">
+                <a:ln>
+                  <a:noFill/>
+                </a:ln>
+                <a:solidFill>
+                  <a:srgbClr val="3E444C"/>
+                </a:solidFill>
+                <a:effectLst/>
+                <a:uLnTx/>
+                <a:uFillTx/>
+                <a:latin typeface="Roboto Light" panose="02000000000000000000" pitchFamily="2" charset="0"/>
+                <a:ea typeface="Roboto Light" panose="02000000000000000000" pitchFamily="2" charset="0"/>
+                <a:cs typeface="+mn-cs"/>
+              </a:rPr>
+              <a:t>"Manchin knocks Barr : He should be focused on protecting the Constitution"</a:t>
+            </a:r>
+            <a:endParaRPr kumimoji="0" lang="de-DE" sz="800" b="0" i="0" u="none" strike="noStrike" kern="1200" cap="none" spc="0" normalizeH="0" baseline="0" noProof="0" dirty="0">
+              <a:ln>
+                <a:noFill/>
+              </a:ln>
+              <a:solidFill>
+                <a:srgbClr val="9F9998"/>
+              </a:solidFill>
+              <a:effectLst/>
+              <a:uLnTx/>
+              <a:uFillTx/>
+              <a:latin typeface="Roboto Light" panose="02000000000000000000" pitchFamily="2" charset="0"/>
+              <a:ea typeface="Roboto Light" panose="02000000000000000000" pitchFamily="2" charset="0"/>
+              <a:cs typeface="+mn-cs"/>
+            </a:endParaRPr>
+          </a:p>
+        </p:txBody>
+      </p:sp>
+      <p:sp>
+        <p:nvSpPr>
+          <p:cNvPr id="12" name="Textfeld 11">
+            <a:extLst>
+              <a:ext uri="{FF2B5EF4-FFF2-40B4-BE49-F238E27FC236}">
+                <a16:creationId xmlns:a16="http://schemas.microsoft.com/office/drawing/2014/main" id="{B432D1EC-D673-4D46-BF0E-405F336BFE40}"/>
+              </a:ext>
+            </a:extLst>
+          </p:cNvPr>
+          <p:cNvSpPr txBox="1"/>
+          <p:nvPr/>
+        </p:nvSpPr>
+        <p:spPr>
+          <a:xfrm>
+            <a:off x="6651810" y="2624023"/>
+            <a:ext cx="5294832" cy="205762"/>
+          </a:xfrm>
+          <a:prstGeom prst="rect">
+            <a:avLst/>
+          </a:prstGeom>
+          <a:noFill/>
+        </p:spPr>
+        <p:txBody>
+          <a:bodyPr wrap="square" lIns="0" tIns="0" rIns="0" bIns="0" rtlCol="0">
+            <a:spAutoFit/>
+          </a:bodyPr>
+          <a:lstStyle/>
+          <a:p>
+            <a:pPr marL="0" marR="0" lvl="0" indent="0" algn="l" defTabSz="713232" rtl="0" eaLnBrk="1" fontAlgn="auto" latinLnBrk="0" hangingPunct="1">
+              <a:lnSpc>
+                <a:spcPct val="120000"/>
+              </a:lnSpc>
+              <a:spcBef>
+                <a:spcPts val="750"/>
+              </a:spcBef>
+              <a:spcAft>
+                <a:spcPts val="0"/>
+              </a:spcAft>
+              <a:buClr>
+                <a:srgbClr val="00BEFF"/>
+              </a:buClr>
+              <a:buSzTx/>
+              <a:buFontTx/>
+              <a:buNone/>
+              <a:tabLst/>
+              <a:defRPr/>
+            </a:pPr>
+            <a:r>
+              <a:rPr kumimoji="0" lang="pl-PL" sz="1200" b="0" i="0" u="none" strike="noStrike" kern="1200" cap="none" spc="0" normalizeH="0" baseline="0" noProof="0" dirty="0">
+                <a:ln>
+                  <a:noFill/>
+                </a:ln>
+                <a:solidFill>
+                  <a:srgbClr val="9F9998"/>
+                </a:solidFill>
+                <a:effectLst/>
+                <a:uLnTx/>
+                <a:uFillTx/>
+                <a:latin typeface="Consolas" panose="020B0609020204030204" pitchFamily="49" charset="0"/>
+                <a:ea typeface="+mn-ea"/>
+                <a:cs typeface="+mn-cs"/>
+              </a:rPr>
+              <a:t>[</a:t>
+            </a:r>
+            <a:r>
+              <a:rPr kumimoji="0" lang="de-DE" sz="1200" b="0" i="0" u="none" strike="noStrike" kern="1200" cap="none" spc="0" normalizeH="0" baseline="0" noProof="0" dirty="0">
+                <a:ln>
+                  <a:noFill/>
+                </a:ln>
+                <a:solidFill>
+                  <a:srgbClr val="9F9998"/>
+                </a:solidFill>
+                <a:effectLst/>
+                <a:uLnTx/>
+                <a:uFillTx/>
+                <a:latin typeface="Consolas" panose="020B0609020204030204" pitchFamily="49" charset="0"/>
+                <a:ea typeface="+mn-ea"/>
+                <a:cs typeface="+mn-cs"/>
+              </a:rPr>
+              <a:t> </a:t>
+            </a:r>
+            <a:r>
+              <a:rPr kumimoji="0" lang="pl-PL" sz="1200" b="0" i="0" u="none" strike="noStrike" kern="1200" cap="none" spc="0" normalizeH="0" baseline="0" noProof="0" dirty="0">
+                <a:ln>
+                  <a:noFill/>
+                </a:ln>
+                <a:solidFill>
+                  <a:srgbClr val="000000"/>
+                </a:solidFill>
+                <a:effectLst/>
+                <a:uLnTx/>
+                <a:uFillTx/>
+                <a:latin typeface="Consolas" panose="020B0609020204030204" pitchFamily="49" charset="0"/>
+                <a:ea typeface="+mn-ea"/>
+                <a:cs typeface="+mn-cs"/>
+              </a:rPr>
+              <a:t>"B"</a:t>
+            </a:r>
+            <a:r>
+              <a:rPr kumimoji="0" lang="pl-PL" sz="1200" b="0" i="0" u="none" strike="noStrike" kern="1200" cap="none" spc="0" normalizeH="0" baseline="0" noProof="0" dirty="0">
+                <a:ln>
+                  <a:noFill/>
+                </a:ln>
+                <a:solidFill>
+                  <a:srgbClr val="9F9998"/>
+                </a:solidFill>
+                <a:effectLst/>
+                <a:uLnTx/>
+                <a:uFillTx/>
+                <a:latin typeface="Consolas" panose="020B0609020204030204" pitchFamily="49" charset="0"/>
+                <a:ea typeface="+mn-ea"/>
+                <a:cs typeface="+mn-cs"/>
+              </a:rPr>
+              <a:t>, "O",</a:t>
+            </a:r>
+            <a:r>
+              <a:rPr kumimoji="0" lang="de-DE" sz="1200" b="0" i="0" u="none" strike="noStrike" kern="1200" cap="none" spc="0" normalizeH="0" baseline="0" noProof="0" dirty="0">
+                <a:ln>
+                  <a:noFill/>
+                </a:ln>
+                <a:solidFill>
+                  <a:srgbClr val="9F9998"/>
+                </a:solidFill>
+                <a:effectLst/>
+                <a:uLnTx/>
+                <a:uFillTx/>
+                <a:latin typeface="Consolas" panose="020B0609020204030204" pitchFamily="49" charset="0"/>
+                <a:ea typeface="+mn-ea"/>
+                <a:cs typeface="+mn-cs"/>
+              </a:rPr>
+              <a:t> </a:t>
+            </a:r>
+            <a:r>
+              <a:rPr kumimoji="0" lang="pl-PL" sz="1200" b="0" i="0" u="none" strike="noStrike" kern="1200" cap="none" spc="0" normalizeH="0" baseline="0" noProof="0" dirty="0">
+                <a:ln>
+                  <a:noFill/>
+                </a:ln>
+                <a:solidFill>
+                  <a:srgbClr val="9F9998"/>
+                </a:solidFill>
+                <a:effectLst/>
+                <a:uLnTx/>
+                <a:uFillTx/>
+                <a:latin typeface="Consolas" panose="020B0609020204030204" pitchFamily="49" charset="0"/>
+                <a:ea typeface="+mn-ea"/>
+                <a:cs typeface="+mn-cs"/>
+              </a:rPr>
+              <a:t>"O",</a:t>
+            </a:r>
+            <a:r>
+              <a:rPr kumimoji="0" lang="de-DE" sz="1200" b="0" i="0" u="none" strike="noStrike" kern="1200" cap="none" spc="0" normalizeH="0" baseline="0" noProof="0" dirty="0">
+                <a:ln>
+                  <a:noFill/>
+                </a:ln>
+                <a:solidFill>
+                  <a:srgbClr val="9F9998"/>
+                </a:solidFill>
+                <a:effectLst/>
+                <a:uLnTx/>
+                <a:uFillTx/>
+                <a:latin typeface="Consolas" panose="020B0609020204030204" pitchFamily="49" charset="0"/>
+                <a:ea typeface="+mn-ea"/>
+                <a:cs typeface="+mn-cs"/>
+              </a:rPr>
+              <a:t> </a:t>
+            </a:r>
+            <a:r>
+              <a:rPr kumimoji="0" lang="pl-PL" sz="1200" b="0" i="0" u="none" strike="noStrike" kern="1200" cap="none" spc="0" normalizeH="0" baseline="0" noProof="0" dirty="0">
+                <a:ln>
+                  <a:noFill/>
+                </a:ln>
+                <a:solidFill>
+                  <a:srgbClr val="9F9998"/>
+                </a:solidFill>
+                <a:effectLst/>
+                <a:uLnTx/>
+                <a:uFillTx/>
+                <a:latin typeface="Consolas" panose="020B0609020204030204" pitchFamily="49" charset="0"/>
+                <a:ea typeface="+mn-ea"/>
+                <a:cs typeface="+mn-cs"/>
+              </a:rPr>
+              <a:t>"O", </a:t>
+            </a:r>
+            <a:r>
+              <a:rPr kumimoji="0" lang="pl-PL" sz="1200" b="0" i="0" u="none" strike="noStrike" kern="1200" cap="none" spc="0" normalizeH="0" baseline="0" noProof="0" dirty="0">
+                <a:ln>
+                  <a:noFill/>
+                </a:ln>
+                <a:solidFill>
+                  <a:srgbClr val="000000"/>
+                </a:solidFill>
+                <a:effectLst/>
+                <a:uLnTx/>
+                <a:uFillTx/>
+                <a:latin typeface="Consolas" panose="020B0609020204030204" pitchFamily="49" charset="0"/>
+                <a:ea typeface="+mn-ea"/>
+                <a:cs typeface="+mn-cs"/>
+              </a:rPr>
+              <a:t>"B",</a:t>
+            </a:r>
+            <a:r>
+              <a:rPr kumimoji="0" lang="de-DE" sz="1200" b="0" i="0" u="none" strike="noStrike" kern="1200" cap="none" spc="0" normalizeH="0" baseline="0" noProof="0" dirty="0">
+                <a:ln>
+                  <a:noFill/>
+                </a:ln>
+                <a:solidFill>
+                  <a:srgbClr val="000000"/>
+                </a:solidFill>
+                <a:effectLst/>
+                <a:uLnTx/>
+                <a:uFillTx/>
+                <a:latin typeface="Consolas" panose="020B0609020204030204" pitchFamily="49" charset="0"/>
+                <a:ea typeface="+mn-ea"/>
+                <a:cs typeface="+mn-cs"/>
+              </a:rPr>
+              <a:t> </a:t>
+            </a:r>
+            <a:r>
+              <a:rPr kumimoji="0" lang="pl-PL" sz="1200" b="0" i="0" u="none" strike="noStrike" kern="1200" cap="none" spc="0" normalizeH="0" baseline="0" noProof="0" dirty="0">
+                <a:ln>
+                  <a:noFill/>
+                </a:ln>
+                <a:solidFill>
+                  <a:srgbClr val="000000"/>
+                </a:solidFill>
+                <a:effectLst/>
+                <a:uLnTx/>
+                <a:uFillTx/>
+                <a:latin typeface="Consolas" panose="020B0609020204030204" pitchFamily="49" charset="0"/>
+                <a:ea typeface="+mn-ea"/>
+                <a:cs typeface="+mn-cs"/>
+              </a:rPr>
+              <a:t>"I",</a:t>
+            </a:r>
+            <a:r>
+              <a:rPr kumimoji="0" lang="de-DE" sz="1200" b="0" i="0" u="none" strike="noStrike" kern="1200" cap="none" spc="0" normalizeH="0" baseline="0" noProof="0" dirty="0">
+                <a:ln>
+                  <a:noFill/>
+                </a:ln>
+                <a:solidFill>
+                  <a:srgbClr val="000000"/>
+                </a:solidFill>
+                <a:effectLst/>
+                <a:uLnTx/>
+                <a:uFillTx/>
+                <a:latin typeface="Consolas" panose="020B0609020204030204" pitchFamily="49" charset="0"/>
+                <a:ea typeface="+mn-ea"/>
+                <a:cs typeface="+mn-cs"/>
+              </a:rPr>
+              <a:t> </a:t>
+            </a:r>
+            <a:r>
+              <a:rPr kumimoji="0" lang="pl-PL" sz="1200" b="0" i="0" u="none" strike="noStrike" kern="1200" cap="none" spc="0" normalizeH="0" baseline="0" noProof="0" dirty="0">
+                <a:ln>
+                  <a:noFill/>
+                </a:ln>
+                <a:solidFill>
+                  <a:srgbClr val="000000"/>
+                </a:solidFill>
+                <a:effectLst/>
+                <a:uLnTx/>
+                <a:uFillTx/>
+                <a:latin typeface="Consolas" panose="020B0609020204030204" pitchFamily="49" charset="0"/>
+                <a:ea typeface="+mn-ea"/>
+                <a:cs typeface="+mn-cs"/>
+              </a:rPr>
+              <a:t>"I",</a:t>
+            </a:r>
+            <a:r>
+              <a:rPr kumimoji="0" lang="de-DE" sz="1200" b="0" i="0" u="none" strike="noStrike" kern="1200" cap="none" spc="0" normalizeH="0" baseline="0" noProof="0" dirty="0">
+                <a:ln>
+                  <a:noFill/>
+                </a:ln>
+                <a:solidFill>
+                  <a:srgbClr val="000000"/>
+                </a:solidFill>
+                <a:effectLst/>
+                <a:uLnTx/>
+                <a:uFillTx/>
+                <a:latin typeface="Consolas" panose="020B0609020204030204" pitchFamily="49" charset="0"/>
+                <a:ea typeface="+mn-ea"/>
+                <a:cs typeface="+mn-cs"/>
+              </a:rPr>
+              <a:t> </a:t>
+            </a:r>
+            <a:r>
+              <a:rPr kumimoji="0" lang="pl-PL" sz="1200" b="0" i="0" u="none" strike="noStrike" kern="1200" cap="none" spc="0" normalizeH="0" baseline="0" noProof="0" dirty="0">
+                <a:ln>
+                  <a:noFill/>
+                </a:ln>
+                <a:solidFill>
+                  <a:srgbClr val="000000"/>
+                </a:solidFill>
+                <a:effectLst/>
+                <a:uLnTx/>
+                <a:uFillTx/>
+                <a:latin typeface="Consolas" panose="020B0609020204030204" pitchFamily="49" charset="0"/>
+                <a:ea typeface="+mn-ea"/>
+                <a:cs typeface="+mn-cs"/>
+              </a:rPr>
+              <a:t>"I",</a:t>
+            </a:r>
+            <a:r>
+              <a:rPr kumimoji="0" lang="de-DE" sz="1200" b="0" i="0" u="none" strike="noStrike" kern="1200" cap="none" spc="0" normalizeH="0" baseline="0" noProof="0" dirty="0">
+                <a:ln>
+                  <a:noFill/>
+                </a:ln>
+                <a:solidFill>
+                  <a:srgbClr val="000000"/>
+                </a:solidFill>
+                <a:effectLst/>
+                <a:uLnTx/>
+                <a:uFillTx/>
+                <a:latin typeface="Consolas" panose="020B0609020204030204" pitchFamily="49" charset="0"/>
+                <a:ea typeface="+mn-ea"/>
+                <a:cs typeface="+mn-cs"/>
+              </a:rPr>
+              <a:t> </a:t>
+            </a:r>
+            <a:r>
+              <a:rPr kumimoji="0" lang="pl-PL" sz="1200" b="0" i="0" u="none" strike="noStrike" kern="1200" cap="none" spc="0" normalizeH="0" baseline="0" noProof="0" dirty="0">
+                <a:ln>
+                  <a:noFill/>
+                </a:ln>
+                <a:solidFill>
+                  <a:srgbClr val="000000"/>
+                </a:solidFill>
+                <a:effectLst/>
+                <a:uLnTx/>
+                <a:uFillTx/>
+                <a:latin typeface="Consolas" panose="020B0609020204030204" pitchFamily="49" charset="0"/>
+                <a:ea typeface="+mn-ea"/>
+                <a:cs typeface="+mn-cs"/>
+              </a:rPr>
+              <a:t>"I",</a:t>
+            </a:r>
+            <a:r>
+              <a:rPr kumimoji="0" lang="de-DE" sz="1200" b="0" i="0" u="none" strike="noStrike" kern="1200" cap="none" spc="0" normalizeH="0" baseline="0" noProof="0" dirty="0">
+                <a:ln>
+                  <a:noFill/>
+                </a:ln>
+                <a:solidFill>
+                  <a:srgbClr val="000000"/>
+                </a:solidFill>
+                <a:effectLst/>
+                <a:uLnTx/>
+                <a:uFillTx/>
+                <a:latin typeface="Consolas" panose="020B0609020204030204" pitchFamily="49" charset="0"/>
+                <a:ea typeface="+mn-ea"/>
+                <a:cs typeface="+mn-cs"/>
+              </a:rPr>
+              <a:t> </a:t>
+            </a:r>
+            <a:r>
+              <a:rPr kumimoji="0" lang="pl-PL" sz="1200" b="0" i="0" u="none" strike="noStrike" kern="1200" cap="none" spc="0" normalizeH="0" baseline="0" noProof="0" dirty="0">
+                <a:ln>
+                  <a:noFill/>
+                </a:ln>
+                <a:solidFill>
+                  <a:srgbClr val="000000"/>
+                </a:solidFill>
+                <a:effectLst/>
+                <a:uLnTx/>
+                <a:uFillTx/>
+                <a:latin typeface="Consolas" panose="020B0609020204030204" pitchFamily="49" charset="0"/>
+                <a:ea typeface="+mn-ea"/>
+                <a:cs typeface="+mn-cs"/>
+              </a:rPr>
+              <a:t>"I",</a:t>
+            </a:r>
+            <a:r>
+              <a:rPr kumimoji="0" lang="de-DE" sz="1200" b="0" i="0" u="none" strike="noStrike" kern="1200" cap="none" spc="0" normalizeH="0" baseline="0" noProof="0" dirty="0">
+                <a:ln>
+                  <a:noFill/>
+                </a:ln>
+                <a:solidFill>
+                  <a:srgbClr val="000000"/>
+                </a:solidFill>
+                <a:effectLst/>
+                <a:uLnTx/>
+                <a:uFillTx/>
+                <a:latin typeface="Consolas" panose="020B0609020204030204" pitchFamily="49" charset="0"/>
+                <a:ea typeface="+mn-ea"/>
+                <a:cs typeface="+mn-cs"/>
+              </a:rPr>
+              <a:t> </a:t>
+            </a:r>
+            <a:r>
+              <a:rPr kumimoji="0" lang="pl-PL" sz="1200" b="0" i="0" u="none" strike="noStrike" kern="1200" cap="none" spc="0" normalizeH="0" baseline="0" noProof="0" dirty="0">
+                <a:ln>
+                  <a:noFill/>
+                </a:ln>
+                <a:solidFill>
+                  <a:srgbClr val="000000"/>
+                </a:solidFill>
+                <a:effectLst/>
+                <a:uLnTx/>
+                <a:uFillTx/>
+                <a:latin typeface="Consolas" panose="020B0609020204030204" pitchFamily="49" charset="0"/>
+                <a:ea typeface="+mn-ea"/>
+                <a:cs typeface="+mn-cs"/>
+              </a:rPr>
+              <a:t>"I",</a:t>
+            </a:r>
+            <a:r>
+              <a:rPr kumimoji="0" lang="de-DE" sz="1200" b="0" i="0" u="none" strike="noStrike" kern="1200" cap="none" spc="0" normalizeH="0" baseline="0" noProof="0" dirty="0">
+                <a:ln>
+                  <a:noFill/>
+                </a:ln>
+                <a:solidFill>
+                  <a:srgbClr val="000000"/>
+                </a:solidFill>
+                <a:effectLst/>
+                <a:uLnTx/>
+                <a:uFillTx/>
+                <a:latin typeface="Consolas" panose="020B0609020204030204" pitchFamily="49" charset="0"/>
+                <a:ea typeface="+mn-ea"/>
+                <a:cs typeface="+mn-cs"/>
+              </a:rPr>
+              <a:t> </a:t>
+            </a:r>
+            <a:r>
+              <a:rPr kumimoji="0" lang="pl-PL" sz="1200" b="0" i="0" u="none" strike="noStrike" kern="1200" cap="none" spc="0" normalizeH="0" baseline="0" noProof="0" dirty="0">
+                <a:ln>
+                  <a:noFill/>
+                </a:ln>
+                <a:solidFill>
+                  <a:srgbClr val="000000"/>
+                </a:solidFill>
+                <a:effectLst/>
+                <a:uLnTx/>
+                <a:uFillTx/>
+                <a:latin typeface="Consolas" panose="020B0609020204030204" pitchFamily="49" charset="0"/>
+                <a:ea typeface="+mn-ea"/>
+                <a:cs typeface="+mn-cs"/>
+              </a:rPr>
+              <a:t>"I"</a:t>
+            </a:r>
+            <a:r>
+              <a:rPr kumimoji="0" lang="de-DE" sz="1200" b="0" i="0" u="none" strike="noStrike" kern="1200" cap="none" spc="0" normalizeH="0" baseline="0" noProof="0" dirty="0">
+                <a:ln>
+                  <a:noFill/>
+                </a:ln>
+                <a:solidFill>
+                  <a:srgbClr val="000000"/>
+                </a:solidFill>
+                <a:effectLst/>
+                <a:uLnTx/>
+                <a:uFillTx/>
+                <a:latin typeface="Consolas" panose="020B0609020204030204" pitchFamily="49" charset="0"/>
+                <a:ea typeface="+mn-ea"/>
+                <a:cs typeface="+mn-cs"/>
+              </a:rPr>
+              <a:t> </a:t>
+            </a:r>
+            <a:r>
+              <a:rPr kumimoji="0" lang="pl-PL" sz="1200" b="0" i="0" u="none" strike="noStrike" kern="1200" cap="none" spc="0" normalizeH="0" baseline="0" noProof="0" dirty="0">
+                <a:ln>
+                  <a:noFill/>
+                </a:ln>
+                <a:solidFill>
+                  <a:srgbClr val="9F9998"/>
+                </a:solidFill>
+                <a:effectLst/>
+                <a:uLnTx/>
+                <a:uFillTx/>
+                <a:latin typeface="Consolas" panose="020B0609020204030204" pitchFamily="49" charset="0"/>
+                <a:ea typeface="+mn-ea"/>
+                <a:cs typeface="+mn-cs"/>
+              </a:rPr>
+              <a:t>]</a:t>
+            </a:r>
+            <a:endParaRPr kumimoji="0" lang="de-DE" sz="1200" b="0" i="0" u="none" strike="noStrike" kern="1200" cap="none" spc="0" normalizeH="0" baseline="0" noProof="0" dirty="0">
+              <a:ln>
+                <a:noFill/>
+              </a:ln>
+              <a:solidFill>
+                <a:srgbClr val="9F9998"/>
+              </a:solidFill>
+              <a:effectLst/>
+              <a:uLnTx/>
+              <a:uFillTx/>
+              <a:latin typeface="Consolas" panose="020B0609020204030204" pitchFamily="49" charset="0"/>
+              <a:ea typeface="+mn-ea"/>
+              <a:cs typeface="+mn-cs"/>
+            </a:endParaRPr>
+          </a:p>
+        </p:txBody>
+      </p:sp>
+      <p:sp>
+        <p:nvSpPr>
+          <p:cNvPr id="13" name="Textfeld 12">
+            <a:extLst>
+              <a:ext uri="{FF2B5EF4-FFF2-40B4-BE49-F238E27FC236}">
+                <a16:creationId xmlns:a16="http://schemas.microsoft.com/office/drawing/2014/main" id="{1126801C-2369-4AC2-98D0-0A08B178DE47}"/>
+              </a:ext>
+            </a:extLst>
+          </p:cNvPr>
+          <p:cNvSpPr txBox="1"/>
+          <p:nvPr/>
+        </p:nvSpPr>
+        <p:spPr>
+          <a:xfrm>
+            <a:off x="5580392" y="2737117"/>
+            <a:ext cx="594567" cy="239489"/>
+          </a:xfrm>
+          <a:prstGeom prst="rect">
+            <a:avLst/>
+          </a:prstGeom>
+          <a:noFill/>
+        </p:spPr>
+        <p:txBody>
+          <a:bodyPr wrap="square" lIns="0" tIns="0" rIns="0" bIns="0" rtlCol="0">
+            <a:spAutoFit/>
+          </a:bodyPr>
+          <a:lstStyle/>
+          <a:p>
+            <a:pPr marL="0" marR="0" lvl="0" indent="0" algn="r" defTabSz="713232" rtl="0" eaLnBrk="1" fontAlgn="auto" latinLnBrk="0" hangingPunct="1">
+              <a:lnSpc>
+                <a:spcPct val="120000"/>
+              </a:lnSpc>
+              <a:spcBef>
+                <a:spcPts val="750"/>
+              </a:spcBef>
+              <a:spcAft>
+                <a:spcPts val="0"/>
+              </a:spcAft>
+              <a:buClr>
+                <a:srgbClr val="00BEFF"/>
+              </a:buClr>
+              <a:buSzTx/>
+              <a:buFontTx/>
+              <a:buNone/>
+              <a:tabLst/>
+              <a:defRPr/>
+            </a:pPr>
+            <a:r>
+              <a:rPr kumimoji="0" lang="de-DE" sz="1400" b="0" i="0" u="none" strike="noStrike" kern="1200" cap="none" spc="0" normalizeH="0" baseline="0" noProof="0" dirty="0">
+                <a:ln>
+                  <a:noFill/>
+                </a:ln>
+                <a:solidFill>
+                  <a:srgbClr val="00B050"/>
+                </a:solidFill>
+                <a:effectLst/>
+                <a:uLnTx/>
+                <a:uFillTx/>
+                <a:latin typeface="Roboto Light" panose="02000000000000000000" pitchFamily="2" charset="0"/>
+                <a:ea typeface="Roboto Light" panose="02000000000000000000" pitchFamily="2" charset="0"/>
+                <a:cs typeface="+mn-cs"/>
+              </a:rPr>
+              <a:t>Target</a:t>
+            </a:r>
+          </a:p>
+        </p:txBody>
+      </p:sp>
+      <p:sp>
+        <p:nvSpPr>
+          <p:cNvPr id="18" name="Textfeld 17">
+            <a:extLst>
+              <a:ext uri="{FF2B5EF4-FFF2-40B4-BE49-F238E27FC236}">
+                <a16:creationId xmlns:a16="http://schemas.microsoft.com/office/drawing/2014/main" id="{B8C8AC66-34DD-4568-A9EB-5290A906168A}"/>
+              </a:ext>
+            </a:extLst>
+          </p:cNvPr>
+          <p:cNvSpPr txBox="1"/>
+          <p:nvPr/>
+        </p:nvSpPr>
+        <p:spPr>
+          <a:xfrm>
+            <a:off x="4646468" y="3496959"/>
+            <a:ext cx="1528491" cy="238782"/>
+          </a:xfrm>
+          <a:prstGeom prst="rect">
+            <a:avLst/>
+          </a:prstGeom>
+          <a:noFill/>
+        </p:spPr>
+        <p:txBody>
+          <a:bodyPr wrap="square" lIns="0" tIns="0" rIns="0" bIns="0" rtlCol="0">
+            <a:spAutoFit/>
+          </a:bodyPr>
+          <a:lstStyle/>
+          <a:p>
+            <a:pPr marL="0" marR="0" lvl="0" indent="0" algn="r" defTabSz="713232" rtl="0" eaLnBrk="1" fontAlgn="auto" latinLnBrk="0" hangingPunct="1">
+              <a:lnSpc>
+                <a:spcPct val="120000"/>
+              </a:lnSpc>
+              <a:spcBef>
+                <a:spcPts val="750"/>
+              </a:spcBef>
+              <a:spcAft>
+                <a:spcPts val="0"/>
+              </a:spcAft>
+              <a:buClr>
+                <a:srgbClr val="00BEFF"/>
+              </a:buClr>
+              <a:buSzTx/>
+              <a:buFontTx/>
+              <a:buNone/>
+              <a:tabLst/>
+              <a:defRPr/>
+            </a:pPr>
+            <a:r>
+              <a:rPr kumimoji="0" lang="de-DE" sz="1400" b="0" i="0" u="none" strike="noStrike" kern="1200" cap="none" spc="0" normalizeH="0" baseline="0" noProof="0" dirty="0">
+                <a:ln>
+                  <a:noFill/>
+                </a:ln>
+                <a:solidFill>
+                  <a:srgbClr val="FF0000"/>
+                </a:solidFill>
+                <a:effectLst/>
+                <a:uLnTx/>
+                <a:uFillTx/>
+                <a:latin typeface="Roboto Light" panose="02000000000000000000" pitchFamily="2" charset="0"/>
+                <a:ea typeface="Roboto Light" panose="02000000000000000000" pitchFamily="2" charset="0"/>
+                <a:cs typeface="+mn-cs"/>
+              </a:rPr>
+              <a:t>possible </a:t>
+            </a:r>
+            <a:r>
+              <a:rPr kumimoji="0" lang="de-DE" sz="1400" b="0" i="0" u="none" strike="noStrike" kern="1200" cap="none" spc="0" normalizeH="0" baseline="0" noProof="0" dirty="0" err="1">
+                <a:ln>
+                  <a:noFill/>
+                </a:ln>
+                <a:solidFill>
+                  <a:srgbClr val="FF0000"/>
+                </a:solidFill>
+                <a:effectLst/>
+                <a:uLnTx/>
+                <a:uFillTx/>
+                <a:latin typeface="Roboto Light" panose="02000000000000000000" pitchFamily="2" charset="0"/>
+                <a:ea typeface="Roboto Light" panose="02000000000000000000" pitchFamily="2" charset="0"/>
+                <a:cs typeface="+mn-cs"/>
+              </a:rPr>
+              <a:t>Prediction</a:t>
+            </a:r>
+            <a:endParaRPr kumimoji="0" lang="de-DE" sz="1400" b="0" i="0" u="none" strike="noStrike" kern="1200" cap="none" spc="0" normalizeH="0" baseline="0" noProof="0" dirty="0">
+              <a:ln>
+                <a:noFill/>
+              </a:ln>
+              <a:solidFill>
+                <a:srgbClr val="FF0000"/>
+              </a:solidFill>
+              <a:effectLst/>
+              <a:uLnTx/>
+              <a:uFillTx/>
+              <a:latin typeface="Roboto Light" panose="02000000000000000000" pitchFamily="2" charset="0"/>
+              <a:ea typeface="Roboto Light" panose="02000000000000000000" pitchFamily="2" charset="0"/>
+              <a:cs typeface="+mn-cs"/>
+            </a:endParaRPr>
+          </a:p>
+        </p:txBody>
+      </p:sp>
+      <p:cxnSp>
+        <p:nvCxnSpPr>
+          <p:cNvPr id="23" name="Gerader Verbinder 22">
+            <a:extLst>
+              <a:ext uri="{FF2B5EF4-FFF2-40B4-BE49-F238E27FC236}">
+                <a16:creationId xmlns:a16="http://schemas.microsoft.com/office/drawing/2014/main" id="{111EE53C-23F0-4FE4-9B7E-A30CE679D73C}"/>
+              </a:ext>
+            </a:extLst>
+          </p:cNvPr>
+          <p:cNvCxnSpPr>
+            <a:cxnSpLocks/>
+          </p:cNvCxnSpPr>
+          <p:nvPr/>
+        </p:nvCxnSpPr>
+        <p:spPr>
+          <a:xfrm>
+            <a:off x="7119308" y="3682877"/>
+            <a:ext cx="2449265" cy="0"/>
+          </a:xfrm>
+          <a:prstGeom prst="line">
+            <a:avLst/>
+          </a:prstGeom>
+          <a:ln w="38100">
+            <a:solidFill>
+              <a:schemeClr val="bg2">
+                <a:lumMod val="20000"/>
+                <a:lumOff val="80000"/>
+              </a:schemeClr>
+            </a:solidFill>
+          </a:ln>
+        </p:spPr>
+        <p:style>
+          <a:lnRef idx="1">
+            <a:schemeClr val="accent1"/>
+          </a:lnRef>
+          <a:fillRef idx="0">
+            <a:schemeClr val="accent1"/>
+          </a:fillRef>
+          <a:effectRef idx="0">
+            <a:schemeClr val="accent1"/>
+          </a:effectRef>
+          <a:fontRef idx="minor">
+            <a:schemeClr val="tx1"/>
+          </a:fontRef>
+        </p:style>
+      </p:cxnSp>
+      <p:cxnSp>
+        <p:nvCxnSpPr>
+          <p:cNvPr id="24" name="Gerader Verbinder 23">
+            <a:extLst>
+              <a:ext uri="{FF2B5EF4-FFF2-40B4-BE49-F238E27FC236}">
+                <a16:creationId xmlns:a16="http://schemas.microsoft.com/office/drawing/2014/main" id="{D4A0F833-5B2F-4D19-B713-F5D2DF493BCE}"/>
+              </a:ext>
+            </a:extLst>
+          </p:cNvPr>
+          <p:cNvCxnSpPr>
+            <a:cxnSpLocks/>
+          </p:cNvCxnSpPr>
+          <p:nvPr/>
+        </p:nvCxnSpPr>
+        <p:spPr>
+          <a:xfrm>
+            <a:off x="9568573" y="3682877"/>
+            <a:ext cx="2159000" cy="0"/>
+          </a:xfrm>
+          <a:prstGeom prst="line">
+            <a:avLst/>
+          </a:prstGeom>
+          <a:ln w="38100">
+            <a:solidFill>
+              <a:srgbClr val="FF0000"/>
+            </a:solidFill>
+          </a:ln>
+        </p:spPr>
+        <p:style>
+          <a:lnRef idx="1">
+            <a:schemeClr val="accent1"/>
+          </a:lnRef>
+          <a:fillRef idx="0">
+            <a:schemeClr val="accent1"/>
+          </a:fillRef>
+          <a:effectRef idx="0">
+            <a:schemeClr val="accent1"/>
+          </a:effectRef>
+          <a:fontRef idx="minor">
+            <a:schemeClr val="tx1"/>
+          </a:fontRef>
+        </p:style>
+      </p:cxnSp>
+      <p:cxnSp>
+        <p:nvCxnSpPr>
+          <p:cNvPr id="32" name="Gerader Verbinder 31">
+            <a:extLst>
+              <a:ext uri="{FF2B5EF4-FFF2-40B4-BE49-F238E27FC236}">
+                <a16:creationId xmlns:a16="http://schemas.microsoft.com/office/drawing/2014/main" id="{467EF0D3-716F-4E1B-AC3D-FFC220CED7C5}"/>
+              </a:ext>
+            </a:extLst>
+          </p:cNvPr>
+          <p:cNvCxnSpPr>
+            <a:cxnSpLocks/>
+          </p:cNvCxnSpPr>
+          <p:nvPr/>
+        </p:nvCxnSpPr>
+        <p:spPr>
+          <a:xfrm>
+            <a:off x="6632082" y="5079107"/>
+            <a:ext cx="879723" cy="0"/>
+          </a:xfrm>
+          <a:prstGeom prst="line">
+            <a:avLst/>
+          </a:prstGeom>
+          <a:ln w="38100">
+            <a:solidFill>
+              <a:schemeClr val="bg2">
+                <a:lumMod val="20000"/>
+                <a:lumOff val="80000"/>
+              </a:schemeClr>
+            </a:solidFill>
+          </a:ln>
+        </p:spPr>
+        <p:style>
+          <a:lnRef idx="1">
+            <a:schemeClr val="accent1"/>
+          </a:lnRef>
+          <a:fillRef idx="0">
+            <a:schemeClr val="accent1"/>
+          </a:fillRef>
+          <a:effectRef idx="0">
+            <a:schemeClr val="accent1"/>
+          </a:effectRef>
+          <a:fontRef idx="minor">
+            <a:schemeClr val="tx1"/>
+          </a:fontRef>
+        </p:style>
+      </p:cxnSp>
+      <p:cxnSp>
+        <p:nvCxnSpPr>
+          <p:cNvPr id="33" name="Gerader Verbinder 32">
+            <a:extLst>
+              <a:ext uri="{FF2B5EF4-FFF2-40B4-BE49-F238E27FC236}">
+                <a16:creationId xmlns:a16="http://schemas.microsoft.com/office/drawing/2014/main" id="{AF0B5E71-6DE3-4069-8AAB-CB79011E95CE}"/>
+              </a:ext>
+            </a:extLst>
+          </p:cNvPr>
+          <p:cNvCxnSpPr>
+            <a:cxnSpLocks/>
+          </p:cNvCxnSpPr>
+          <p:nvPr/>
+        </p:nvCxnSpPr>
+        <p:spPr>
+          <a:xfrm>
+            <a:off x="7511805" y="5079107"/>
+            <a:ext cx="477520" cy="0"/>
+          </a:xfrm>
+          <a:prstGeom prst="line">
+            <a:avLst/>
+          </a:prstGeom>
+          <a:ln w="38100">
+            <a:solidFill>
+              <a:srgbClr val="FF0000"/>
+            </a:solidFill>
+          </a:ln>
+        </p:spPr>
+        <p:style>
+          <a:lnRef idx="1">
+            <a:schemeClr val="accent1"/>
+          </a:lnRef>
+          <a:fillRef idx="0">
+            <a:schemeClr val="accent1"/>
+          </a:fillRef>
+          <a:effectRef idx="0">
+            <a:schemeClr val="accent1"/>
+          </a:effectRef>
+          <a:fontRef idx="minor">
+            <a:schemeClr val="tx1"/>
+          </a:fontRef>
+        </p:style>
+      </p:cxnSp>
+      <p:cxnSp>
+        <p:nvCxnSpPr>
+          <p:cNvPr id="34" name="Gerader Verbinder 33">
+            <a:extLst>
+              <a:ext uri="{FF2B5EF4-FFF2-40B4-BE49-F238E27FC236}">
+                <a16:creationId xmlns:a16="http://schemas.microsoft.com/office/drawing/2014/main" id="{D0685CF4-1C0C-4B08-94CA-D5790C0412FE}"/>
+              </a:ext>
+            </a:extLst>
+          </p:cNvPr>
+          <p:cNvCxnSpPr>
+            <a:cxnSpLocks/>
+          </p:cNvCxnSpPr>
+          <p:nvPr/>
+        </p:nvCxnSpPr>
+        <p:spPr>
+          <a:xfrm>
+            <a:off x="7989325" y="5079107"/>
+            <a:ext cx="3774440" cy="0"/>
+          </a:xfrm>
+          <a:prstGeom prst="line">
+            <a:avLst/>
+          </a:prstGeom>
+          <a:ln w="38100">
+            <a:solidFill>
+              <a:schemeClr val="bg2">
+                <a:lumMod val="20000"/>
+                <a:lumOff val="80000"/>
+              </a:schemeClr>
+            </a:solidFill>
+          </a:ln>
+        </p:spPr>
+        <p:style>
+          <a:lnRef idx="1">
+            <a:schemeClr val="accent1"/>
+          </a:lnRef>
+          <a:fillRef idx="0">
+            <a:schemeClr val="accent1"/>
+          </a:fillRef>
+          <a:effectRef idx="0">
+            <a:schemeClr val="accent1"/>
+          </a:effectRef>
+          <a:fontRef idx="minor">
+            <a:schemeClr val="tx1"/>
+          </a:fontRef>
+        </p:style>
+      </p:cxnSp>
+      <p:cxnSp>
+        <p:nvCxnSpPr>
+          <p:cNvPr id="58" name="Gerader Verbinder 57">
+            <a:extLst>
+              <a:ext uri="{FF2B5EF4-FFF2-40B4-BE49-F238E27FC236}">
+                <a16:creationId xmlns:a16="http://schemas.microsoft.com/office/drawing/2014/main" id="{A0FFF4EA-734D-4800-9842-3F3E05A56F88}"/>
+              </a:ext>
+            </a:extLst>
+          </p:cNvPr>
+          <p:cNvCxnSpPr>
+            <a:cxnSpLocks/>
+          </p:cNvCxnSpPr>
+          <p:nvPr/>
+        </p:nvCxnSpPr>
+        <p:spPr>
+          <a:xfrm>
+            <a:off x="6632082" y="5733762"/>
+            <a:ext cx="1357243" cy="0"/>
+          </a:xfrm>
+          <a:prstGeom prst="line">
+            <a:avLst/>
+          </a:prstGeom>
+          <a:ln w="38100">
+            <a:solidFill>
+              <a:schemeClr val="bg2">
+                <a:lumMod val="20000"/>
+                <a:lumOff val="80000"/>
+              </a:schemeClr>
+            </a:solidFill>
+          </a:ln>
+        </p:spPr>
+        <p:style>
+          <a:lnRef idx="1">
+            <a:schemeClr val="accent1"/>
+          </a:lnRef>
+          <a:fillRef idx="0">
+            <a:schemeClr val="accent1"/>
+          </a:fillRef>
+          <a:effectRef idx="0">
+            <a:schemeClr val="accent1"/>
+          </a:effectRef>
+          <a:fontRef idx="minor">
+            <a:schemeClr val="tx1"/>
+          </a:fontRef>
+        </p:style>
+      </p:cxnSp>
+      <p:cxnSp>
+        <p:nvCxnSpPr>
+          <p:cNvPr id="59" name="Gerader Verbinder 58">
+            <a:extLst>
+              <a:ext uri="{FF2B5EF4-FFF2-40B4-BE49-F238E27FC236}">
+                <a16:creationId xmlns:a16="http://schemas.microsoft.com/office/drawing/2014/main" id="{113DBA28-39F7-4FB6-BB15-FE83932C39A5}"/>
+              </a:ext>
+            </a:extLst>
+          </p:cNvPr>
+          <p:cNvCxnSpPr>
+            <a:cxnSpLocks/>
+          </p:cNvCxnSpPr>
+          <p:nvPr/>
+        </p:nvCxnSpPr>
+        <p:spPr>
+          <a:xfrm>
+            <a:off x="10524245" y="5733707"/>
+            <a:ext cx="1203328" cy="0"/>
+          </a:xfrm>
+          <a:prstGeom prst="line">
+            <a:avLst/>
+          </a:prstGeom>
+          <a:ln w="38100">
+            <a:solidFill>
+              <a:srgbClr val="FF0000"/>
+            </a:solidFill>
+          </a:ln>
+        </p:spPr>
+        <p:style>
+          <a:lnRef idx="1">
+            <a:schemeClr val="accent1"/>
+          </a:lnRef>
+          <a:fillRef idx="0">
+            <a:schemeClr val="accent1"/>
+          </a:fillRef>
+          <a:effectRef idx="0">
+            <a:schemeClr val="accent1"/>
+          </a:effectRef>
+          <a:fontRef idx="minor">
+            <a:schemeClr val="tx1"/>
+          </a:fontRef>
+        </p:style>
+      </p:cxnSp>
+      <p:cxnSp>
+        <p:nvCxnSpPr>
+          <p:cNvPr id="63" name="Gerader Verbinder 62">
+            <a:extLst>
+              <a:ext uri="{FF2B5EF4-FFF2-40B4-BE49-F238E27FC236}">
+                <a16:creationId xmlns:a16="http://schemas.microsoft.com/office/drawing/2014/main" id="{ECDA337E-DDE9-45E9-944A-BCF53F9999A3}"/>
+              </a:ext>
+            </a:extLst>
+          </p:cNvPr>
+          <p:cNvCxnSpPr>
+            <a:cxnSpLocks/>
+          </p:cNvCxnSpPr>
+          <p:nvPr/>
+        </p:nvCxnSpPr>
+        <p:spPr>
+          <a:xfrm>
+            <a:off x="9076453" y="5733707"/>
+            <a:ext cx="1447792" cy="5204"/>
+          </a:xfrm>
+          <a:prstGeom prst="line">
+            <a:avLst/>
+          </a:prstGeom>
+          <a:ln w="38100">
+            <a:solidFill>
+              <a:schemeClr val="bg2">
+                <a:lumMod val="20000"/>
+                <a:lumOff val="80000"/>
+              </a:schemeClr>
+            </a:solidFill>
+          </a:ln>
+        </p:spPr>
+        <p:style>
+          <a:lnRef idx="1">
+            <a:schemeClr val="accent1"/>
+          </a:lnRef>
+          <a:fillRef idx="0">
+            <a:schemeClr val="accent1"/>
+          </a:fillRef>
+          <a:effectRef idx="0">
+            <a:schemeClr val="accent1"/>
+          </a:effectRef>
+          <a:fontRef idx="minor">
+            <a:schemeClr val="tx1"/>
+          </a:fontRef>
+        </p:style>
+      </p:cxnSp>
+      <p:cxnSp>
+        <p:nvCxnSpPr>
+          <p:cNvPr id="66" name="Gerader Verbinder 65">
+            <a:extLst>
+              <a:ext uri="{FF2B5EF4-FFF2-40B4-BE49-F238E27FC236}">
+                <a16:creationId xmlns:a16="http://schemas.microsoft.com/office/drawing/2014/main" id="{9F497294-8E52-466D-9CF0-8E8CFAC1BB60}"/>
+              </a:ext>
+            </a:extLst>
+          </p:cNvPr>
+          <p:cNvCxnSpPr>
+            <a:cxnSpLocks/>
+          </p:cNvCxnSpPr>
+          <p:nvPr/>
+        </p:nvCxnSpPr>
+        <p:spPr>
+          <a:xfrm>
+            <a:off x="7989325" y="5733762"/>
+            <a:ext cx="1087120" cy="0"/>
+          </a:xfrm>
+          <a:prstGeom prst="line">
+            <a:avLst/>
+          </a:prstGeom>
+          <a:ln w="38100">
+            <a:solidFill>
+              <a:srgbClr val="FF0000"/>
+            </a:solidFill>
+          </a:ln>
+        </p:spPr>
+        <p:style>
+          <a:lnRef idx="1">
+            <a:schemeClr val="accent1"/>
+          </a:lnRef>
+          <a:fillRef idx="0">
+            <a:schemeClr val="accent1"/>
+          </a:fillRef>
+          <a:effectRef idx="0">
+            <a:schemeClr val="accent1"/>
+          </a:effectRef>
+          <a:fontRef idx="minor">
+            <a:schemeClr val="tx1"/>
+          </a:fontRef>
+        </p:style>
+      </p:cxnSp>
+      <p:cxnSp>
+        <p:nvCxnSpPr>
+          <p:cNvPr id="111" name="Gerader Verbinder 110">
+            <a:extLst>
+              <a:ext uri="{FF2B5EF4-FFF2-40B4-BE49-F238E27FC236}">
+                <a16:creationId xmlns:a16="http://schemas.microsoft.com/office/drawing/2014/main" id="{F4AE25B0-76E3-4193-B83A-A441A3C5F60E}"/>
+              </a:ext>
+            </a:extLst>
+          </p:cNvPr>
+          <p:cNvCxnSpPr>
+            <a:cxnSpLocks/>
+          </p:cNvCxnSpPr>
+          <p:nvPr/>
+        </p:nvCxnSpPr>
+        <p:spPr>
+          <a:xfrm>
+            <a:off x="8417522" y="3041339"/>
+            <a:ext cx="3310051" cy="0"/>
+          </a:xfrm>
+          <a:prstGeom prst="line">
+            <a:avLst/>
+          </a:prstGeom>
+          <a:ln w="38100">
+            <a:solidFill>
+              <a:srgbClr val="00B050"/>
+            </a:solidFill>
+          </a:ln>
+        </p:spPr>
+        <p:style>
+          <a:lnRef idx="1">
+            <a:schemeClr val="accent1"/>
+          </a:lnRef>
+          <a:fillRef idx="0">
+            <a:schemeClr val="accent1"/>
+          </a:fillRef>
+          <a:effectRef idx="0">
+            <a:schemeClr val="accent1"/>
+          </a:effectRef>
+          <a:fontRef idx="minor">
+            <a:schemeClr val="tx1"/>
+          </a:fontRef>
+        </p:style>
+      </p:cxnSp>
+      <p:cxnSp>
+        <p:nvCxnSpPr>
+          <p:cNvPr id="113" name="Gerader Verbinder 112">
+            <a:extLst>
+              <a:ext uri="{FF2B5EF4-FFF2-40B4-BE49-F238E27FC236}">
+                <a16:creationId xmlns:a16="http://schemas.microsoft.com/office/drawing/2014/main" id="{D83A3B6E-3B61-4F4A-98EE-CE6D18BA6469}"/>
+              </a:ext>
+            </a:extLst>
+          </p:cNvPr>
+          <p:cNvCxnSpPr>
+            <a:cxnSpLocks/>
+          </p:cNvCxnSpPr>
+          <p:nvPr/>
+        </p:nvCxnSpPr>
+        <p:spPr>
+          <a:xfrm>
+            <a:off x="7119308" y="3041339"/>
+            <a:ext cx="1298214" cy="0"/>
+          </a:xfrm>
+          <a:prstGeom prst="line">
+            <a:avLst/>
+          </a:prstGeom>
+          <a:ln w="38100">
+            <a:solidFill>
+              <a:schemeClr val="bg2">
+                <a:lumMod val="20000"/>
+                <a:lumOff val="80000"/>
+              </a:schemeClr>
+            </a:solidFill>
+          </a:ln>
+        </p:spPr>
+        <p:style>
+          <a:lnRef idx="1">
+            <a:schemeClr val="accent1"/>
+          </a:lnRef>
+          <a:fillRef idx="0">
+            <a:schemeClr val="accent1"/>
+          </a:fillRef>
+          <a:effectRef idx="0">
+            <a:schemeClr val="accent1"/>
+          </a:effectRef>
+          <a:fontRef idx="minor">
+            <a:schemeClr val="tx1"/>
+          </a:fontRef>
+        </p:style>
+      </p:cxnSp>
+      <p:cxnSp>
+        <p:nvCxnSpPr>
+          <p:cNvPr id="114" name="Gerader Verbinder 113">
+            <a:extLst>
+              <a:ext uri="{FF2B5EF4-FFF2-40B4-BE49-F238E27FC236}">
+                <a16:creationId xmlns:a16="http://schemas.microsoft.com/office/drawing/2014/main" id="{A03D3039-3859-4810-BC48-C278DBEB72A9}"/>
+              </a:ext>
+            </a:extLst>
+          </p:cNvPr>
+          <p:cNvCxnSpPr>
+            <a:cxnSpLocks/>
+          </p:cNvCxnSpPr>
+          <p:nvPr/>
+        </p:nvCxnSpPr>
+        <p:spPr>
+          <a:xfrm>
+            <a:off x="6651809" y="3041339"/>
+            <a:ext cx="467499" cy="0"/>
+          </a:xfrm>
+          <a:prstGeom prst="line">
+            <a:avLst/>
+          </a:prstGeom>
+          <a:ln w="38100">
+            <a:solidFill>
+              <a:srgbClr val="00B050"/>
+            </a:solidFill>
+          </a:ln>
+        </p:spPr>
+        <p:style>
+          <a:lnRef idx="1">
+            <a:schemeClr val="accent1"/>
+          </a:lnRef>
+          <a:fillRef idx="0">
+            <a:schemeClr val="accent1"/>
+          </a:fillRef>
+          <a:effectRef idx="0">
+            <a:schemeClr val="accent1"/>
+          </a:effectRef>
+          <a:fontRef idx="minor">
+            <a:schemeClr val="tx1"/>
+          </a:fontRef>
+        </p:style>
+      </p:cxnSp>
+      <p:cxnSp>
+        <p:nvCxnSpPr>
+          <p:cNvPr id="149" name="Gerader Verbinder 148">
+            <a:extLst>
+              <a:ext uri="{FF2B5EF4-FFF2-40B4-BE49-F238E27FC236}">
+                <a16:creationId xmlns:a16="http://schemas.microsoft.com/office/drawing/2014/main" id="{D6DFBE97-A498-4C06-BA4E-4EFF1EA541C7}"/>
+              </a:ext>
+            </a:extLst>
+          </p:cNvPr>
+          <p:cNvCxnSpPr>
+            <a:cxnSpLocks/>
+          </p:cNvCxnSpPr>
+          <p:nvPr/>
+        </p:nvCxnSpPr>
+        <p:spPr>
+          <a:xfrm flipV="1">
+            <a:off x="6651332" y="3682877"/>
+            <a:ext cx="467976" cy="3080"/>
+          </a:xfrm>
+          <a:prstGeom prst="line">
+            <a:avLst/>
+          </a:prstGeom>
+          <a:ln w="38100">
+            <a:solidFill>
+              <a:srgbClr val="FF0000"/>
+            </a:solidFill>
+          </a:ln>
+        </p:spPr>
+        <p:style>
+          <a:lnRef idx="1">
+            <a:schemeClr val="accent1"/>
+          </a:lnRef>
+          <a:fillRef idx="0">
+            <a:schemeClr val="accent1"/>
+          </a:fillRef>
+          <a:effectRef idx="0">
+            <a:schemeClr val="accent1"/>
+          </a:effectRef>
+          <a:fontRef idx="minor">
+            <a:schemeClr val="tx1"/>
+          </a:fontRef>
+        </p:style>
+      </p:cxnSp>
+      <p:cxnSp>
+        <p:nvCxnSpPr>
+          <p:cNvPr id="151" name="Gerader Verbinder 150">
+            <a:extLst>
+              <a:ext uri="{FF2B5EF4-FFF2-40B4-BE49-F238E27FC236}">
+                <a16:creationId xmlns:a16="http://schemas.microsoft.com/office/drawing/2014/main" id="{3109F0F8-364A-4268-9BD7-80AF378B3877}"/>
+              </a:ext>
+            </a:extLst>
+          </p:cNvPr>
+          <p:cNvCxnSpPr>
+            <a:cxnSpLocks/>
+          </p:cNvCxnSpPr>
+          <p:nvPr/>
+        </p:nvCxnSpPr>
+        <p:spPr>
+          <a:xfrm>
+            <a:off x="8165223" y="4398424"/>
+            <a:ext cx="1134003" cy="0"/>
+          </a:xfrm>
+          <a:prstGeom prst="line">
+            <a:avLst/>
+          </a:prstGeom>
+          <a:ln w="38100">
+            <a:solidFill>
+              <a:schemeClr val="bg2">
+                <a:lumMod val="20000"/>
+                <a:lumOff val="80000"/>
+              </a:schemeClr>
+            </a:solidFill>
+          </a:ln>
+        </p:spPr>
+        <p:style>
+          <a:lnRef idx="1">
+            <a:schemeClr val="accent1"/>
+          </a:lnRef>
+          <a:fillRef idx="0">
+            <a:schemeClr val="accent1"/>
+          </a:fillRef>
+          <a:effectRef idx="0">
+            <a:schemeClr val="accent1"/>
+          </a:effectRef>
+          <a:fontRef idx="minor">
+            <a:schemeClr val="tx1"/>
+          </a:fontRef>
+        </p:style>
+      </p:cxnSp>
+      <p:cxnSp>
+        <p:nvCxnSpPr>
+          <p:cNvPr id="152" name="Gerader Verbinder 151">
+            <a:extLst>
+              <a:ext uri="{FF2B5EF4-FFF2-40B4-BE49-F238E27FC236}">
+                <a16:creationId xmlns:a16="http://schemas.microsoft.com/office/drawing/2014/main" id="{759CD82A-D272-428A-B78D-02C917E3BFA3}"/>
+              </a:ext>
+            </a:extLst>
+          </p:cNvPr>
+          <p:cNvCxnSpPr>
+            <a:cxnSpLocks/>
+          </p:cNvCxnSpPr>
+          <p:nvPr/>
+        </p:nvCxnSpPr>
+        <p:spPr>
+          <a:xfrm>
+            <a:off x="9299226" y="4398424"/>
+            <a:ext cx="1593319" cy="0"/>
+          </a:xfrm>
+          <a:prstGeom prst="line">
+            <a:avLst/>
+          </a:prstGeom>
+          <a:ln w="38100">
+            <a:solidFill>
+              <a:srgbClr val="FF0000"/>
+            </a:solidFill>
+          </a:ln>
+        </p:spPr>
+        <p:style>
+          <a:lnRef idx="1">
+            <a:schemeClr val="accent1"/>
+          </a:lnRef>
+          <a:fillRef idx="0">
+            <a:schemeClr val="accent1"/>
+          </a:fillRef>
+          <a:effectRef idx="0">
+            <a:schemeClr val="accent1"/>
+          </a:effectRef>
+          <a:fontRef idx="minor">
+            <a:schemeClr val="tx1"/>
+          </a:fontRef>
+        </p:style>
+      </p:cxnSp>
+      <p:cxnSp>
+        <p:nvCxnSpPr>
+          <p:cNvPr id="153" name="Gerader Verbinder 152">
+            <a:extLst>
+              <a:ext uri="{FF2B5EF4-FFF2-40B4-BE49-F238E27FC236}">
+                <a16:creationId xmlns:a16="http://schemas.microsoft.com/office/drawing/2014/main" id="{83A99CA5-2FBC-4770-B6E2-25C18521472C}"/>
+              </a:ext>
+            </a:extLst>
+          </p:cNvPr>
+          <p:cNvCxnSpPr>
+            <a:cxnSpLocks/>
+          </p:cNvCxnSpPr>
+          <p:nvPr/>
+        </p:nvCxnSpPr>
+        <p:spPr>
+          <a:xfrm>
+            <a:off x="10892545" y="4398424"/>
+            <a:ext cx="835028" cy="0"/>
+          </a:xfrm>
+          <a:prstGeom prst="line">
+            <a:avLst/>
+          </a:prstGeom>
+          <a:ln w="38100">
+            <a:solidFill>
+              <a:schemeClr val="bg2">
+                <a:lumMod val="20000"/>
+                <a:lumOff val="80000"/>
+              </a:schemeClr>
+            </a:solidFill>
+          </a:ln>
+        </p:spPr>
+        <p:style>
+          <a:lnRef idx="1">
+            <a:schemeClr val="accent1"/>
+          </a:lnRef>
+          <a:fillRef idx="0">
+            <a:schemeClr val="accent1"/>
+          </a:fillRef>
+          <a:effectRef idx="0">
+            <a:schemeClr val="accent1"/>
+          </a:effectRef>
+          <a:fontRef idx="minor">
+            <a:schemeClr val="tx1"/>
+          </a:fontRef>
+        </p:style>
+      </p:cxnSp>
+      <p:cxnSp>
+        <p:nvCxnSpPr>
+          <p:cNvPr id="159" name="Gerader Verbinder 158">
+            <a:extLst>
+              <a:ext uri="{FF2B5EF4-FFF2-40B4-BE49-F238E27FC236}">
+                <a16:creationId xmlns:a16="http://schemas.microsoft.com/office/drawing/2014/main" id="{A5A1ED7A-55D7-4BA9-802F-30F82FE1F480}"/>
+              </a:ext>
+            </a:extLst>
+          </p:cNvPr>
+          <p:cNvCxnSpPr>
+            <a:cxnSpLocks/>
+          </p:cNvCxnSpPr>
+          <p:nvPr/>
+        </p:nvCxnSpPr>
+        <p:spPr>
+          <a:xfrm>
+            <a:off x="7294631" y="4398424"/>
+            <a:ext cx="882980" cy="0"/>
+          </a:xfrm>
+          <a:prstGeom prst="line">
+            <a:avLst/>
+          </a:prstGeom>
+          <a:ln w="38100">
+            <a:solidFill>
+              <a:srgbClr val="FF0000"/>
+            </a:solidFill>
+          </a:ln>
+        </p:spPr>
+        <p:style>
+          <a:lnRef idx="1">
+            <a:schemeClr val="accent1"/>
+          </a:lnRef>
+          <a:fillRef idx="0">
+            <a:schemeClr val="accent1"/>
+          </a:fillRef>
+          <a:effectRef idx="0">
+            <a:schemeClr val="accent1"/>
+          </a:effectRef>
+          <a:fontRef idx="minor">
+            <a:schemeClr val="tx1"/>
+          </a:fontRef>
+        </p:style>
+      </p:cxnSp>
+      <p:cxnSp>
+        <p:nvCxnSpPr>
+          <p:cNvPr id="161" name="Gerader Verbinder 160">
+            <a:extLst>
+              <a:ext uri="{FF2B5EF4-FFF2-40B4-BE49-F238E27FC236}">
+                <a16:creationId xmlns:a16="http://schemas.microsoft.com/office/drawing/2014/main" id="{A10FC109-FAF1-4FD4-8A49-D5AA6EABF68A}"/>
+              </a:ext>
+            </a:extLst>
+          </p:cNvPr>
+          <p:cNvCxnSpPr>
+            <a:cxnSpLocks/>
+          </p:cNvCxnSpPr>
+          <p:nvPr/>
+        </p:nvCxnSpPr>
+        <p:spPr>
+          <a:xfrm>
+            <a:off x="6651332" y="4398424"/>
+            <a:ext cx="643299" cy="0"/>
+          </a:xfrm>
+          <a:prstGeom prst="line">
+            <a:avLst/>
+          </a:prstGeom>
+          <a:ln w="38100">
+            <a:solidFill>
+              <a:schemeClr val="bg2">
+                <a:lumMod val="20000"/>
+                <a:lumOff val="80000"/>
+              </a:schemeClr>
+            </a:solidFill>
+          </a:ln>
+        </p:spPr>
+        <p:style>
+          <a:lnRef idx="1">
+            <a:schemeClr val="accent1"/>
+          </a:lnRef>
+          <a:fillRef idx="0">
+            <a:schemeClr val="accent1"/>
+          </a:fillRef>
+          <a:effectRef idx="0">
+            <a:schemeClr val="accent1"/>
+          </a:effectRef>
+          <a:fontRef idx="minor">
+            <a:schemeClr val="tx1"/>
+          </a:fontRef>
+        </p:style>
+      </p:cxnSp>
+      <p:sp>
+        <p:nvSpPr>
+          <p:cNvPr id="174" name="Textfeld 173">
+            <a:extLst>
+              <a:ext uri="{FF2B5EF4-FFF2-40B4-BE49-F238E27FC236}">
+                <a16:creationId xmlns:a16="http://schemas.microsoft.com/office/drawing/2014/main" id="{D37CE3AD-5708-4B31-BCA2-50EEFF183FD4}"/>
+              </a:ext>
+            </a:extLst>
+          </p:cNvPr>
+          <p:cNvSpPr txBox="1"/>
+          <p:nvPr/>
+        </p:nvSpPr>
+        <p:spPr>
+          <a:xfrm>
+            <a:off x="6841177" y="3758206"/>
+            <a:ext cx="193964" cy="204671"/>
+          </a:xfrm>
+          <a:prstGeom prst="rect">
+            <a:avLst/>
+          </a:prstGeom>
+          <a:noFill/>
+        </p:spPr>
+        <p:txBody>
+          <a:bodyPr wrap="none" lIns="0" tIns="0" rIns="0" bIns="0" rtlCol="0">
+            <a:spAutoFit/>
+          </a:bodyPr>
+          <a:lstStyle/>
+          <a:p>
+            <a:pPr marL="0" marR="0" lvl="0" indent="0" algn="l" defTabSz="713232" rtl="0" eaLnBrk="1" fontAlgn="auto" latinLnBrk="0" hangingPunct="1">
+              <a:lnSpc>
+                <a:spcPct val="120000"/>
+              </a:lnSpc>
+              <a:spcBef>
+                <a:spcPts val="750"/>
+              </a:spcBef>
+              <a:spcAft>
+                <a:spcPts val="0"/>
+              </a:spcAft>
+              <a:buClr>
+                <a:srgbClr val="00BEFF"/>
+              </a:buClr>
+              <a:buSzTx/>
+              <a:buFontTx/>
+              <a:buNone/>
+              <a:tabLst/>
+              <a:defRPr/>
+            </a:pPr>
+            <a:r>
+              <a:rPr kumimoji="0" lang="de-DE" sz="1200" b="1" i="0" u="none" strike="noStrike" kern="1200" cap="none" spc="0" normalizeH="0" baseline="0" noProof="0" dirty="0">
+                <a:ln>
+                  <a:noFill/>
+                </a:ln>
+                <a:solidFill>
+                  <a:srgbClr val="3E444C"/>
+                </a:solidFill>
+                <a:effectLst/>
+                <a:uLnTx/>
+                <a:uFillTx/>
+                <a:latin typeface="Roboto" panose="02000000000000000000" pitchFamily="2" charset="0"/>
+                <a:ea typeface="Roboto" panose="02000000000000000000" pitchFamily="2" charset="0"/>
+                <a:cs typeface="+mn-cs"/>
+              </a:rPr>
+              <a:t>TP</a:t>
+            </a:r>
+          </a:p>
+        </p:txBody>
+      </p:sp>
+      <p:sp>
+        <p:nvSpPr>
+          <p:cNvPr id="175" name="Textfeld 174">
+            <a:extLst>
+              <a:ext uri="{FF2B5EF4-FFF2-40B4-BE49-F238E27FC236}">
+                <a16:creationId xmlns:a16="http://schemas.microsoft.com/office/drawing/2014/main" id="{907455A1-2E8B-41E2-8A0B-CEB1B4C6A703}"/>
+              </a:ext>
+            </a:extLst>
+          </p:cNvPr>
+          <p:cNvSpPr txBox="1"/>
+          <p:nvPr/>
+        </p:nvSpPr>
+        <p:spPr>
+          <a:xfrm>
+            <a:off x="10474590" y="3736612"/>
+            <a:ext cx="193964" cy="204671"/>
+          </a:xfrm>
+          <a:prstGeom prst="rect">
+            <a:avLst/>
+          </a:prstGeom>
+          <a:noFill/>
+        </p:spPr>
+        <p:txBody>
+          <a:bodyPr wrap="none" lIns="0" tIns="0" rIns="0" bIns="0" rtlCol="0">
+            <a:spAutoFit/>
+          </a:bodyPr>
+          <a:lstStyle/>
+          <a:p>
+            <a:pPr marL="0" marR="0" lvl="0" indent="0" algn="l" defTabSz="713232" rtl="0" eaLnBrk="1" fontAlgn="auto" latinLnBrk="0" hangingPunct="1">
+              <a:lnSpc>
+                <a:spcPct val="120000"/>
+              </a:lnSpc>
+              <a:spcBef>
+                <a:spcPts val="750"/>
+              </a:spcBef>
+              <a:spcAft>
+                <a:spcPts val="0"/>
+              </a:spcAft>
+              <a:buClr>
+                <a:srgbClr val="00BEFF"/>
+              </a:buClr>
+              <a:buSzTx/>
+              <a:buFontTx/>
+              <a:buNone/>
+              <a:tabLst/>
+              <a:defRPr/>
+            </a:pPr>
+            <a:r>
+              <a:rPr kumimoji="0" lang="de-DE" sz="1200" b="1" i="0" u="none" strike="noStrike" kern="1200" cap="none" spc="0" normalizeH="0" baseline="0" noProof="0" dirty="0">
+                <a:ln>
+                  <a:noFill/>
+                </a:ln>
+                <a:solidFill>
+                  <a:srgbClr val="3E444C"/>
+                </a:solidFill>
+                <a:effectLst/>
+                <a:uLnTx/>
+                <a:uFillTx/>
+                <a:latin typeface="Roboto" panose="02000000000000000000" pitchFamily="2" charset="0"/>
+                <a:ea typeface="Roboto" panose="02000000000000000000" pitchFamily="2" charset="0"/>
+                <a:cs typeface="+mn-cs"/>
+              </a:rPr>
+              <a:t>TP</a:t>
+            </a:r>
+          </a:p>
+        </p:txBody>
+      </p:sp>
+      <p:sp>
+        <p:nvSpPr>
+          <p:cNvPr id="176" name="Textfeld 175">
+            <a:extLst>
+              <a:ext uri="{FF2B5EF4-FFF2-40B4-BE49-F238E27FC236}">
+                <a16:creationId xmlns:a16="http://schemas.microsoft.com/office/drawing/2014/main" id="{17A752C0-6698-48D4-9AE5-199A9DC62EEA}"/>
+              </a:ext>
+            </a:extLst>
+          </p:cNvPr>
+          <p:cNvSpPr txBox="1"/>
+          <p:nvPr/>
+        </p:nvSpPr>
+        <p:spPr>
+          <a:xfrm>
+            <a:off x="7639139" y="4446667"/>
+            <a:ext cx="184346" cy="204671"/>
+          </a:xfrm>
+          <a:prstGeom prst="rect">
+            <a:avLst/>
+          </a:prstGeom>
+          <a:noFill/>
+        </p:spPr>
+        <p:txBody>
+          <a:bodyPr wrap="none" lIns="0" tIns="0" rIns="0" bIns="0" rtlCol="0">
+            <a:spAutoFit/>
+          </a:bodyPr>
+          <a:lstStyle/>
+          <a:p>
+            <a:pPr marL="0" marR="0" lvl="0" indent="0" algn="l" defTabSz="713232" rtl="0" eaLnBrk="1" fontAlgn="auto" latinLnBrk="0" hangingPunct="1">
+              <a:lnSpc>
+                <a:spcPct val="120000"/>
+              </a:lnSpc>
+              <a:spcBef>
+                <a:spcPts val="750"/>
+              </a:spcBef>
+              <a:spcAft>
+                <a:spcPts val="0"/>
+              </a:spcAft>
+              <a:buClr>
+                <a:srgbClr val="00BEFF"/>
+              </a:buClr>
+              <a:buSzTx/>
+              <a:buFontTx/>
+              <a:buNone/>
+              <a:tabLst/>
+              <a:defRPr/>
+            </a:pPr>
+            <a:r>
+              <a:rPr kumimoji="0" lang="de-DE" sz="1200" b="1" i="0" u="none" strike="noStrike" kern="1200" cap="none" spc="0" normalizeH="0" baseline="0" noProof="0" dirty="0">
+                <a:ln>
+                  <a:noFill/>
+                </a:ln>
+                <a:solidFill>
+                  <a:srgbClr val="3E444C"/>
+                </a:solidFill>
+                <a:effectLst/>
+                <a:uLnTx/>
+                <a:uFillTx/>
+                <a:latin typeface="Roboto" panose="02000000000000000000" pitchFamily="2" charset="0"/>
+                <a:ea typeface="Roboto" panose="02000000000000000000" pitchFamily="2" charset="0"/>
+                <a:cs typeface="+mn-cs"/>
+              </a:rPr>
+              <a:t>FP</a:t>
+            </a:r>
+          </a:p>
+        </p:txBody>
+      </p:sp>
+      <p:sp>
+        <p:nvSpPr>
+          <p:cNvPr id="177" name="Textfeld 176">
+            <a:extLst>
+              <a:ext uri="{FF2B5EF4-FFF2-40B4-BE49-F238E27FC236}">
+                <a16:creationId xmlns:a16="http://schemas.microsoft.com/office/drawing/2014/main" id="{A2DB643C-D0D7-4B55-BB0E-CD56622DDD03}"/>
+              </a:ext>
+            </a:extLst>
+          </p:cNvPr>
+          <p:cNvSpPr txBox="1"/>
+          <p:nvPr/>
+        </p:nvSpPr>
+        <p:spPr>
+          <a:xfrm>
+            <a:off x="9998903" y="4440475"/>
+            <a:ext cx="193964" cy="204671"/>
+          </a:xfrm>
+          <a:prstGeom prst="rect">
+            <a:avLst/>
+          </a:prstGeom>
+          <a:noFill/>
+        </p:spPr>
+        <p:txBody>
+          <a:bodyPr wrap="none" lIns="0" tIns="0" rIns="0" bIns="0" rtlCol="0">
+            <a:spAutoFit/>
+          </a:bodyPr>
+          <a:lstStyle/>
+          <a:p>
+            <a:pPr marL="0" marR="0" lvl="0" indent="0" algn="l" defTabSz="713232" rtl="0" eaLnBrk="1" fontAlgn="auto" latinLnBrk="0" hangingPunct="1">
+              <a:lnSpc>
+                <a:spcPct val="120000"/>
+              </a:lnSpc>
+              <a:spcBef>
+                <a:spcPts val="750"/>
+              </a:spcBef>
+              <a:spcAft>
+                <a:spcPts val="0"/>
+              </a:spcAft>
+              <a:buClr>
+                <a:srgbClr val="00BEFF"/>
+              </a:buClr>
+              <a:buSzTx/>
+              <a:buFontTx/>
+              <a:buNone/>
+              <a:tabLst/>
+              <a:defRPr/>
+            </a:pPr>
+            <a:r>
+              <a:rPr kumimoji="0" lang="de-DE" sz="1200" b="1" i="0" u="none" strike="noStrike" kern="1200" cap="none" spc="0" normalizeH="0" baseline="0" noProof="0" dirty="0">
+                <a:ln>
+                  <a:noFill/>
+                </a:ln>
+                <a:solidFill>
+                  <a:srgbClr val="3E444C"/>
+                </a:solidFill>
+                <a:effectLst/>
+                <a:uLnTx/>
+                <a:uFillTx/>
+                <a:latin typeface="Roboto" panose="02000000000000000000" pitchFamily="2" charset="0"/>
+                <a:ea typeface="Roboto" panose="02000000000000000000" pitchFamily="2" charset="0"/>
+                <a:cs typeface="+mn-cs"/>
+              </a:rPr>
+              <a:t>TP</a:t>
+            </a:r>
+          </a:p>
+        </p:txBody>
+      </p:sp>
+      <p:sp>
+        <p:nvSpPr>
+          <p:cNvPr id="178" name="Textfeld 177">
+            <a:extLst>
+              <a:ext uri="{FF2B5EF4-FFF2-40B4-BE49-F238E27FC236}">
+                <a16:creationId xmlns:a16="http://schemas.microsoft.com/office/drawing/2014/main" id="{B327D113-222F-40EC-B190-5DFBBD647681}"/>
+              </a:ext>
+            </a:extLst>
+          </p:cNvPr>
+          <p:cNvSpPr txBox="1"/>
+          <p:nvPr/>
+        </p:nvSpPr>
+        <p:spPr>
+          <a:xfrm>
+            <a:off x="7653056" y="5109058"/>
+            <a:ext cx="184346" cy="204671"/>
+          </a:xfrm>
+          <a:prstGeom prst="rect">
+            <a:avLst/>
+          </a:prstGeom>
+          <a:noFill/>
+        </p:spPr>
+        <p:txBody>
+          <a:bodyPr wrap="none" lIns="0" tIns="0" rIns="0" bIns="0" rtlCol="0">
+            <a:spAutoFit/>
+          </a:bodyPr>
+          <a:lstStyle/>
+          <a:p>
+            <a:pPr marL="0" marR="0" lvl="0" indent="0" algn="l" defTabSz="713232" rtl="0" eaLnBrk="1" fontAlgn="auto" latinLnBrk="0" hangingPunct="1">
+              <a:lnSpc>
+                <a:spcPct val="120000"/>
+              </a:lnSpc>
+              <a:spcBef>
+                <a:spcPts val="750"/>
+              </a:spcBef>
+              <a:spcAft>
+                <a:spcPts val="0"/>
+              </a:spcAft>
+              <a:buClr>
+                <a:srgbClr val="00BEFF"/>
+              </a:buClr>
+              <a:buSzTx/>
+              <a:buFontTx/>
+              <a:buNone/>
+              <a:tabLst/>
+              <a:defRPr/>
+            </a:pPr>
+            <a:r>
+              <a:rPr kumimoji="0" lang="de-DE" sz="1200" b="1" i="0" u="none" strike="noStrike" kern="1200" cap="none" spc="0" normalizeH="0" baseline="0" noProof="0" dirty="0">
+                <a:ln>
+                  <a:noFill/>
+                </a:ln>
+                <a:solidFill>
+                  <a:srgbClr val="3E444C"/>
+                </a:solidFill>
+                <a:effectLst/>
+                <a:uLnTx/>
+                <a:uFillTx/>
+                <a:latin typeface="Roboto" panose="02000000000000000000" pitchFamily="2" charset="0"/>
+                <a:ea typeface="Roboto" panose="02000000000000000000" pitchFamily="2" charset="0"/>
+                <a:cs typeface="+mn-cs"/>
+              </a:rPr>
+              <a:t>FP</a:t>
+            </a:r>
+          </a:p>
+        </p:txBody>
+      </p:sp>
+      <p:sp>
+        <p:nvSpPr>
+          <p:cNvPr id="179" name="Textfeld 178">
+            <a:extLst>
+              <a:ext uri="{FF2B5EF4-FFF2-40B4-BE49-F238E27FC236}">
+                <a16:creationId xmlns:a16="http://schemas.microsoft.com/office/drawing/2014/main" id="{F2CC556D-2624-4CFC-9E4E-C4BB9660DBB4}"/>
+              </a:ext>
+            </a:extLst>
+          </p:cNvPr>
+          <p:cNvSpPr txBox="1"/>
+          <p:nvPr/>
+        </p:nvSpPr>
+        <p:spPr>
+          <a:xfrm>
+            <a:off x="9862115" y="5085932"/>
+            <a:ext cx="193964" cy="204671"/>
+          </a:xfrm>
+          <a:prstGeom prst="rect">
+            <a:avLst/>
+          </a:prstGeom>
+          <a:noFill/>
+        </p:spPr>
+        <p:txBody>
+          <a:bodyPr wrap="none" lIns="0" tIns="0" rIns="0" bIns="0" rtlCol="0">
+            <a:spAutoFit/>
+          </a:bodyPr>
+          <a:lstStyle/>
+          <a:p>
+            <a:pPr marL="0" marR="0" lvl="0" indent="0" algn="l" defTabSz="713232" rtl="0" eaLnBrk="1" fontAlgn="auto" latinLnBrk="0" hangingPunct="1">
+              <a:lnSpc>
+                <a:spcPct val="120000"/>
+              </a:lnSpc>
+              <a:spcBef>
+                <a:spcPts val="750"/>
+              </a:spcBef>
+              <a:spcAft>
+                <a:spcPts val="0"/>
+              </a:spcAft>
+              <a:buClr>
+                <a:srgbClr val="00BEFF"/>
+              </a:buClr>
+              <a:buSzTx/>
+              <a:buFontTx/>
+              <a:buNone/>
+              <a:tabLst/>
+              <a:defRPr/>
+            </a:pPr>
+            <a:r>
+              <a:rPr kumimoji="0" lang="de-DE" sz="1200" b="1" i="0" u="none" strike="noStrike" kern="1200" cap="none" spc="0" normalizeH="0" baseline="0" noProof="0" dirty="0">
+                <a:ln>
+                  <a:noFill/>
+                </a:ln>
+                <a:solidFill>
+                  <a:srgbClr val="3E444C"/>
+                </a:solidFill>
+                <a:effectLst/>
+                <a:uLnTx/>
+                <a:uFillTx/>
+                <a:latin typeface="Roboto" panose="02000000000000000000" pitchFamily="2" charset="0"/>
+                <a:ea typeface="Roboto" panose="02000000000000000000" pitchFamily="2" charset="0"/>
+                <a:cs typeface="+mn-cs"/>
+              </a:rPr>
+              <a:t>FN</a:t>
+            </a:r>
+          </a:p>
+        </p:txBody>
+      </p:sp>
+      <p:sp>
+        <p:nvSpPr>
+          <p:cNvPr id="180" name="Textfeld 179">
+            <a:extLst>
+              <a:ext uri="{FF2B5EF4-FFF2-40B4-BE49-F238E27FC236}">
+                <a16:creationId xmlns:a16="http://schemas.microsoft.com/office/drawing/2014/main" id="{4C157486-FB4E-4C96-BC3B-124DADEBF133}"/>
+              </a:ext>
+            </a:extLst>
+          </p:cNvPr>
+          <p:cNvSpPr txBox="1"/>
+          <p:nvPr/>
+        </p:nvSpPr>
+        <p:spPr>
+          <a:xfrm>
+            <a:off x="7166501" y="5733762"/>
+            <a:ext cx="193964" cy="204671"/>
+          </a:xfrm>
+          <a:prstGeom prst="rect">
+            <a:avLst/>
+          </a:prstGeom>
+          <a:noFill/>
+        </p:spPr>
+        <p:txBody>
+          <a:bodyPr wrap="none" lIns="0" tIns="0" rIns="0" bIns="0" rtlCol="0">
+            <a:spAutoFit/>
+          </a:bodyPr>
+          <a:lstStyle/>
+          <a:p>
+            <a:pPr marL="0" marR="0" lvl="0" indent="0" algn="l" defTabSz="713232" rtl="0" eaLnBrk="1" fontAlgn="auto" latinLnBrk="0" hangingPunct="1">
+              <a:lnSpc>
+                <a:spcPct val="120000"/>
+              </a:lnSpc>
+              <a:spcBef>
+                <a:spcPts val="750"/>
+              </a:spcBef>
+              <a:spcAft>
+                <a:spcPts val="0"/>
+              </a:spcAft>
+              <a:buClr>
+                <a:srgbClr val="00BEFF"/>
+              </a:buClr>
+              <a:buSzTx/>
+              <a:buFontTx/>
+              <a:buNone/>
+              <a:tabLst/>
+              <a:defRPr/>
+            </a:pPr>
+            <a:r>
+              <a:rPr kumimoji="0" lang="de-DE" sz="1200" b="1" i="0" u="none" strike="noStrike" kern="1200" cap="none" spc="0" normalizeH="0" baseline="0" noProof="0" dirty="0">
+                <a:ln>
+                  <a:noFill/>
+                </a:ln>
+                <a:solidFill>
+                  <a:srgbClr val="3E444C"/>
+                </a:solidFill>
+                <a:effectLst/>
+                <a:uLnTx/>
+                <a:uFillTx/>
+                <a:latin typeface="Roboto" panose="02000000000000000000" pitchFamily="2" charset="0"/>
+                <a:ea typeface="Roboto" panose="02000000000000000000" pitchFamily="2" charset="0"/>
+                <a:cs typeface="+mn-cs"/>
+              </a:rPr>
+              <a:t>FN</a:t>
+            </a:r>
+          </a:p>
+        </p:txBody>
+      </p:sp>
+      <p:sp>
+        <p:nvSpPr>
+          <p:cNvPr id="183" name="Textfeld 182">
+            <a:extLst>
+              <a:ext uri="{FF2B5EF4-FFF2-40B4-BE49-F238E27FC236}">
+                <a16:creationId xmlns:a16="http://schemas.microsoft.com/office/drawing/2014/main" id="{BE4E3958-696B-4C24-9236-A3730BA80510}"/>
+              </a:ext>
+            </a:extLst>
+          </p:cNvPr>
+          <p:cNvSpPr txBox="1"/>
+          <p:nvPr/>
+        </p:nvSpPr>
+        <p:spPr>
+          <a:xfrm>
+            <a:off x="9105262" y="6119934"/>
+            <a:ext cx="193964" cy="204671"/>
+          </a:xfrm>
+          <a:prstGeom prst="rect">
+            <a:avLst/>
+          </a:prstGeom>
+          <a:noFill/>
+        </p:spPr>
+        <p:txBody>
+          <a:bodyPr wrap="none" lIns="0" tIns="0" rIns="0" bIns="0" rtlCol="0">
+            <a:spAutoFit/>
+          </a:bodyPr>
+          <a:lstStyle/>
+          <a:p>
+            <a:pPr marL="0" marR="0" lvl="0" indent="0" algn="l" defTabSz="713232" rtl="0" eaLnBrk="1" fontAlgn="auto" latinLnBrk="0" hangingPunct="1">
+              <a:lnSpc>
+                <a:spcPct val="120000"/>
+              </a:lnSpc>
+              <a:spcBef>
+                <a:spcPts val="750"/>
+              </a:spcBef>
+              <a:spcAft>
+                <a:spcPts val="0"/>
+              </a:spcAft>
+              <a:buClr>
+                <a:srgbClr val="00BEFF"/>
+              </a:buClr>
+              <a:buSzTx/>
+              <a:buFontTx/>
+              <a:buNone/>
+              <a:tabLst/>
+              <a:defRPr/>
+            </a:pPr>
+            <a:r>
+              <a:rPr kumimoji="0" lang="de-DE" sz="1200" b="1" i="0" u="none" strike="noStrike" kern="1200" cap="none" spc="0" normalizeH="0" baseline="0" noProof="0" dirty="0">
+                <a:ln>
+                  <a:noFill/>
+                </a:ln>
+                <a:solidFill>
+                  <a:srgbClr val="3E444C"/>
+                </a:solidFill>
+                <a:effectLst/>
+                <a:uLnTx/>
+                <a:uFillTx/>
+                <a:latin typeface="Roboto" panose="02000000000000000000" pitchFamily="2" charset="0"/>
+                <a:ea typeface="Roboto" panose="02000000000000000000" pitchFamily="2" charset="0"/>
+                <a:cs typeface="+mn-cs"/>
+              </a:rPr>
+              <a:t>TP</a:t>
+            </a:r>
+          </a:p>
+        </p:txBody>
+      </p:sp>
+      <p:sp>
+        <p:nvSpPr>
+          <p:cNvPr id="184" name="Geschweifte Klammer rechts 183">
+            <a:extLst>
+              <a:ext uri="{FF2B5EF4-FFF2-40B4-BE49-F238E27FC236}">
+                <a16:creationId xmlns:a16="http://schemas.microsoft.com/office/drawing/2014/main" id="{7839DA15-0CB3-4872-8AE5-3CCD29894878}"/>
+              </a:ext>
+            </a:extLst>
+          </p:cNvPr>
+          <p:cNvSpPr/>
+          <p:nvPr/>
+        </p:nvSpPr>
+        <p:spPr>
+          <a:xfrm rot="5400000">
+            <a:off x="9714730" y="4085637"/>
+            <a:ext cx="304367" cy="3721312"/>
+          </a:xfrm>
+          <a:prstGeom prst="rightBrace">
+            <a:avLst>
+              <a:gd name="adj1" fmla="val 8333"/>
+              <a:gd name="adj2" fmla="val 67457"/>
+            </a:avLst>
+          </a:prstGeom>
+          <a:ln w="12700">
+            <a:solidFill>
+              <a:schemeClr val="tx1"/>
+            </a:solidFill>
+          </a:ln>
+        </p:spPr>
+        <p:style>
+          <a:lnRef idx="1">
+            <a:schemeClr val="accent1"/>
+          </a:lnRef>
+          <a:fillRef idx="0">
+            <a:schemeClr val="accent1"/>
+          </a:fillRef>
+          <a:effectRef idx="0">
+            <a:schemeClr val="accent1"/>
+          </a:effectRef>
+          <a:fontRef idx="minor">
+            <a:schemeClr val="tx1"/>
+          </a:fontRef>
+        </p:style>
+        <p:txBody>
+          <a:bodyPr rtlCol="0" anchor="ctr"/>
+          <a:lstStyle/>
+          <a:p>
+            <a:pPr marL="0" marR="0" lvl="0" indent="0" algn="ctr" defTabSz="713232" rtl="0" eaLnBrk="1" fontAlgn="auto" latinLnBrk="0" hangingPunct="1">
+              <a:lnSpc>
+                <a:spcPct val="100000"/>
+              </a:lnSpc>
+              <a:spcBef>
+                <a:spcPts val="0"/>
+              </a:spcBef>
+              <a:spcAft>
+                <a:spcPts val="0"/>
+              </a:spcAft>
+              <a:buClrTx/>
+              <a:buSzTx/>
+              <a:buFontTx/>
+              <a:buNone/>
+              <a:tabLst/>
+              <a:defRPr/>
+            </a:pPr>
+            <a:endParaRPr kumimoji="0" lang="de-DE" sz="1404" b="0" i="0" u="none" strike="noStrike" kern="1200" cap="none" spc="0" normalizeH="0" baseline="0" noProof="0">
+              <a:ln>
+                <a:noFill/>
+              </a:ln>
+              <a:solidFill>
+                <a:srgbClr val="3E444C"/>
+              </a:solidFill>
+              <a:effectLst/>
+              <a:uLnTx/>
+              <a:uFillTx/>
+              <a:latin typeface="Arial"/>
+              <a:ea typeface="+mn-ea"/>
+              <a:cs typeface="+mn-cs"/>
+            </a:endParaRPr>
+          </a:p>
+        </p:txBody>
+      </p:sp>
+      <p:sp>
+        <p:nvSpPr>
+          <p:cNvPr id="204" name="Textfeld 203">
+            <a:extLst>
+              <a:ext uri="{FF2B5EF4-FFF2-40B4-BE49-F238E27FC236}">
+                <a16:creationId xmlns:a16="http://schemas.microsoft.com/office/drawing/2014/main" id="{E3412D32-8E88-49DE-A56C-ED17A2B59076}"/>
+              </a:ext>
+            </a:extLst>
+          </p:cNvPr>
+          <p:cNvSpPr txBox="1"/>
+          <p:nvPr/>
+        </p:nvSpPr>
+        <p:spPr>
+          <a:xfrm>
+            <a:off x="4646468" y="4230027"/>
+            <a:ext cx="1528491" cy="238782"/>
+          </a:xfrm>
+          <a:prstGeom prst="rect">
+            <a:avLst/>
+          </a:prstGeom>
+          <a:noFill/>
+        </p:spPr>
+        <p:txBody>
+          <a:bodyPr wrap="square" lIns="0" tIns="0" rIns="0" bIns="0" rtlCol="0">
+            <a:spAutoFit/>
+          </a:bodyPr>
+          <a:lstStyle/>
+          <a:p>
+            <a:pPr marL="0" marR="0" lvl="0" indent="0" algn="r" defTabSz="713232" rtl="0" eaLnBrk="1" fontAlgn="auto" latinLnBrk="0" hangingPunct="1">
+              <a:lnSpc>
+                <a:spcPct val="120000"/>
+              </a:lnSpc>
+              <a:spcBef>
+                <a:spcPts val="750"/>
+              </a:spcBef>
+              <a:spcAft>
+                <a:spcPts val="0"/>
+              </a:spcAft>
+              <a:buClr>
+                <a:srgbClr val="00BEFF"/>
+              </a:buClr>
+              <a:buSzTx/>
+              <a:buFontTx/>
+              <a:buNone/>
+              <a:tabLst/>
+              <a:defRPr/>
+            </a:pPr>
+            <a:r>
+              <a:rPr kumimoji="0" lang="de-DE" sz="1400" b="0" i="0" u="none" strike="noStrike" kern="1200" cap="none" spc="0" normalizeH="0" baseline="0" noProof="0" dirty="0">
+                <a:ln>
+                  <a:noFill/>
+                </a:ln>
+                <a:solidFill>
+                  <a:srgbClr val="FF0000"/>
+                </a:solidFill>
+                <a:effectLst/>
+                <a:uLnTx/>
+                <a:uFillTx/>
+                <a:latin typeface="Roboto Light" panose="02000000000000000000" pitchFamily="2" charset="0"/>
+                <a:ea typeface="Roboto Light" panose="02000000000000000000" pitchFamily="2" charset="0"/>
+                <a:cs typeface="+mn-cs"/>
+              </a:rPr>
+              <a:t>possible </a:t>
+            </a:r>
+            <a:r>
+              <a:rPr kumimoji="0" lang="de-DE" sz="1400" b="0" i="0" u="none" strike="noStrike" kern="1200" cap="none" spc="0" normalizeH="0" baseline="0" noProof="0" dirty="0" err="1">
+                <a:ln>
+                  <a:noFill/>
+                </a:ln>
+                <a:solidFill>
+                  <a:srgbClr val="FF0000"/>
+                </a:solidFill>
+                <a:effectLst/>
+                <a:uLnTx/>
+                <a:uFillTx/>
+                <a:latin typeface="Roboto Light" panose="02000000000000000000" pitchFamily="2" charset="0"/>
+                <a:ea typeface="Roboto Light" panose="02000000000000000000" pitchFamily="2" charset="0"/>
+                <a:cs typeface="+mn-cs"/>
+              </a:rPr>
+              <a:t>Prediction</a:t>
+            </a:r>
+            <a:endParaRPr kumimoji="0" lang="de-DE" sz="1400" b="0" i="0" u="none" strike="noStrike" kern="1200" cap="none" spc="0" normalizeH="0" baseline="0" noProof="0" dirty="0">
+              <a:ln>
+                <a:noFill/>
+              </a:ln>
+              <a:solidFill>
+                <a:srgbClr val="FF0000"/>
+              </a:solidFill>
+              <a:effectLst/>
+              <a:uLnTx/>
+              <a:uFillTx/>
+              <a:latin typeface="Roboto Light" panose="02000000000000000000" pitchFamily="2" charset="0"/>
+              <a:ea typeface="Roboto Light" panose="02000000000000000000" pitchFamily="2" charset="0"/>
+              <a:cs typeface="+mn-cs"/>
+            </a:endParaRPr>
+          </a:p>
+        </p:txBody>
+      </p:sp>
+      <p:sp>
+        <p:nvSpPr>
+          <p:cNvPr id="205" name="Textfeld 204">
+            <a:extLst>
+              <a:ext uri="{FF2B5EF4-FFF2-40B4-BE49-F238E27FC236}">
+                <a16:creationId xmlns:a16="http://schemas.microsoft.com/office/drawing/2014/main" id="{D40D7BFC-EA1E-44A4-A589-F53122A4D850}"/>
+              </a:ext>
+            </a:extLst>
+          </p:cNvPr>
+          <p:cNvSpPr txBox="1"/>
+          <p:nvPr/>
+        </p:nvSpPr>
+        <p:spPr>
+          <a:xfrm>
+            <a:off x="4624209" y="4981867"/>
+            <a:ext cx="1528491" cy="238782"/>
+          </a:xfrm>
+          <a:prstGeom prst="rect">
+            <a:avLst/>
+          </a:prstGeom>
+          <a:noFill/>
+        </p:spPr>
+        <p:txBody>
+          <a:bodyPr wrap="square" lIns="0" tIns="0" rIns="0" bIns="0" rtlCol="0">
+            <a:spAutoFit/>
+          </a:bodyPr>
+          <a:lstStyle/>
+          <a:p>
+            <a:pPr marL="0" marR="0" lvl="0" indent="0" algn="r" defTabSz="713232" rtl="0" eaLnBrk="1" fontAlgn="auto" latinLnBrk="0" hangingPunct="1">
+              <a:lnSpc>
+                <a:spcPct val="120000"/>
+              </a:lnSpc>
+              <a:spcBef>
+                <a:spcPts val="750"/>
+              </a:spcBef>
+              <a:spcAft>
+                <a:spcPts val="0"/>
+              </a:spcAft>
+              <a:buClr>
+                <a:srgbClr val="00BEFF"/>
+              </a:buClr>
+              <a:buSzTx/>
+              <a:buFontTx/>
+              <a:buNone/>
+              <a:tabLst/>
+              <a:defRPr/>
+            </a:pPr>
+            <a:r>
+              <a:rPr kumimoji="0" lang="de-DE" sz="1400" b="0" i="0" u="none" strike="noStrike" kern="1200" cap="none" spc="0" normalizeH="0" baseline="0" noProof="0" dirty="0">
+                <a:ln>
+                  <a:noFill/>
+                </a:ln>
+                <a:solidFill>
+                  <a:srgbClr val="FF0000"/>
+                </a:solidFill>
+                <a:effectLst/>
+                <a:uLnTx/>
+                <a:uFillTx/>
+                <a:latin typeface="Roboto Light" panose="02000000000000000000" pitchFamily="2" charset="0"/>
+                <a:ea typeface="Roboto Light" panose="02000000000000000000" pitchFamily="2" charset="0"/>
+                <a:cs typeface="+mn-cs"/>
+              </a:rPr>
+              <a:t>possible </a:t>
+            </a:r>
+            <a:r>
+              <a:rPr kumimoji="0" lang="de-DE" sz="1400" b="0" i="0" u="none" strike="noStrike" kern="1200" cap="none" spc="0" normalizeH="0" baseline="0" noProof="0" dirty="0" err="1">
+                <a:ln>
+                  <a:noFill/>
+                </a:ln>
+                <a:solidFill>
+                  <a:srgbClr val="FF0000"/>
+                </a:solidFill>
+                <a:effectLst/>
+                <a:uLnTx/>
+                <a:uFillTx/>
+                <a:latin typeface="Roboto Light" panose="02000000000000000000" pitchFamily="2" charset="0"/>
+                <a:ea typeface="Roboto Light" panose="02000000000000000000" pitchFamily="2" charset="0"/>
+                <a:cs typeface="+mn-cs"/>
+              </a:rPr>
+              <a:t>Prediction</a:t>
+            </a:r>
+            <a:endParaRPr kumimoji="0" lang="de-DE" sz="1400" b="0" i="0" u="none" strike="noStrike" kern="1200" cap="none" spc="0" normalizeH="0" baseline="0" noProof="0" dirty="0">
+              <a:ln>
+                <a:noFill/>
+              </a:ln>
+              <a:solidFill>
+                <a:srgbClr val="FF0000"/>
+              </a:solidFill>
+              <a:effectLst/>
+              <a:uLnTx/>
+              <a:uFillTx/>
+              <a:latin typeface="Roboto Light" panose="02000000000000000000" pitchFamily="2" charset="0"/>
+              <a:ea typeface="Roboto Light" panose="02000000000000000000" pitchFamily="2" charset="0"/>
+              <a:cs typeface="+mn-cs"/>
+            </a:endParaRPr>
+          </a:p>
+        </p:txBody>
+      </p:sp>
+      <p:sp>
+        <p:nvSpPr>
+          <p:cNvPr id="206" name="Textfeld 205">
+            <a:extLst>
+              <a:ext uri="{FF2B5EF4-FFF2-40B4-BE49-F238E27FC236}">
+                <a16:creationId xmlns:a16="http://schemas.microsoft.com/office/drawing/2014/main" id="{C8ACE0C5-55E3-466D-A850-5538C93AE1BD}"/>
+              </a:ext>
+            </a:extLst>
+          </p:cNvPr>
+          <p:cNvSpPr txBox="1"/>
+          <p:nvPr/>
+        </p:nvSpPr>
+        <p:spPr>
+          <a:xfrm>
+            <a:off x="4624208" y="5614316"/>
+            <a:ext cx="1528491" cy="238782"/>
+          </a:xfrm>
+          <a:prstGeom prst="rect">
+            <a:avLst/>
+          </a:prstGeom>
+          <a:noFill/>
+        </p:spPr>
+        <p:txBody>
+          <a:bodyPr wrap="square" lIns="0" tIns="0" rIns="0" bIns="0" rtlCol="0">
+            <a:spAutoFit/>
+          </a:bodyPr>
+          <a:lstStyle/>
+          <a:p>
+            <a:pPr marL="0" marR="0" lvl="0" indent="0" algn="r" defTabSz="713232" rtl="0" eaLnBrk="1" fontAlgn="auto" latinLnBrk="0" hangingPunct="1">
+              <a:lnSpc>
+                <a:spcPct val="120000"/>
+              </a:lnSpc>
+              <a:spcBef>
+                <a:spcPts val="750"/>
+              </a:spcBef>
+              <a:spcAft>
+                <a:spcPts val="0"/>
+              </a:spcAft>
+              <a:buClr>
+                <a:srgbClr val="00BEFF"/>
+              </a:buClr>
+              <a:buSzTx/>
+              <a:buFontTx/>
+              <a:buNone/>
+              <a:tabLst/>
+              <a:defRPr/>
+            </a:pPr>
+            <a:r>
+              <a:rPr kumimoji="0" lang="de-DE" sz="1400" b="0" i="0" u="none" strike="noStrike" kern="1200" cap="none" spc="0" normalizeH="0" baseline="0" noProof="0" dirty="0">
+                <a:ln>
+                  <a:noFill/>
+                </a:ln>
+                <a:solidFill>
+                  <a:srgbClr val="FF0000"/>
+                </a:solidFill>
+                <a:effectLst/>
+                <a:uLnTx/>
+                <a:uFillTx/>
+                <a:latin typeface="Roboto Light" panose="02000000000000000000" pitchFamily="2" charset="0"/>
+                <a:ea typeface="Roboto Light" panose="02000000000000000000" pitchFamily="2" charset="0"/>
+                <a:cs typeface="+mn-cs"/>
+              </a:rPr>
+              <a:t>possible </a:t>
+            </a:r>
+            <a:r>
+              <a:rPr kumimoji="0" lang="de-DE" sz="1400" b="0" i="0" u="none" strike="noStrike" kern="1200" cap="none" spc="0" normalizeH="0" baseline="0" noProof="0" dirty="0" err="1">
+                <a:ln>
+                  <a:noFill/>
+                </a:ln>
+                <a:solidFill>
+                  <a:srgbClr val="FF0000"/>
+                </a:solidFill>
+                <a:effectLst/>
+                <a:uLnTx/>
+                <a:uFillTx/>
+                <a:latin typeface="Roboto Light" panose="02000000000000000000" pitchFamily="2" charset="0"/>
+                <a:ea typeface="Roboto Light" panose="02000000000000000000" pitchFamily="2" charset="0"/>
+                <a:cs typeface="+mn-cs"/>
+              </a:rPr>
+              <a:t>Prediction</a:t>
+            </a:r>
+            <a:endParaRPr kumimoji="0" lang="de-DE" sz="1400" b="0" i="0" u="none" strike="noStrike" kern="1200" cap="none" spc="0" normalizeH="0" baseline="0" noProof="0" dirty="0">
+              <a:ln>
+                <a:noFill/>
+              </a:ln>
+              <a:solidFill>
+                <a:srgbClr val="FF0000"/>
+              </a:solidFill>
+              <a:effectLst/>
+              <a:uLnTx/>
+              <a:uFillTx/>
+              <a:latin typeface="Roboto Light" panose="02000000000000000000" pitchFamily="2" charset="0"/>
+              <a:ea typeface="Roboto Light" panose="02000000000000000000" pitchFamily="2" charset="0"/>
+              <a:cs typeface="+mn-cs"/>
+            </a:endParaRPr>
+          </a:p>
+        </p:txBody>
+      </p:sp>
+      <p:cxnSp>
+        <p:nvCxnSpPr>
+          <p:cNvPr id="208" name="Gerader Verbinder 207">
+            <a:extLst>
+              <a:ext uri="{FF2B5EF4-FFF2-40B4-BE49-F238E27FC236}">
+                <a16:creationId xmlns:a16="http://schemas.microsoft.com/office/drawing/2014/main" id="{BC0BABE5-132B-4727-91CC-02E13D2F914E}"/>
+              </a:ext>
+            </a:extLst>
+          </p:cNvPr>
+          <p:cNvCxnSpPr>
+            <a:cxnSpLocks/>
+          </p:cNvCxnSpPr>
+          <p:nvPr/>
+        </p:nvCxnSpPr>
+        <p:spPr>
+          <a:xfrm>
+            <a:off x="4490838" y="1418897"/>
+            <a:ext cx="0" cy="4905708"/>
+          </a:xfrm>
+          <a:prstGeom prst="line">
+            <a:avLst/>
+          </a:prstGeom>
+          <a:ln w="12700">
+            <a:solidFill>
+              <a:schemeClr val="tx1"/>
+            </a:solidFill>
+          </a:ln>
+        </p:spPr>
+        <p:style>
+          <a:lnRef idx="1">
+            <a:schemeClr val="accent1"/>
+          </a:lnRef>
+          <a:fillRef idx="0">
+            <a:schemeClr val="accent1"/>
+          </a:fillRef>
+          <a:effectRef idx="0">
+            <a:schemeClr val="accent1"/>
+          </a:effectRef>
+          <a:fontRef idx="minor">
+            <a:schemeClr val="tx1"/>
+          </a:fontRef>
+        </p:style>
+      </p:cxnSp>
+      <p:cxnSp>
+        <p:nvCxnSpPr>
+          <p:cNvPr id="210" name="Gerader Verbinder 209">
+            <a:extLst>
+              <a:ext uri="{FF2B5EF4-FFF2-40B4-BE49-F238E27FC236}">
+                <a16:creationId xmlns:a16="http://schemas.microsoft.com/office/drawing/2014/main" id="{A43DAEE9-DE2F-4B67-B582-EEAA6C1CE9CB}"/>
+              </a:ext>
+            </a:extLst>
+          </p:cNvPr>
+          <p:cNvCxnSpPr>
+            <a:cxnSpLocks/>
+          </p:cNvCxnSpPr>
+          <p:nvPr/>
+        </p:nvCxnSpPr>
+        <p:spPr>
+          <a:xfrm flipH="1">
+            <a:off x="5169066" y="2433436"/>
+            <a:ext cx="6744805" cy="0"/>
+          </a:xfrm>
+          <a:prstGeom prst="line">
+            <a:avLst/>
+          </a:prstGeom>
+          <a:ln w="12700">
+            <a:solidFill>
+              <a:schemeClr val="tx1"/>
+            </a:solidFill>
+          </a:ln>
+        </p:spPr>
+        <p:style>
+          <a:lnRef idx="1">
+            <a:schemeClr val="accent1"/>
+          </a:lnRef>
+          <a:fillRef idx="0">
+            <a:schemeClr val="accent1"/>
+          </a:fillRef>
+          <a:effectRef idx="0">
+            <a:schemeClr val="accent1"/>
+          </a:effectRef>
+          <a:fontRef idx="minor">
+            <a:schemeClr val="tx1"/>
+          </a:fontRef>
+        </p:style>
+      </p:cxnSp>
+      <p:sp>
+        <p:nvSpPr>
+          <p:cNvPr id="262" name="Inhaltsplatzhalter 3">
+            <a:extLst>
+              <a:ext uri="{FF2B5EF4-FFF2-40B4-BE49-F238E27FC236}">
+                <a16:creationId xmlns:a16="http://schemas.microsoft.com/office/drawing/2014/main" id="{612B1ED5-E582-471B-B94A-28D1E7A900C3}"/>
               </a:ext>
             </a:extLst>
           </p:cNvPr>
@@ -17878,40 +22214,84 @@
         </p:nvSpPr>
         <p:spPr>
           <a:xfrm>
-            <a:off x="622300" y="1508085"/>
-            <a:ext cx="10456443" cy="4948134"/>
-          </a:xfrm>
-        </p:spPr>
-        <p:txBody>
-          <a:bodyPr anchor="t" anchorCtr="0"/>
+            <a:off x="622301" y="1508084"/>
+            <a:ext cx="3522524" cy="5449763"/>
+          </a:xfrm>
+        </p:spPr>
+        <p:txBody>
+          <a:bodyPr anchor="ctr" anchorCtr="0"/>
           <a:lstStyle/>
           <a:p>
             <a:r>
-              <a:rPr lang="en-GB" sz="2000" dirty="0">
-                <a:latin typeface="Calibri" panose="020F0502020204030204" pitchFamily="34" charset="0"/>
+              <a:rPr lang="en-GB" sz="1600" dirty="0">
+                <a:latin typeface="Roboto Light" panose="02000000000000000000" pitchFamily="2" charset="0"/>
+                <a:ea typeface="Roboto Light" panose="02000000000000000000" pitchFamily="2" charset="0"/>
                 <a:cs typeface="Calibri" panose="020F0502020204030204" pitchFamily="34" charset="0"/>
               </a:rPr>
-              <a:t>intersections between predicted and real target sequence are counted as true positives</a:t>
-            </a:r>
-          </a:p>
-          <a:p>
-            <a:r>
-              <a:rPr lang="en-GB" sz="2000" dirty="0">
-                <a:latin typeface="Calibri" panose="020F0502020204030204" pitchFamily="34" charset="0"/>
+              <a:t>intersections between target and predicted sequence are evaluated as True Positive</a:t>
+            </a:r>
+          </a:p>
+          <a:p>
+            <a:r>
+              <a:rPr lang="en-GB" sz="1600" dirty="0">
+                <a:latin typeface="Roboto Light" panose="02000000000000000000" pitchFamily="2" charset="0"/>
+                <a:ea typeface="Roboto Light" panose="02000000000000000000" pitchFamily="2" charset="0"/>
                 <a:cs typeface="Calibri" panose="020F0502020204030204" pitchFamily="34" charset="0"/>
               </a:rPr>
-              <a:t>empty intersections are counted as false classifications </a:t>
-            </a:r>
-          </a:p>
-          <a:p>
-            <a:r>
-              <a:rPr lang="en-GB" sz="2000" dirty="0">
-                <a:latin typeface="Calibri" panose="020F0502020204030204" pitchFamily="34" charset="0"/>
+              <a:t>empty intersections are evaluated as false classifications</a:t>
+            </a:r>
+          </a:p>
+          <a:p>
+            <a:pPr lvl="1"/>
+            <a:r>
+              <a:rPr lang="en-GB" sz="1400" dirty="0">
+                <a:latin typeface="Roboto Light" panose="02000000000000000000" pitchFamily="2" charset="0"/>
+                <a:ea typeface="Roboto Light" panose="02000000000000000000" pitchFamily="2" charset="0"/>
                 <a:cs typeface="Calibri" panose="020F0502020204030204" pitchFamily="34" charset="0"/>
               </a:rPr>
-              <a:t>multiple sequences mapped onto one are only counted once</a:t>
-            </a:r>
-            <a:endParaRPr lang="en-GB" sz="2000" dirty="0">
+              <a:t>not predicting target sequence: False Negative</a:t>
+            </a:r>
+            <a:endParaRPr lang="en-GB" sz="1600" dirty="0">
+              <a:latin typeface="Roboto Light" panose="02000000000000000000" pitchFamily="2" charset="0"/>
+              <a:ea typeface="Roboto Light" panose="02000000000000000000" pitchFamily="2" charset="0"/>
+              <a:cs typeface="Calibri" panose="020F0502020204030204" pitchFamily="34" charset="0"/>
+            </a:endParaRPr>
+          </a:p>
+          <a:p>
+            <a:pPr lvl="1"/>
+            <a:r>
+              <a:rPr lang="en-GB" sz="1400" dirty="0">
+                <a:latin typeface="Roboto Light" panose="02000000000000000000" pitchFamily="2" charset="0"/>
+                <a:ea typeface="Roboto Light" panose="02000000000000000000" pitchFamily="2" charset="0"/>
+                <a:cs typeface="Calibri" panose="020F0502020204030204" pitchFamily="34" charset="0"/>
+              </a:rPr>
+              <a:t>predicting non-target sequence: False Positive</a:t>
+            </a:r>
+          </a:p>
+          <a:p>
+            <a:r>
+              <a:rPr lang="en-GB" sz="1600" dirty="0">
+                <a:latin typeface="Roboto Light" panose="02000000000000000000" pitchFamily="2" charset="0"/>
+                <a:ea typeface="Roboto Light" panose="02000000000000000000" pitchFamily="2" charset="0"/>
+                <a:cs typeface="Calibri" panose="020F0502020204030204" pitchFamily="34" charset="0"/>
+              </a:rPr>
+              <a:t>multiple sequences mapped onto one are evaluated as one</a:t>
+            </a:r>
+          </a:p>
+          <a:p>
+            <a:r>
+              <a:rPr lang="en-GB" sz="1600" dirty="0">
+                <a:latin typeface="Roboto Light" panose="02000000000000000000" pitchFamily="2" charset="0"/>
+                <a:ea typeface="Roboto Light" panose="02000000000000000000" pitchFamily="2" charset="0"/>
+                <a:cs typeface="Calibri" panose="020F0502020204030204" pitchFamily="34" charset="0"/>
+              </a:rPr>
+              <a:t>True Negatives (correctly predicting non-target sequence) are omitted</a:t>
+            </a:r>
+          </a:p>
+          <a:p>
+            <a:endParaRPr lang="en-GB" sz="1600" dirty="0">
+              <a:latin typeface="Roboto Light" panose="02000000000000000000" pitchFamily="2" charset="0"/>
+              <a:ea typeface="Roboto Light" panose="02000000000000000000" pitchFamily="2" charset="0"/>
               <a:cs typeface="Calibri" panose="020F0502020204030204" pitchFamily="34" charset="0"/>
             </a:endParaRPr>
           </a:p>
@@ -17920,7 +22300,7 @@
     </p:spTree>
     <p:extLst>
       <p:ext uri="{BB962C8B-B14F-4D97-AF65-F5344CB8AC3E}">
-        <p14:creationId xmlns:p14="http://schemas.microsoft.com/office/powerpoint/2010/main" val="3817279433"/>
+        <p14:creationId xmlns:p14="http://schemas.microsoft.com/office/powerpoint/2010/main" val="1071004371"/>
       </p:ext>
     </p:extLst>
   </p:cSld>
@@ -19452,11 +23832,11 @@
   <p:clrMapOvr>
     <a:masterClrMapping/>
   </p:clrMapOvr>
-  <mc:AlternateContent xmlns:mc="http://schemas.openxmlformats.org/markup-compatibility/2006">
-    <mc:Choice xmlns:p14="http://schemas.microsoft.com/office/powerpoint/2010/main" Requires="p14">
+  <mc:AlternateContent xmlns:mc="http://schemas.openxmlformats.org/markup-compatibility/2006" xmlns:p14="http://schemas.microsoft.com/office/powerpoint/2010/main">
+    <mc:Choice Requires="p14">
       <p:transition p14:dur="0" advTm="2361"/>
     </mc:Choice>
-    <mc:Fallback>
+    <mc:Fallback xmlns="">
       <p:transition advTm="2361"/>
     </mc:Fallback>
   </mc:AlternateContent>

</xml_diff>